<commit_message>
adicionado requerimentos, caso de uso. Versao inicial
</commit_message>
<xml_diff>
--- a/doc/diagramas/conceitual/Conceitual.pptx
+++ b/doc/diagramas/conceitual/Conceitual.pptx
@@ -104,6 +104,11 @@
       </a:defRPr>
     </a:lvl9pPr>
   </p:defaultTextStyle>
+  <p:extLst>
+    <p:ext uri="{EFAFB233-063F-42B5-8137-9DF3F51BA10A}">
+      <p15:sldGuideLst xmlns:p15="http://schemas.microsoft.com/office/powerpoint/2012/main"/>
+    </p:ext>
+  </p:extLst>
 </p:presentation>
 </file>
 
@@ -149,10 +154,9 @@
           </a:lstStyle>
           <a:p>
             <a:r>
-              <a:rPr lang="pt-BR" smtClean="0"/>
+              <a:rPr lang="pt-BR"/>
               <a:t>Clique para editar o título mestre</a:t>
             </a:r>
-            <a:endParaRPr lang="pt-BR"/>
           </a:p>
         </p:txBody>
       </p:sp>
@@ -214,10 +218,9 @@
           </a:lstStyle>
           <a:p>
             <a:r>
-              <a:rPr lang="pt-BR" smtClean="0"/>
+              <a:rPr lang="pt-BR"/>
               <a:t>Clique para editar o estilo do subtítulo mestre</a:t>
             </a:r>
-            <a:endParaRPr lang="pt-BR"/>
           </a:p>
         </p:txBody>
       </p:sp>
@@ -238,7 +241,7 @@
           <a:p>
             <a:fld id="{4E198183-1849-47C3-B91A-B1E2FC32FD0B}" type="datetimeFigureOut">
               <a:rPr lang="pt-BR" smtClean="0"/>
-              <a:t>29/03/2019</a:t>
+              <a:t>30/03/2019</a:t>
             </a:fld>
             <a:endParaRPr lang="pt-BR"/>
           </a:p>
@@ -332,10 +335,9 @@
           <a:lstStyle/>
           <a:p>
             <a:r>
-              <a:rPr lang="pt-BR" smtClean="0"/>
+              <a:rPr lang="pt-BR"/>
               <a:t>Clique para editar o título mestre</a:t>
             </a:r>
-            <a:endParaRPr lang="pt-BR"/>
           </a:p>
         </p:txBody>
       </p:sp>
@@ -356,38 +358,37 @@
           <a:p>
             <a:pPr lvl="0"/>
             <a:r>
-              <a:rPr lang="pt-BR" smtClean="0"/>
+              <a:rPr lang="pt-BR"/>
               <a:t>Clique para editar o texto mestre</a:t>
             </a:r>
           </a:p>
           <a:p>
             <a:pPr lvl="1"/>
             <a:r>
-              <a:rPr lang="pt-BR" smtClean="0"/>
+              <a:rPr lang="pt-BR"/>
               <a:t>Segundo nível</a:t>
             </a:r>
           </a:p>
           <a:p>
             <a:pPr lvl="2"/>
             <a:r>
-              <a:rPr lang="pt-BR" smtClean="0"/>
+              <a:rPr lang="pt-BR"/>
               <a:t>Terceiro nível</a:t>
             </a:r>
           </a:p>
           <a:p>
             <a:pPr lvl="3"/>
             <a:r>
-              <a:rPr lang="pt-BR" smtClean="0"/>
+              <a:rPr lang="pt-BR"/>
               <a:t>Quarto nível</a:t>
             </a:r>
           </a:p>
           <a:p>
             <a:pPr lvl="4"/>
             <a:r>
-              <a:rPr lang="pt-BR" smtClean="0"/>
+              <a:rPr lang="pt-BR"/>
               <a:t>Quinto nível</a:t>
             </a:r>
-            <a:endParaRPr lang="pt-BR"/>
           </a:p>
         </p:txBody>
       </p:sp>
@@ -408,7 +409,7 @@
           <a:p>
             <a:fld id="{4E198183-1849-47C3-B91A-B1E2FC32FD0B}" type="datetimeFigureOut">
               <a:rPr lang="pt-BR" smtClean="0"/>
-              <a:t>29/03/2019</a:t>
+              <a:t>30/03/2019</a:t>
             </a:fld>
             <a:endParaRPr lang="pt-BR"/>
           </a:p>
@@ -507,10 +508,9 @@
           <a:lstStyle/>
           <a:p>
             <a:r>
-              <a:rPr lang="pt-BR" smtClean="0"/>
+              <a:rPr lang="pt-BR"/>
               <a:t>Clique para editar o título mestre</a:t>
             </a:r>
-            <a:endParaRPr lang="pt-BR"/>
           </a:p>
         </p:txBody>
       </p:sp>
@@ -536,38 +536,37 @@
           <a:p>
             <a:pPr lvl="0"/>
             <a:r>
-              <a:rPr lang="pt-BR" smtClean="0"/>
+              <a:rPr lang="pt-BR"/>
               <a:t>Clique para editar o texto mestre</a:t>
             </a:r>
           </a:p>
           <a:p>
             <a:pPr lvl="1"/>
             <a:r>
-              <a:rPr lang="pt-BR" smtClean="0"/>
+              <a:rPr lang="pt-BR"/>
               <a:t>Segundo nível</a:t>
             </a:r>
           </a:p>
           <a:p>
             <a:pPr lvl="2"/>
             <a:r>
-              <a:rPr lang="pt-BR" smtClean="0"/>
+              <a:rPr lang="pt-BR"/>
               <a:t>Terceiro nível</a:t>
             </a:r>
           </a:p>
           <a:p>
             <a:pPr lvl="3"/>
             <a:r>
-              <a:rPr lang="pt-BR" smtClean="0"/>
+              <a:rPr lang="pt-BR"/>
               <a:t>Quarto nível</a:t>
             </a:r>
           </a:p>
           <a:p>
             <a:pPr lvl="4"/>
             <a:r>
-              <a:rPr lang="pt-BR" smtClean="0"/>
+              <a:rPr lang="pt-BR"/>
               <a:t>Quinto nível</a:t>
             </a:r>
-            <a:endParaRPr lang="pt-BR"/>
           </a:p>
         </p:txBody>
       </p:sp>
@@ -588,7 +587,7 @@
           <a:p>
             <a:fld id="{4E198183-1849-47C3-B91A-B1E2FC32FD0B}" type="datetimeFigureOut">
               <a:rPr lang="pt-BR" smtClean="0"/>
-              <a:t>29/03/2019</a:t>
+              <a:t>30/03/2019</a:t>
             </a:fld>
             <a:endParaRPr lang="pt-BR"/>
           </a:p>
@@ -682,10 +681,9 @@
           <a:lstStyle/>
           <a:p>
             <a:r>
-              <a:rPr lang="pt-BR" smtClean="0"/>
+              <a:rPr lang="pt-BR"/>
               <a:t>Clique para editar o título mestre</a:t>
             </a:r>
-            <a:endParaRPr lang="pt-BR"/>
           </a:p>
         </p:txBody>
       </p:sp>
@@ -706,38 +704,37 @@
           <a:p>
             <a:pPr lvl="0"/>
             <a:r>
-              <a:rPr lang="pt-BR" smtClean="0"/>
+              <a:rPr lang="pt-BR"/>
               <a:t>Clique para editar o texto mestre</a:t>
             </a:r>
           </a:p>
           <a:p>
             <a:pPr lvl="1"/>
             <a:r>
-              <a:rPr lang="pt-BR" smtClean="0"/>
+              <a:rPr lang="pt-BR"/>
               <a:t>Segundo nível</a:t>
             </a:r>
           </a:p>
           <a:p>
             <a:pPr lvl="2"/>
             <a:r>
-              <a:rPr lang="pt-BR" smtClean="0"/>
+              <a:rPr lang="pt-BR"/>
               <a:t>Terceiro nível</a:t>
             </a:r>
           </a:p>
           <a:p>
             <a:pPr lvl="3"/>
             <a:r>
-              <a:rPr lang="pt-BR" smtClean="0"/>
+              <a:rPr lang="pt-BR"/>
               <a:t>Quarto nível</a:t>
             </a:r>
           </a:p>
           <a:p>
             <a:pPr lvl="4"/>
             <a:r>
-              <a:rPr lang="pt-BR" smtClean="0"/>
+              <a:rPr lang="pt-BR"/>
               <a:t>Quinto nível</a:t>
             </a:r>
-            <a:endParaRPr lang="pt-BR"/>
           </a:p>
         </p:txBody>
       </p:sp>
@@ -758,7 +755,7 @@
           <a:p>
             <a:fld id="{4E198183-1849-47C3-B91A-B1E2FC32FD0B}" type="datetimeFigureOut">
               <a:rPr lang="pt-BR" smtClean="0"/>
-              <a:t>29/03/2019</a:t>
+              <a:t>30/03/2019</a:t>
             </a:fld>
             <a:endParaRPr lang="pt-BR"/>
           </a:p>
@@ -861,10 +858,9 @@
           </a:lstStyle>
           <a:p>
             <a:r>
-              <a:rPr lang="pt-BR" smtClean="0"/>
+              <a:rPr lang="pt-BR"/>
               <a:t>Clique para editar o título mestre</a:t>
             </a:r>
-            <a:endParaRPr lang="pt-BR"/>
           </a:p>
         </p:txBody>
       </p:sp>
@@ -981,7 +977,7 @@
           <a:p>
             <a:pPr lvl="0"/>
             <a:r>
-              <a:rPr lang="pt-BR" smtClean="0"/>
+              <a:rPr lang="pt-BR"/>
               <a:t>Clique para editar o texto mestre</a:t>
             </a:r>
           </a:p>
@@ -1004,7 +1000,7 @@
           <a:p>
             <a:fld id="{4E198183-1849-47C3-B91A-B1E2FC32FD0B}" type="datetimeFigureOut">
               <a:rPr lang="pt-BR" smtClean="0"/>
-              <a:t>29/03/2019</a:t>
+              <a:t>30/03/2019</a:t>
             </a:fld>
             <a:endParaRPr lang="pt-BR"/>
           </a:p>
@@ -1098,10 +1094,9 @@
           <a:lstStyle/>
           <a:p>
             <a:r>
-              <a:rPr lang="pt-BR" smtClean="0"/>
+              <a:rPr lang="pt-BR"/>
               <a:t>Clique para editar o título mestre</a:t>
             </a:r>
-            <a:endParaRPr lang="pt-BR"/>
           </a:p>
         </p:txBody>
       </p:sp>
@@ -1127,38 +1122,37 @@
           <a:p>
             <a:pPr lvl="0"/>
             <a:r>
-              <a:rPr lang="pt-BR" smtClean="0"/>
+              <a:rPr lang="pt-BR"/>
               <a:t>Clique para editar o texto mestre</a:t>
             </a:r>
           </a:p>
           <a:p>
             <a:pPr lvl="1"/>
             <a:r>
-              <a:rPr lang="pt-BR" smtClean="0"/>
+              <a:rPr lang="pt-BR"/>
               <a:t>Segundo nível</a:t>
             </a:r>
           </a:p>
           <a:p>
             <a:pPr lvl="2"/>
             <a:r>
-              <a:rPr lang="pt-BR" smtClean="0"/>
+              <a:rPr lang="pt-BR"/>
               <a:t>Terceiro nível</a:t>
             </a:r>
           </a:p>
           <a:p>
             <a:pPr lvl="3"/>
             <a:r>
-              <a:rPr lang="pt-BR" smtClean="0"/>
+              <a:rPr lang="pt-BR"/>
               <a:t>Quarto nível</a:t>
             </a:r>
           </a:p>
           <a:p>
             <a:pPr lvl="4"/>
             <a:r>
-              <a:rPr lang="pt-BR" smtClean="0"/>
+              <a:rPr lang="pt-BR"/>
               <a:t>Quinto nível</a:t>
             </a:r>
-            <a:endParaRPr lang="pt-BR"/>
           </a:p>
         </p:txBody>
       </p:sp>
@@ -1184,38 +1178,37 @@
           <a:p>
             <a:pPr lvl="0"/>
             <a:r>
-              <a:rPr lang="pt-BR" smtClean="0"/>
+              <a:rPr lang="pt-BR"/>
               <a:t>Clique para editar o texto mestre</a:t>
             </a:r>
           </a:p>
           <a:p>
             <a:pPr lvl="1"/>
             <a:r>
-              <a:rPr lang="pt-BR" smtClean="0"/>
+              <a:rPr lang="pt-BR"/>
               <a:t>Segundo nível</a:t>
             </a:r>
           </a:p>
           <a:p>
             <a:pPr lvl="2"/>
             <a:r>
-              <a:rPr lang="pt-BR" smtClean="0"/>
+              <a:rPr lang="pt-BR"/>
               <a:t>Terceiro nível</a:t>
             </a:r>
           </a:p>
           <a:p>
             <a:pPr lvl="3"/>
             <a:r>
-              <a:rPr lang="pt-BR" smtClean="0"/>
+              <a:rPr lang="pt-BR"/>
               <a:t>Quarto nível</a:t>
             </a:r>
           </a:p>
           <a:p>
             <a:pPr lvl="4"/>
             <a:r>
-              <a:rPr lang="pt-BR" smtClean="0"/>
+              <a:rPr lang="pt-BR"/>
               <a:t>Quinto nível</a:t>
             </a:r>
-            <a:endParaRPr lang="pt-BR"/>
           </a:p>
         </p:txBody>
       </p:sp>
@@ -1236,7 +1229,7 @@
           <a:p>
             <a:fld id="{4E198183-1849-47C3-B91A-B1E2FC32FD0B}" type="datetimeFigureOut">
               <a:rPr lang="pt-BR" smtClean="0"/>
-              <a:t>29/03/2019</a:t>
+              <a:t>30/03/2019</a:t>
             </a:fld>
             <a:endParaRPr lang="pt-BR"/>
           </a:p>
@@ -1335,10 +1328,9 @@
           <a:lstStyle/>
           <a:p>
             <a:r>
-              <a:rPr lang="pt-BR" smtClean="0"/>
+              <a:rPr lang="pt-BR"/>
               <a:t>Clique para editar o título mestre</a:t>
             </a:r>
-            <a:endParaRPr lang="pt-BR"/>
           </a:p>
         </p:txBody>
       </p:sp>
@@ -1401,7 +1393,7 @@
           <a:p>
             <a:pPr lvl="0"/>
             <a:r>
-              <a:rPr lang="pt-BR" smtClean="0"/>
+              <a:rPr lang="pt-BR"/>
               <a:t>Clique para editar o texto mestre</a:t>
             </a:r>
           </a:p>
@@ -1429,38 +1421,37 @@
           <a:p>
             <a:pPr lvl="0"/>
             <a:r>
-              <a:rPr lang="pt-BR" smtClean="0"/>
+              <a:rPr lang="pt-BR"/>
               <a:t>Clique para editar o texto mestre</a:t>
             </a:r>
           </a:p>
           <a:p>
             <a:pPr lvl="1"/>
             <a:r>
-              <a:rPr lang="pt-BR" smtClean="0"/>
+              <a:rPr lang="pt-BR"/>
               <a:t>Segundo nível</a:t>
             </a:r>
           </a:p>
           <a:p>
             <a:pPr lvl="2"/>
             <a:r>
-              <a:rPr lang="pt-BR" smtClean="0"/>
+              <a:rPr lang="pt-BR"/>
               <a:t>Terceiro nível</a:t>
             </a:r>
           </a:p>
           <a:p>
             <a:pPr lvl="3"/>
             <a:r>
-              <a:rPr lang="pt-BR" smtClean="0"/>
+              <a:rPr lang="pt-BR"/>
               <a:t>Quarto nível</a:t>
             </a:r>
           </a:p>
           <a:p>
             <a:pPr lvl="4"/>
             <a:r>
-              <a:rPr lang="pt-BR" smtClean="0"/>
+              <a:rPr lang="pt-BR"/>
               <a:t>Quinto nível</a:t>
             </a:r>
-            <a:endParaRPr lang="pt-BR"/>
           </a:p>
         </p:txBody>
       </p:sp>
@@ -1523,7 +1514,7 @@
           <a:p>
             <a:pPr lvl="0"/>
             <a:r>
-              <a:rPr lang="pt-BR" smtClean="0"/>
+              <a:rPr lang="pt-BR"/>
               <a:t>Clique para editar o texto mestre</a:t>
             </a:r>
           </a:p>
@@ -1551,38 +1542,37 @@
           <a:p>
             <a:pPr lvl="0"/>
             <a:r>
-              <a:rPr lang="pt-BR" smtClean="0"/>
+              <a:rPr lang="pt-BR"/>
               <a:t>Clique para editar o texto mestre</a:t>
             </a:r>
           </a:p>
           <a:p>
             <a:pPr lvl="1"/>
             <a:r>
-              <a:rPr lang="pt-BR" smtClean="0"/>
+              <a:rPr lang="pt-BR"/>
               <a:t>Segundo nível</a:t>
             </a:r>
           </a:p>
           <a:p>
             <a:pPr lvl="2"/>
             <a:r>
-              <a:rPr lang="pt-BR" smtClean="0"/>
+              <a:rPr lang="pt-BR"/>
               <a:t>Terceiro nível</a:t>
             </a:r>
           </a:p>
           <a:p>
             <a:pPr lvl="3"/>
             <a:r>
-              <a:rPr lang="pt-BR" smtClean="0"/>
+              <a:rPr lang="pt-BR"/>
               <a:t>Quarto nível</a:t>
             </a:r>
           </a:p>
           <a:p>
             <a:pPr lvl="4"/>
             <a:r>
-              <a:rPr lang="pt-BR" smtClean="0"/>
+              <a:rPr lang="pt-BR"/>
               <a:t>Quinto nível</a:t>
             </a:r>
-            <a:endParaRPr lang="pt-BR"/>
           </a:p>
         </p:txBody>
       </p:sp>
@@ -1603,7 +1593,7 @@
           <a:p>
             <a:fld id="{4E198183-1849-47C3-B91A-B1E2FC32FD0B}" type="datetimeFigureOut">
               <a:rPr lang="pt-BR" smtClean="0"/>
-              <a:t>29/03/2019</a:t>
+              <a:t>30/03/2019</a:t>
             </a:fld>
             <a:endParaRPr lang="pt-BR"/>
           </a:p>
@@ -1697,10 +1687,9 @@
           <a:lstStyle/>
           <a:p>
             <a:r>
-              <a:rPr lang="pt-BR" smtClean="0"/>
+              <a:rPr lang="pt-BR"/>
               <a:t>Clique para editar o título mestre</a:t>
             </a:r>
-            <a:endParaRPr lang="pt-BR"/>
           </a:p>
         </p:txBody>
       </p:sp>
@@ -1721,7 +1710,7 @@
           <a:p>
             <a:fld id="{4E198183-1849-47C3-B91A-B1E2FC32FD0B}" type="datetimeFigureOut">
               <a:rPr lang="pt-BR" smtClean="0"/>
-              <a:t>29/03/2019</a:t>
+              <a:t>30/03/2019</a:t>
             </a:fld>
             <a:endParaRPr lang="pt-BR"/>
           </a:p>
@@ -1816,7 +1805,7 @@
           <a:p>
             <a:fld id="{4E198183-1849-47C3-B91A-B1E2FC32FD0B}" type="datetimeFigureOut">
               <a:rPr lang="pt-BR" smtClean="0"/>
-              <a:t>29/03/2019</a:t>
+              <a:t>30/03/2019</a:t>
             </a:fld>
             <a:endParaRPr lang="pt-BR"/>
           </a:p>
@@ -1919,10 +1908,9 @@
           </a:lstStyle>
           <a:p>
             <a:r>
-              <a:rPr lang="pt-BR" smtClean="0"/>
+              <a:rPr lang="pt-BR"/>
               <a:t>Clique para editar o título mestre</a:t>
             </a:r>
-            <a:endParaRPr lang="pt-BR"/>
           </a:p>
         </p:txBody>
       </p:sp>
@@ -1976,38 +1964,37 @@
           <a:p>
             <a:pPr lvl="0"/>
             <a:r>
-              <a:rPr lang="pt-BR" smtClean="0"/>
+              <a:rPr lang="pt-BR"/>
               <a:t>Clique para editar o texto mestre</a:t>
             </a:r>
           </a:p>
           <a:p>
             <a:pPr lvl="1"/>
             <a:r>
-              <a:rPr lang="pt-BR" smtClean="0"/>
+              <a:rPr lang="pt-BR"/>
               <a:t>Segundo nível</a:t>
             </a:r>
           </a:p>
           <a:p>
             <a:pPr lvl="2"/>
             <a:r>
-              <a:rPr lang="pt-BR" smtClean="0"/>
+              <a:rPr lang="pt-BR"/>
               <a:t>Terceiro nível</a:t>
             </a:r>
           </a:p>
           <a:p>
             <a:pPr lvl="3"/>
             <a:r>
-              <a:rPr lang="pt-BR" smtClean="0"/>
+              <a:rPr lang="pt-BR"/>
               <a:t>Quarto nível</a:t>
             </a:r>
           </a:p>
           <a:p>
             <a:pPr lvl="4"/>
             <a:r>
-              <a:rPr lang="pt-BR" smtClean="0"/>
+              <a:rPr lang="pt-BR"/>
               <a:t>Quinto nível</a:t>
             </a:r>
-            <a:endParaRPr lang="pt-BR"/>
           </a:p>
         </p:txBody>
       </p:sp>
@@ -2070,7 +2057,7 @@
           <a:p>
             <a:pPr lvl="0"/>
             <a:r>
-              <a:rPr lang="pt-BR" smtClean="0"/>
+              <a:rPr lang="pt-BR"/>
               <a:t>Clique para editar o texto mestre</a:t>
             </a:r>
           </a:p>
@@ -2093,7 +2080,7 @@
           <a:p>
             <a:fld id="{4E198183-1849-47C3-B91A-B1E2FC32FD0B}" type="datetimeFigureOut">
               <a:rPr lang="pt-BR" smtClean="0"/>
-              <a:t>29/03/2019</a:t>
+              <a:t>30/03/2019</a:t>
             </a:fld>
             <a:endParaRPr lang="pt-BR"/>
           </a:p>
@@ -2196,10 +2183,9 @@
           </a:lstStyle>
           <a:p>
             <a:r>
-              <a:rPr lang="pt-BR" smtClean="0"/>
+              <a:rPr lang="pt-BR"/>
               <a:t>Clique para editar o título mestre</a:t>
             </a:r>
-            <a:endParaRPr lang="pt-BR"/>
           </a:p>
         </p:txBody>
       </p:sp>
@@ -2323,7 +2309,7 @@
           <a:p>
             <a:pPr lvl="0"/>
             <a:r>
-              <a:rPr lang="pt-BR" smtClean="0"/>
+              <a:rPr lang="pt-BR"/>
               <a:t>Clique para editar o texto mestre</a:t>
             </a:r>
           </a:p>
@@ -2346,7 +2332,7 @@
           <a:p>
             <a:fld id="{4E198183-1849-47C3-B91A-B1E2FC32FD0B}" type="datetimeFigureOut">
               <a:rPr lang="pt-BR" smtClean="0"/>
-              <a:t>29/03/2019</a:t>
+              <a:t>30/03/2019</a:t>
             </a:fld>
             <a:endParaRPr lang="pt-BR"/>
           </a:p>
@@ -2455,10 +2441,9 @@
           <a:lstStyle/>
           <a:p>
             <a:r>
-              <a:rPr lang="pt-BR" smtClean="0"/>
+              <a:rPr lang="pt-BR"/>
               <a:t>Clique para editar o título mestre</a:t>
             </a:r>
-            <a:endParaRPr lang="pt-BR"/>
           </a:p>
         </p:txBody>
       </p:sp>
@@ -2489,38 +2474,37 @@
           <a:p>
             <a:pPr lvl="0"/>
             <a:r>
-              <a:rPr lang="pt-BR" smtClean="0"/>
+              <a:rPr lang="pt-BR"/>
               <a:t>Clique para editar o texto mestre</a:t>
             </a:r>
           </a:p>
           <a:p>
             <a:pPr lvl="1"/>
             <a:r>
-              <a:rPr lang="pt-BR" smtClean="0"/>
+              <a:rPr lang="pt-BR"/>
               <a:t>Segundo nível</a:t>
             </a:r>
           </a:p>
           <a:p>
             <a:pPr lvl="2"/>
             <a:r>
-              <a:rPr lang="pt-BR" smtClean="0"/>
+              <a:rPr lang="pt-BR"/>
               <a:t>Terceiro nível</a:t>
             </a:r>
           </a:p>
           <a:p>
             <a:pPr lvl="3"/>
             <a:r>
-              <a:rPr lang="pt-BR" smtClean="0"/>
+              <a:rPr lang="pt-BR"/>
               <a:t>Quarto nível</a:t>
             </a:r>
           </a:p>
           <a:p>
             <a:pPr lvl="4"/>
             <a:r>
-              <a:rPr lang="pt-BR" smtClean="0"/>
+              <a:rPr lang="pt-BR"/>
               <a:t>Quinto nível</a:t>
             </a:r>
-            <a:endParaRPr lang="pt-BR"/>
           </a:p>
         </p:txBody>
       </p:sp>
@@ -2559,7 +2543,7 @@
           <a:p>
             <a:fld id="{4E198183-1849-47C3-B91A-B1E2FC32FD0B}" type="datetimeFigureOut">
               <a:rPr lang="pt-BR" smtClean="0"/>
-              <a:t>29/03/2019</a:t>
+              <a:t>30/03/2019</a:t>
             </a:fld>
             <a:endParaRPr lang="pt-BR"/>
           </a:p>
@@ -3001,10 +2985,9 @@
           <a:p>
             <a:pPr algn="ctr"/>
             <a:r>
-              <a:rPr lang="pt-BR" dirty="0" smtClean="0"/>
+              <a:rPr lang="pt-BR" dirty="0"/>
               <a:t>VANT</a:t>
             </a:r>
-            <a:endParaRPr lang="pt-BR" dirty="0"/>
           </a:p>
         </p:txBody>
       </p:sp>
@@ -3045,10 +3028,9 @@
           <a:p>
             <a:pPr algn="ctr"/>
             <a:r>
-              <a:rPr lang="pt-BR" dirty="0" smtClean="0"/>
+              <a:rPr lang="pt-BR" dirty="0"/>
               <a:t>RC</a:t>
             </a:r>
-            <a:endParaRPr lang="pt-BR" dirty="0"/>
           </a:p>
         </p:txBody>
       </p:sp>
@@ -3089,10 +3071,9 @@
           <a:p>
             <a:pPr algn="ctr"/>
             <a:r>
-              <a:rPr lang="pt-BR" dirty="0" smtClean="0"/>
+              <a:rPr lang="pt-BR" dirty="0"/>
               <a:t>Gerenciador de Voo</a:t>
             </a:r>
-            <a:endParaRPr lang="pt-BR" dirty="0"/>
           </a:p>
         </p:txBody>
       </p:sp>
@@ -3133,10 +3114,9 @@
           <a:p>
             <a:pPr algn="ctr"/>
             <a:r>
-              <a:rPr lang="pt-BR" dirty="0" smtClean="0"/>
+              <a:rPr lang="pt-BR" dirty="0"/>
               <a:t>ESTAÇÃO DE COMANDO</a:t>
             </a:r>
-            <a:endParaRPr lang="pt-BR" dirty="0"/>
           </a:p>
         </p:txBody>
       </p:sp>
@@ -3167,7 +3147,7 @@
               <a:buChar char="•"/>
             </a:pPr>
             <a:r>
-              <a:rPr lang="pt-BR" dirty="0" smtClean="0"/>
+              <a:rPr lang="pt-BR" dirty="0"/>
               <a:t>Controlador de voo</a:t>
             </a:r>
           </a:p>
@@ -3177,7 +3157,7 @@
               <a:buChar char="•"/>
             </a:pPr>
             <a:r>
-              <a:rPr lang="pt-BR" dirty="0" smtClean="0"/>
+              <a:rPr lang="pt-BR" dirty="0"/>
               <a:t>Controlador de execução de trajetória</a:t>
             </a:r>
           </a:p>
@@ -3187,7 +3167,7 @@
               <a:buChar char="•"/>
             </a:pPr>
             <a:r>
-              <a:rPr lang="pt-BR" dirty="0" smtClean="0"/>
+              <a:rPr lang="pt-BR" dirty="0"/>
               <a:t>IMU e GPS</a:t>
             </a:r>
           </a:p>
@@ -3197,10 +3177,9 @@
               <a:buChar char="•"/>
             </a:pPr>
             <a:r>
-              <a:rPr lang="pt-BR" dirty="0" smtClean="0"/>
+              <a:rPr lang="pt-BR" dirty="0"/>
               <a:t>Fotos</a:t>
             </a:r>
-            <a:endParaRPr lang="pt-BR" dirty="0"/>
           </a:p>
         </p:txBody>
       </p:sp>
@@ -3504,10 +3483,9 @@
               <a:buChar char="•"/>
             </a:pPr>
             <a:r>
-              <a:rPr lang="pt-BR" dirty="0" smtClean="0"/>
+              <a:rPr lang="pt-BR" dirty="0"/>
               <a:t>Comunicação proprietária</a:t>
             </a:r>
-            <a:endParaRPr lang="pt-BR" dirty="0"/>
           </a:p>
         </p:txBody>
       </p:sp>
@@ -3576,7 +3554,7 @@
               <a:buChar char="•"/>
             </a:pPr>
             <a:r>
-              <a:rPr lang="pt-BR" dirty="0" smtClean="0"/>
+              <a:rPr lang="pt-BR" dirty="0"/>
               <a:t>Controle Manual</a:t>
             </a:r>
           </a:p>
@@ -3586,10 +3564,10 @@
               <a:buChar char="•"/>
             </a:pPr>
             <a:r>
-              <a:rPr lang="pt-BR" dirty="0" err="1" smtClean="0"/>
+              <a:rPr lang="pt-BR" dirty="0" err="1"/>
               <a:t>Takeoff</a:t>
             </a:r>
-            <a:endParaRPr lang="pt-BR" dirty="0" smtClean="0"/>
+            <a:endParaRPr lang="pt-BR" dirty="0"/>
           </a:p>
           <a:p>
             <a:pPr marL="285750" indent="-285750">
@@ -3597,7 +3575,7 @@
               <a:buChar char="•"/>
             </a:pPr>
             <a:r>
-              <a:rPr lang="pt-BR" dirty="0" err="1" smtClean="0"/>
+              <a:rPr lang="pt-BR" dirty="0" err="1"/>
               <a:t>Landing</a:t>
             </a:r>
             <a:endParaRPr lang="pt-BR" dirty="0"/>
@@ -3743,7 +3721,7 @@
               <a:buChar char="•"/>
             </a:pPr>
             <a:r>
-              <a:rPr lang="pt-BR" dirty="0" smtClean="0"/>
+              <a:rPr lang="pt-BR" dirty="0"/>
               <a:t>Escreve posição e orientação</a:t>
             </a:r>
           </a:p>
@@ -3753,7 +3731,7 @@
               <a:buChar char="•"/>
             </a:pPr>
             <a:r>
-              <a:rPr lang="pt-BR" dirty="0" smtClean="0"/>
+              <a:rPr lang="pt-BR" dirty="0"/>
               <a:t>Recebe orientação e posição</a:t>
             </a:r>
           </a:p>
@@ -3763,12 +3741,12 @@
               <a:buChar char="•"/>
             </a:pPr>
             <a:r>
-              <a:rPr lang="pt-BR" dirty="0" smtClean="0"/>
+              <a:rPr lang="pt-BR" dirty="0"/>
               <a:t>Simulador de controlador de voo</a:t>
             </a:r>
           </a:p>
           <a:p>
-            <a:endParaRPr lang="pt-BR" dirty="0" smtClean="0"/>
+            <a:endParaRPr lang="pt-BR" dirty="0"/>
           </a:p>
           <a:p>
             <a:pPr marL="285750" indent="-285750">
@@ -3862,7 +3840,7 @@
         <p:spPr>
           <a:xfrm>
             <a:off x="9340204" y="4734038"/>
-            <a:ext cx="2364116" cy="1477328"/>
+            <a:ext cx="2364116" cy="2031325"/>
           </a:xfrm>
           <a:prstGeom prst="rect">
             <a:avLst/>
@@ -3880,7 +3858,7 @@
               <a:buChar char="•"/>
             </a:pPr>
             <a:r>
-              <a:rPr lang="pt-BR" dirty="0" smtClean="0"/>
+              <a:rPr lang="pt-BR" dirty="0"/>
               <a:t>Visão 3D</a:t>
             </a:r>
           </a:p>
@@ -3890,7 +3868,7 @@
               <a:buChar char="•"/>
             </a:pPr>
             <a:r>
-              <a:rPr lang="pt-BR" dirty="0" smtClean="0"/>
+              <a:rPr lang="pt-BR" dirty="0"/>
               <a:t>Path planning</a:t>
             </a:r>
           </a:p>
@@ -3900,7 +3878,7 @@
               <a:buChar char="•"/>
             </a:pPr>
             <a:r>
-              <a:rPr lang="pt-BR" dirty="0" smtClean="0"/>
+              <a:rPr lang="pt-BR" dirty="0"/>
               <a:t>Rotas Adaptativas</a:t>
             </a:r>
           </a:p>
@@ -3910,8 +3888,18 @@
               <a:buChar char="•"/>
             </a:pPr>
             <a:r>
-              <a:rPr lang="pt-BR" dirty="0" smtClean="0"/>
+              <a:rPr lang="pt-BR" dirty="0"/>
               <a:t>Simulação</a:t>
+            </a:r>
+          </a:p>
+          <a:p>
+            <a:pPr marL="285750" indent="-285750">
+              <a:buFont typeface="Arial" panose="020B0604020202020204" pitchFamily="34" charset="0"/>
+              <a:buChar char="•"/>
+            </a:pPr>
+            <a:r>
+              <a:rPr lang="pt-BR" dirty="0"/>
+              <a:t>Gerenciador de módulos</a:t>
             </a:r>
           </a:p>
           <a:p>
@@ -3936,6 +3924,97 @@
           <a:xfrm rot="16200000" flipH="1">
             <a:off x="8481487" y="4758573"/>
             <a:ext cx="852587" cy="420189"/>
+          </a:xfrm>
+          <a:prstGeom prst="bentConnector2">
+            <a:avLst/>
+          </a:prstGeom>
+          <a:ln>
+            <a:tailEnd type="triangle"/>
+          </a:ln>
+        </p:spPr>
+        <p:style>
+          <a:lnRef idx="1">
+            <a:schemeClr val="accent1"/>
+          </a:lnRef>
+          <a:fillRef idx="0">
+            <a:schemeClr val="accent1"/>
+          </a:fillRef>
+          <a:effectRef idx="0">
+            <a:schemeClr val="accent1"/>
+          </a:effectRef>
+          <a:fontRef idx="minor">
+            <a:schemeClr val="tx1"/>
+          </a:fontRef>
+        </p:style>
+      </p:cxnSp>
+      <p:sp>
+        <p:nvSpPr>
+          <p:cNvPr id="2" name="Elipse 1">
+            <a:extLst>
+              <a:ext uri="{FF2B5EF4-FFF2-40B4-BE49-F238E27FC236}">
+                <a16:creationId xmlns:a16="http://schemas.microsoft.com/office/drawing/2014/main" id="{71B6F9EF-9A70-41A5-83B7-D18BC1AE6D06}"/>
+              </a:ext>
+            </a:extLst>
+          </p:cNvPr>
+          <p:cNvSpPr/>
+          <p:nvPr/>
+        </p:nvSpPr>
+        <p:spPr>
+          <a:xfrm>
+            <a:off x="9565771" y="1834413"/>
+            <a:ext cx="1912981" cy="914401"/>
+          </a:xfrm>
+          <a:prstGeom prst="ellipse">
+            <a:avLst/>
+          </a:prstGeom>
+        </p:spPr>
+        <p:style>
+          <a:lnRef idx="2">
+            <a:schemeClr val="accent1">
+              <a:shade val="50000"/>
+            </a:schemeClr>
+          </a:lnRef>
+          <a:fillRef idx="1">
+            <a:schemeClr val="accent1"/>
+          </a:fillRef>
+          <a:effectRef idx="0">
+            <a:schemeClr val="accent1"/>
+          </a:effectRef>
+          <a:fontRef idx="minor">
+            <a:schemeClr val="lt1"/>
+          </a:fontRef>
+        </p:style>
+        <p:txBody>
+          <a:bodyPr rtlCol="0" anchor="ctr"/>
+          <a:lstStyle/>
+          <a:p>
+            <a:pPr algn="just"/>
+            <a:r>
+              <a:rPr lang="pt-BR" dirty="0"/>
+              <a:t>Gerenciador de módulos</a:t>
+            </a:r>
+          </a:p>
+        </p:txBody>
+      </p:sp>
+      <p:cxnSp>
+        <p:nvCxnSpPr>
+          <p:cNvPr id="7" name="Conector: Angulado 6">
+            <a:extLst>
+              <a:ext uri="{FF2B5EF4-FFF2-40B4-BE49-F238E27FC236}">
+                <a16:creationId xmlns:a16="http://schemas.microsoft.com/office/drawing/2014/main" id="{6D1A9B98-4B2D-4CFE-8037-FDA068D708D3}"/>
+              </a:ext>
+            </a:extLst>
+          </p:cNvPr>
+          <p:cNvCxnSpPr>
+            <a:stCxn id="9" idx="0"/>
+            <a:endCxn id="2" idx="2"/>
+          </p:cNvCxnSpPr>
+          <p:nvPr/>
+        </p:nvCxnSpPr>
+        <p:spPr>
+          <a:xfrm rot="5400000" flipH="1" flipV="1">
+            <a:off x="8463548" y="2525753"/>
+            <a:ext cx="1336361" cy="868085"/>
           </a:xfrm>
           <a:prstGeom prst="bentConnector2">
             <a:avLst/>

</xml_diff>

<commit_message>
adicionado esqueleto de desenvolvimento do capítulo 4
</commit_message>
<xml_diff>
--- a/doc/diagramas/conceitual/Conceitual.pptx
+++ b/doc/diagramas/conceitual/Conceitual.pptx
@@ -241,7 +241,7 @@
           <a:p>
             <a:fld id="{4E198183-1849-47C3-B91A-B1E2FC32FD0B}" type="datetimeFigureOut">
               <a:rPr lang="pt-BR" smtClean="0"/>
-              <a:t>30/03/2019</a:t>
+              <a:t>05/05/2019</a:t>
             </a:fld>
             <a:endParaRPr lang="pt-BR"/>
           </a:p>
@@ -409,7 +409,7 @@
           <a:p>
             <a:fld id="{4E198183-1849-47C3-B91A-B1E2FC32FD0B}" type="datetimeFigureOut">
               <a:rPr lang="pt-BR" smtClean="0"/>
-              <a:t>30/03/2019</a:t>
+              <a:t>05/05/2019</a:t>
             </a:fld>
             <a:endParaRPr lang="pt-BR"/>
           </a:p>
@@ -587,7 +587,7 @@
           <a:p>
             <a:fld id="{4E198183-1849-47C3-B91A-B1E2FC32FD0B}" type="datetimeFigureOut">
               <a:rPr lang="pt-BR" smtClean="0"/>
-              <a:t>30/03/2019</a:t>
+              <a:t>05/05/2019</a:t>
             </a:fld>
             <a:endParaRPr lang="pt-BR"/>
           </a:p>
@@ -755,7 +755,7 @@
           <a:p>
             <a:fld id="{4E198183-1849-47C3-B91A-B1E2FC32FD0B}" type="datetimeFigureOut">
               <a:rPr lang="pt-BR" smtClean="0"/>
-              <a:t>30/03/2019</a:t>
+              <a:t>05/05/2019</a:t>
             </a:fld>
             <a:endParaRPr lang="pt-BR"/>
           </a:p>
@@ -1000,7 +1000,7 @@
           <a:p>
             <a:fld id="{4E198183-1849-47C3-B91A-B1E2FC32FD0B}" type="datetimeFigureOut">
               <a:rPr lang="pt-BR" smtClean="0"/>
-              <a:t>30/03/2019</a:t>
+              <a:t>05/05/2019</a:t>
             </a:fld>
             <a:endParaRPr lang="pt-BR"/>
           </a:p>
@@ -1229,7 +1229,7 @@
           <a:p>
             <a:fld id="{4E198183-1849-47C3-B91A-B1E2FC32FD0B}" type="datetimeFigureOut">
               <a:rPr lang="pt-BR" smtClean="0"/>
-              <a:t>30/03/2019</a:t>
+              <a:t>05/05/2019</a:t>
             </a:fld>
             <a:endParaRPr lang="pt-BR"/>
           </a:p>
@@ -1593,7 +1593,7 @@
           <a:p>
             <a:fld id="{4E198183-1849-47C3-B91A-B1E2FC32FD0B}" type="datetimeFigureOut">
               <a:rPr lang="pt-BR" smtClean="0"/>
-              <a:t>30/03/2019</a:t>
+              <a:t>05/05/2019</a:t>
             </a:fld>
             <a:endParaRPr lang="pt-BR"/>
           </a:p>
@@ -1710,7 +1710,7 @@
           <a:p>
             <a:fld id="{4E198183-1849-47C3-B91A-B1E2FC32FD0B}" type="datetimeFigureOut">
               <a:rPr lang="pt-BR" smtClean="0"/>
-              <a:t>30/03/2019</a:t>
+              <a:t>05/05/2019</a:t>
             </a:fld>
             <a:endParaRPr lang="pt-BR"/>
           </a:p>
@@ -1805,7 +1805,7 @@
           <a:p>
             <a:fld id="{4E198183-1849-47C3-B91A-B1E2FC32FD0B}" type="datetimeFigureOut">
               <a:rPr lang="pt-BR" smtClean="0"/>
-              <a:t>30/03/2019</a:t>
+              <a:t>05/05/2019</a:t>
             </a:fld>
             <a:endParaRPr lang="pt-BR"/>
           </a:p>
@@ -2080,7 +2080,7 @@
           <a:p>
             <a:fld id="{4E198183-1849-47C3-B91A-B1E2FC32FD0B}" type="datetimeFigureOut">
               <a:rPr lang="pt-BR" smtClean="0"/>
-              <a:t>30/03/2019</a:t>
+              <a:t>05/05/2019</a:t>
             </a:fld>
             <a:endParaRPr lang="pt-BR"/>
           </a:p>
@@ -2332,7 +2332,7 @@
           <a:p>
             <a:fld id="{4E198183-1849-47C3-B91A-B1E2FC32FD0B}" type="datetimeFigureOut">
               <a:rPr lang="pt-BR" smtClean="0"/>
-              <a:t>30/03/2019</a:t>
+              <a:t>05/05/2019</a:t>
             </a:fld>
             <a:endParaRPr lang="pt-BR"/>
           </a:p>
@@ -2543,7 +2543,7 @@
           <a:p>
             <a:fld id="{4E198183-1849-47C3-B91A-B1E2FC32FD0B}" type="datetimeFigureOut">
               <a:rPr lang="pt-BR" smtClean="0"/>
-              <a:t>30/03/2019</a:t>
+              <a:t>05/05/2019</a:t>
             </a:fld>
             <a:endParaRPr lang="pt-BR"/>
           </a:p>
@@ -2962,6 +2962,9 @@
           <a:prstGeom prst="rect">
             <a:avLst/>
           </a:prstGeom>
+          <a:solidFill>
+            <a:srgbClr val="FFC000"/>
+          </a:solidFill>
         </p:spPr>
         <p:style>
           <a:lnRef idx="2">
@@ -3005,6 +3008,9 @@
           <a:prstGeom prst="rect">
             <a:avLst/>
           </a:prstGeom>
+          <a:solidFill>
+            <a:srgbClr val="FFC000"/>
+          </a:solidFill>
         </p:spPr>
         <p:style>
           <a:lnRef idx="2">
@@ -3048,6 +3054,9 @@
           <a:prstGeom prst="ellipse">
             <a:avLst/>
           </a:prstGeom>
+          <a:solidFill>
+            <a:schemeClr val="accent6"/>
+          </a:solidFill>
         </p:spPr>
         <p:style>
           <a:lnRef idx="2">
@@ -3091,6 +3100,9 @@
           <a:prstGeom prst="rect">
             <a:avLst/>
           </a:prstGeom>
+          <a:solidFill>
+            <a:srgbClr val="FFC000"/>
+          </a:solidFill>
         </p:spPr>
         <p:style>
           <a:lnRef idx="2">
@@ -3129,7 +3141,7 @@
         <p:spPr>
           <a:xfrm>
             <a:off x="2623718" y="456530"/>
-            <a:ext cx="4027193" cy="1200329"/>
+            <a:ext cx="2612139" cy="1477328"/>
           </a:xfrm>
           <a:prstGeom prst="rect">
             <a:avLst/>
@@ -3137,7 +3149,7 @@
           <a:noFill/>
         </p:spPr>
         <p:txBody>
-          <a:bodyPr wrap="none" rtlCol="0">
+          <a:bodyPr wrap="square" rtlCol="0">
             <a:spAutoFit/>
           </a:bodyPr>
           <a:lstStyle/>
@@ -3426,7 +3438,7 @@
         </p:nvSpPr>
         <p:spPr>
           <a:xfrm>
-            <a:off x="2055222" y="2391877"/>
+            <a:off x="1656395" y="2403522"/>
             <a:ext cx="235132" cy="390253"/>
           </a:xfrm>
           <a:prstGeom prst="leftBrace">
@@ -3464,7 +3476,7 @@
         </p:nvSpPr>
         <p:spPr>
           <a:xfrm>
-            <a:off x="2290354" y="2401153"/>
+            <a:off x="1891527" y="2412798"/>
             <a:ext cx="3648892" cy="369332"/>
           </a:xfrm>
           <a:prstGeom prst="rect">
@@ -3961,12 +3973,15 @@
         </p:nvSpPr>
         <p:spPr>
           <a:xfrm>
-            <a:off x="9565771" y="1834413"/>
+            <a:off x="7741195" y="1934676"/>
             <a:ext cx="1912981" cy="914401"/>
           </a:xfrm>
           <a:prstGeom prst="ellipse">
             <a:avLst/>
           </a:prstGeom>
+          <a:solidFill>
+            <a:schemeClr val="accent6"/>
+          </a:solidFill>
         </p:spPr>
         <p:style>
           <a:lnRef idx="2">
@@ -3996,30 +4011,590 @@
           </a:p>
         </p:txBody>
       </p:sp>
+      <p:sp>
+        <p:nvSpPr>
+          <p:cNvPr id="27" name="Elipse 26">
+            <a:extLst>
+              <a:ext uri="{FF2B5EF4-FFF2-40B4-BE49-F238E27FC236}">
+                <a16:creationId xmlns:a16="http://schemas.microsoft.com/office/drawing/2014/main" id="{BA8D2E14-7616-4A27-8EF4-049D69493936}"/>
+              </a:ext>
+            </a:extLst>
+          </p:cNvPr>
+          <p:cNvSpPr/>
+          <p:nvPr/>
+        </p:nvSpPr>
+        <p:spPr>
+          <a:xfrm>
+            <a:off x="10038683" y="348126"/>
+            <a:ext cx="1912981" cy="914401"/>
+          </a:xfrm>
+          <a:prstGeom prst="ellipse">
+            <a:avLst/>
+          </a:prstGeom>
+          <a:solidFill>
+            <a:schemeClr val="accent6"/>
+          </a:solidFill>
+        </p:spPr>
+        <p:style>
+          <a:lnRef idx="2">
+            <a:schemeClr val="accent1">
+              <a:shade val="50000"/>
+            </a:schemeClr>
+          </a:lnRef>
+          <a:fillRef idx="1">
+            <a:schemeClr val="accent1"/>
+          </a:fillRef>
+          <a:effectRef idx="0">
+            <a:schemeClr val="accent1"/>
+          </a:effectRef>
+          <a:fontRef idx="minor">
+            <a:schemeClr val="lt1"/>
+          </a:fontRef>
+        </p:style>
+        <p:txBody>
+          <a:bodyPr rtlCol="0" anchor="ctr"/>
+          <a:lstStyle/>
+          <a:p>
+            <a:pPr algn="ctr"/>
+            <a:r>
+              <a:rPr lang="pt-BR" dirty="0"/>
+              <a:t>Atualizador de mapa</a:t>
+            </a:r>
+          </a:p>
+        </p:txBody>
+      </p:sp>
+      <p:sp>
+        <p:nvSpPr>
+          <p:cNvPr id="28" name="Elipse 27">
+            <a:extLst>
+              <a:ext uri="{FF2B5EF4-FFF2-40B4-BE49-F238E27FC236}">
+                <a16:creationId xmlns:a16="http://schemas.microsoft.com/office/drawing/2014/main" id="{8D7634C4-6B52-4729-964F-6938FFCD8DB5}"/>
+              </a:ext>
+            </a:extLst>
+          </p:cNvPr>
+          <p:cNvSpPr/>
+          <p:nvPr/>
+        </p:nvSpPr>
+        <p:spPr>
+          <a:xfrm>
+            <a:off x="7747545" y="349743"/>
+            <a:ext cx="1912981" cy="914401"/>
+          </a:xfrm>
+          <a:prstGeom prst="ellipse">
+            <a:avLst/>
+          </a:prstGeom>
+          <a:solidFill>
+            <a:schemeClr val="accent6"/>
+          </a:solidFill>
+        </p:spPr>
+        <p:style>
+          <a:lnRef idx="2">
+            <a:schemeClr val="accent1">
+              <a:shade val="50000"/>
+            </a:schemeClr>
+          </a:lnRef>
+          <a:fillRef idx="1">
+            <a:schemeClr val="accent1"/>
+          </a:fillRef>
+          <a:effectRef idx="0">
+            <a:schemeClr val="accent1"/>
+          </a:effectRef>
+          <a:fontRef idx="minor">
+            <a:schemeClr val="lt1"/>
+          </a:fontRef>
+        </p:style>
+        <p:txBody>
+          <a:bodyPr rtlCol="0" anchor="ctr"/>
+          <a:lstStyle/>
+          <a:p>
+            <a:pPr algn="ctr"/>
+            <a:r>
+              <a:rPr lang="pt-BR" dirty="0"/>
+              <a:t>Aquisição de pontos</a:t>
+            </a:r>
+          </a:p>
+        </p:txBody>
+      </p:sp>
+      <p:sp>
+        <p:nvSpPr>
+          <p:cNvPr id="29" name="Elipse 28">
+            <a:extLst>
+              <a:ext uri="{FF2B5EF4-FFF2-40B4-BE49-F238E27FC236}">
+                <a16:creationId xmlns:a16="http://schemas.microsoft.com/office/drawing/2014/main" id="{743D010C-5F6D-4DC1-890A-E9695FA4A132}"/>
+              </a:ext>
+            </a:extLst>
+          </p:cNvPr>
+          <p:cNvSpPr/>
+          <p:nvPr/>
+        </p:nvSpPr>
+        <p:spPr>
+          <a:xfrm>
+            <a:off x="10136778" y="1937179"/>
+            <a:ext cx="1912981" cy="914401"/>
+          </a:xfrm>
+          <a:prstGeom prst="ellipse">
+            <a:avLst/>
+          </a:prstGeom>
+          <a:solidFill>
+            <a:schemeClr val="accent6"/>
+          </a:solidFill>
+        </p:spPr>
+        <p:style>
+          <a:lnRef idx="2">
+            <a:schemeClr val="accent1">
+              <a:shade val="50000"/>
+            </a:schemeClr>
+          </a:lnRef>
+          <a:fillRef idx="1">
+            <a:schemeClr val="accent1"/>
+          </a:fillRef>
+          <a:effectRef idx="0">
+            <a:schemeClr val="accent1"/>
+          </a:effectRef>
+          <a:fontRef idx="minor">
+            <a:schemeClr val="lt1"/>
+          </a:fontRef>
+        </p:style>
+        <p:txBody>
+          <a:bodyPr rtlCol="0" anchor="ctr"/>
+          <a:lstStyle/>
+          <a:p>
+            <a:pPr algn="ctr"/>
+            <a:r>
+              <a:rPr lang="pt-BR" dirty="0"/>
+              <a:t>Executor de rotas</a:t>
+            </a:r>
+          </a:p>
+        </p:txBody>
+      </p:sp>
+      <p:sp>
+        <p:nvSpPr>
+          <p:cNvPr id="32" name="Chave esquerda 19">
+            <a:extLst>
+              <a:ext uri="{FF2B5EF4-FFF2-40B4-BE49-F238E27FC236}">
+                <a16:creationId xmlns:a16="http://schemas.microsoft.com/office/drawing/2014/main" id="{44161470-5167-4DF4-83BE-CFC6A7E0F564}"/>
+              </a:ext>
+            </a:extLst>
+          </p:cNvPr>
+          <p:cNvSpPr/>
+          <p:nvPr/>
+        </p:nvSpPr>
+        <p:spPr>
+          <a:xfrm rot="16200000">
+            <a:off x="6392322" y="3526592"/>
+            <a:ext cx="235132" cy="390253"/>
+          </a:xfrm>
+          <a:prstGeom prst="leftBrace">
+            <a:avLst/>
+          </a:prstGeom>
+        </p:spPr>
+        <p:style>
+          <a:lnRef idx="1">
+            <a:schemeClr val="accent1"/>
+          </a:lnRef>
+          <a:fillRef idx="0">
+            <a:schemeClr val="accent1"/>
+          </a:fillRef>
+          <a:effectRef idx="0">
+            <a:schemeClr val="accent1"/>
+          </a:effectRef>
+          <a:fontRef idx="minor">
+            <a:schemeClr val="tx1"/>
+          </a:fontRef>
+        </p:style>
+        <p:txBody>
+          <a:bodyPr rtlCol="0" anchor="ctr"/>
+          <a:lstStyle/>
+          <a:p>
+            <a:pPr algn="ctr"/>
+            <a:endParaRPr lang="pt-BR"/>
+          </a:p>
+        </p:txBody>
+      </p:sp>
+      <p:sp>
+        <p:nvSpPr>
+          <p:cNvPr id="33" name="CaixaDeTexto 32">
+            <a:extLst>
+              <a:ext uri="{FF2B5EF4-FFF2-40B4-BE49-F238E27FC236}">
+                <a16:creationId xmlns:a16="http://schemas.microsoft.com/office/drawing/2014/main" id="{C16E10F4-1F46-4E5E-97B4-68C22B3B074A}"/>
+              </a:ext>
+            </a:extLst>
+          </p:cNvPr>
+          <p:cNvSpPr txBox="1"/>
+          <p:nvPr/>
+        </p:nvSpPr>
+        <p:spPr>
+          <a:xfrm>
+            <a:off x="4860273" y="3137250"/>
+            <a:ext cx="3648892" cy="369332"/>
+          </a:xfrm>
+          <a:prstGeom prst="rect">
+            <a:avLst/>
+          </a:prstGeom>
+          <a:noFill/>
+        </p:spPr>
+        <p:txBody>
+          <a:bodyPr wrap="square" rtlCol="0">
+            <a:spAutoFit/>
+          </a:bodyPr>
+          <a:lstStyle/>
+          <a:p>
+            <a:pPr marL="285750" indent="-285750">
+              <a:buFont typeface="Arial" panose="020B0604020202020204" pitchFamily="34" charset="0"/>
+              <a:buChar char="•"/>
+            </a:pPr>
+            <a:r>
+              <a:rPr lang="pt-BR" dirty="0"/>
+              <a:t>Comunicação proprietária</a:t>
+            </a:r>
+          </a:p>
+        </p:txBody>
+      </p:sp>
       <p:cxnSp>
         <p:nvCxnSpPr>
-          <p:cNvPr id="7" name="Conector: Angulado 6">
+          <p:cNvPr id="50" name="Conector: Angulado 49">
             <a:extLst>
               <a:ext uri="{FF2B5EF4-FFF2-40B4-BE49-F238E27FC236}">
-                <a16:creationId xmlns:a16="http://schemas.microsoft.com/office/drawing/2014/main" id="{6D1A9B98-4B2D-4CFE-8037-FDA068D708D3}"/>
+                <a16:creationId xmlns:a16="http://schemas.microsoft.com/office/drawing/2014/main" id="{7BA99CC8-4A36-4F90-9666-0E2D9CDC06EC}"/>
               </a:ext>
             </a:extLst>
           </p:cNvPr>
           <p:cNvCxnSpPr>
-            <a:stCxn id="9" idx="0"/>
-            <a:endCxn id="2" idx="2"/>
+            <a:cxnSpLocks/>
+            <a:stCxn id="2" idx="7"/>
+            <a:endCxn id="27" idx="3"/>
           </p:cNvCxnSpPr>
           <p:nvPr/>
         </p:nvCxnSpPr>
         <p:spPr>
           <a:xfrm rot="5400000" flipH="1" flipV="1">
-            <a:off x="8463548" y="2525753"/>
-            <a:ext cx="1336361" cy="868085"/>
-          </a:xfrm>
-          <a:prstGeom prst="bentConnector2">
+            <a:off x="9376444" y="1126199"/>
+            <a:ext cx="939971" cy="944807"/>
+          </a:xfrm>
+          <a:prstGeom prst="bentConnector3">
             <a:avLst/>
           </a:prstGeom>
           <a:ln>
+            <a:headEnd type="triangle"/>
+            <a:tailEnd type="triangle"/>
+          </a:ln>
+        </p:spPr>
+        <p:style>
+          <a:lnRef idx="1">
+            <a:schemeClr val="accent1"/>
+          </a:lnRef>
+          <a:fillRef idx="0">
+            <a:schemeClr val="accent1"/>
+          </a:fillRef>
+          <a:effectRef idx="0">
+            <a:schemeClr val="accent1"/>
+          </a:effectRef>
+          <a:fontRef idx="minor">
+            <a:schemeClr val="tx1"/>
+          </a:fontRef>
+        </p:style>
+      </p:cxnSp>
+      <p:cxnSp>
+        <p:nvCxnSpPr>
+          <p:cNvPr id="53" name="Conector de Seta Reta 52">
+            <a:extLst>
+              <a:ext uri="{FF2B5EF4-FFF2-40B4-BE49-F238E27FC236}">
+                <a16:creationId xmlns:a16="http://schemas.microsoft.com/office/drawing/2014/main" id="{0D32E73A-7A15-4671-8D42-E923FDD97C95}"/>
+              </a:ext>
+            </a:extLst>
+          </p:cNvPr>
+          <p:cNvCxnSpPr>
+            <a:stCxn id="2" idx="6"/>
+            <a:endCxn id="29" idx="2"/>
+          </p:cNvCxnSpPr>
+          <p:nvPr/>
+        </p:nvCxnSpPr>
+        <p:spPr>
+          <a:xfrm>
+            <a:off x="9654176" y="2391877"/>
+            <a:ext cx="482602" cy="2503"/>
+          </a:xfrm>
+          <a:prstGeom prst="straightConnector1">
+            <a:avLst/>
+          </a:prstGeom>
+          <a:ln>
+            <a:headEnd type="triangle"/>
+            <a:tailEnd type="triangle"/>
+          </a:ln>
+        </p:spPr>
+        <p:style>
+          <a:lnRef idx="1">
+            <a:schemeClr val="accent1"/>
+          </a:lnRef>
+          <a:fillRef idx="0">
+            <a:schemeClr val="accent1"/>
+          </a:fillRef>
+          <a:effectRef idx="0">
+            <a:schemeClr val="accent1"/>
+          </a:effectRef>
+          <a:fontRef idx="minor">
+            <a:schemeClr val="tx1"/>
+          </a:fontRef>
+        </p:style>
+      </p:cxnSp>
+      <p:cxnSp>
+        <p:nvCxnSpPr>
+          <p:cNvPr id="55" name="Conector de Seta Reta 54">
+            <a:extLst>
+              <a:ext uri="{FF2B5EF4-FFF2-40B4-BE49-F238E27FC236}">
+                <a16:creationId xmlns:a16="http://schemas.microsoft.com/office/drawing/2014/main" id="{C4680F0C-A325-4A5A-A710-746FFBD7B7D0}"/>
+              </a:ext>
+            </a:extLst>
+          </p:cNvPr>
+          <p:cNvCxnSpPr>
+            <a:stCxn id="28" idx="4"/>
+            <a:endCxn id="2" idx="0"/>
+          </p:cNvCxnSpPr>
+          <p:nvPr/>
+        </p:nvCxnSpPr>
+        <p:spPr>
+          <a:xfrm flipH="1">
+            <a:off x="8697686" y="1264144"/>
+            <a:ext cx="6350" cy="670532"/>
+          </a:xfrm>
+          <a:prstGeom prst="straightConnector1">
+            <a:avLst/>
+          </a:prstGeom>
+          <a:ln>
+            <a:headEnd type="triangle"/>
+            <a:tailEnd type="triangle"/>
+          </a:ln>
+        </p:spPr>
+        <p:style>
+          <a:lnRef idx="1">
+            <a:schemeClr val="accent1"/>
+          </a:lnRef>
+          <a:fillRef idx="0">
+            <a:schemeClr val="accent1"/>
+          </a:fillRef>
+          <a:effectRef idx="0">
+            <a:schemeClr val="accent1"/>
+          </a:effectRef>
+          <a:fontRef idx="minor">
+            <a:schemeClr val="tx1"/>
+          </a:fontRef>
+        </p:style>
+      </p:cxnSp>
+      <p:sp>
+        <p:nvSpPr>
+          <p:cNvPr id="57" name="Elipse 56">
+            <a:extLst>
+              <a:ext uri="{FF2B5EF4-FFF2-40B4-BE49-F238E27FC236}">
+                <a16:creationId xmlns:a16="http://schemas.microsoft.com/office/drawing/2014/main" id="{1B90BB71-7219-41F8-9A0C-7694C8774DB6}"/>
+              </a:ext>
+            </a:extLst>
+          </p:cNvPr>
+          <p:cNvSpPr/>
+          <p:nvPr/>
+        </p:nvSpPr>
+        <p:spPr>
+          <a:xfrm>
+            <a:off x="10130119" y="3297724"/>
+            <a:ext cx="1912981" cy="914401"/>
+          </a:xfrm>
+          <a:prstGeom prst="ellipse">
+            <a:avLst/>
+          </a:prstGeom>
+          <a:solidFill>
+            <a:schemeClr val="accent6"/>
+          </a:solidFill>
+        </p:spPr>
+        <p:style>
+          <a:lnRef idx="2">
+            <a:schemeClr val="accent1">
+              <a:shade val="50000"/>
+            </a:schemeClr>
+          </a:lnRef>
+          <a:fillRef idx="1">
+            <a:schemeClr val="accent1"/>
+          </a:fillRef>
+          <a:effectRef idx="0">
+            <a:schemeClr val="accent1"/>
+          </a:effectRef>
+          <a:fontRef idx="minor">
+            <a:schemeClr val="lt1"/>
+          </a:fontRef>
+        </p:style>
+        <p:txBody>
+          <a:bodyPr rtlCol="0" anchor="ctr"/>
+          <a:lstStyle/>
+          <a:p>
+            <a:pPr algn="ctr"/>
+            <a:r>
+              <a:rPr lang="pt-BR" i="1" dirty="0"/>
+              <a:t>Motion Planning</a:t>
+            </a:r>
+          </a:p>
+        </p:txBody>
+      </p:sp>
+      <p:cxnSp>
+        <p:nvCxnSpPr>
+          <p:cNvPr id="60" name="Conector de Seta Reta 59">
+            <a:extLst>
+              <a:ext uri="{FF2B5EF4-FFF2-40B4-BE49-F238E27FC236}">
+                <a16:creationId xmlns:a16="http://schemas.microsoft.com/office/drawing/2014/main" id="{E33716DC-FE8F-4AFE-B34A-52F497A8272A}"/>
+              </a:ext>
+            </a:extLst>
+          </p:cNvPr>
+          <p:cNvCxnSpPr>
+            <a:stCxn id="2" idx="4"/>
+            <a:endCxn id="9" idx="0"/>
+          </p:cNvCxnSpPr>
+          <p:nvPr/>
+        </p:nvCxnSpPr>
+        <p:spPr>
+          <a:xfrm>
+            <a:off x="8697686" y="2849077"/>
+            <a:ext cx="0" cy="778898"/>
+          </a:xfrm>
+          <a:prstGeom prst="straightConnector1">
+            <a:avLst/>
+          </a:prstGeom>
+          <a:ln>
+            <a:headEnd type="triangle"/>
+            <a:tailEnd type="triangle"/>
+          </a:ln>
+        </p:spPr>
+        <p:style>
+          <a:lnRef idx="1">
+            <a:schemeClr val="accent1"/>
+          </a:lnRef>
+          <a:fillRef idx="0">
+            <a:schemeClr val="accent1"/>
+          </a:fillRef>
+          <a:effectRef idx="0">
+            <a:schemeClr val="accent1"/>
+          </a:effectRef>
+          <a:fontRef idx="minor">
+            <a:schemeClr val="tx1"/>
+          </a:fontRef>
+        </p:style>
+      </p:cxnSp>
+      <p:cxnSp>
+        <p:nvCxnSpPr>
+          <p:cNvPr id="63" name="Conector: Angulado 62">
+            <a:extLst>
+              <a:ext uri="{FF2B5EF4-FFF2-40B4-BE49-F238E27FC236}">
+                <a16:creationId xmlns:a16="http://schemas.microsoft.com/office/drawing/2014/main" id="{C652DE59-CA79-4E5A-91BE-13CDB8ADDF12}"/>
+              </a:ext>
+            </a:extLst>
+          </p:cNvPr>
+          <p:cNvCxnSpPr>
+            <a:stCxn id="2" idx="5"/>
+            <a:endCxn id="57" idx="1"/>
+          </p:cNvCxnSpPr>
+          <p:nvPr/>
+        </p:nvCxnSpPr>
+        <p:spPr>
+          <a:xfrm rot="16200000" flipH="1">
+            <a:off x="9533913" y="2555278"/>
+            <a:ext cx="716469" cy="1036243"/>
+          </a:xfrm>
+          <a:prstGeom prst="bentConnector3">
+            <a:avLst/>
+          </a:prstGeom>
+          <a:ln>
+            <a:headEnd type="triangle"/>
+            <a:tailEnd type="triangle"/>
+          </a:ln>
+        </p:spPr>
+        <p:style>
+          <a:lnRef idx="1">
+            <a:schemeClr val="accent1"/>
+          </a:lnRef>
+          <a:fillRef idx="0">
+            <a:schemeClr val="accent1"/>
+          </a:fillRef>
+          <a:effectRef idx="0">
+            <a:schemeClr val="accent1"/>
+          </a:effectRef>
+          <a:fontRef idx="minor">
+            <a:schemeClr val="tx1"/>
+          </a:fontRef>
+        </p:style>
+      </p:cxnSp>
+      <p:sp>
+        <p:nvSpPr>
+          <p:cNvPr id="65" name="Elipse 64">
+            <a:extLst>
+              <a:ext uri="{FF2B5EF4-FFF2-40B4-BE49-F238E27FC236}">
+                <a16:creationId xmlns:a16="http://schemas.microsoft.com/office/drawing/2014/main" id="{365AA1B7-656D-4444-81E3-AC6F1EF0FA9B}"/>
+              </a:ext>
+            </a:extLst>
+          </p:cNvPr>
+          <p:cNvSpPr/>
+          <p:nvPr/>
+        </p:nvSpPr>
+        <p:spPr>
+          <a:xfrm>
+            <a:off x="5358270" y="364201"/>
+            <a:ext cx="1912981" cy="914401"/>
+          </a:xfrm>
+          <a:prstGeom prst="ellipse">
+            <a:avLst/>
+          </a:prstGeom>
+          <a:solidFill>
+            <a:schemeClr val="accent6"/>
+          </a:solidFill>
+        </p:spPr>
+        <p:style>
+          <a:lnRef idx="2">
+            <a:schemeClr val="accent1">
+              <a:shade val="50000"/>
+            </a:schemeClr>
+          </a:lnRef>
+          <a:fillRef idx="1">
+            <a:schemeClr val="accent1"/>
+          </a:fillRef>
+          <a:effectRef idx="0">
+            <a:schemeClr val="accent1"/>
+          </a:effectRef>
+          <a:fontRef idx="minor">
+            <a:schemeClr val="lt1"/>
+          </a:fontRef>
+        </p:style>
+        <p:txBody>
+          <a:bodyPr rtlCol="0" anchor="ctr"/>
+          <a:lstStyle/>
+          <a:p>
+            <a:pPr algn="ctr"/>
+            <a:r>
+              <a:rPr lang="pt-BR" dirty="0"/>
+              <a:t>Visualização</a:t>
+            </a:r>
+          </a:p>
+        </p:txBody>
+      </p:sp>
+      <p:cxnSp>
+        <p:nvCxnSpPr>
+          <p:cNvPr id="66" name="Conector: Angulado 65">
+            <a:extLst>
+              <a:ext uri="{FF2B5EF4-FFF2-40B4-BE49-F238E27FC236}">
+                <a16:creationId xmlns:a16="http://schemas.microsoft.com/office/drawing/2014/main" id="{79815850-83BB-40B3-AE02-7519F8A84B8E}"/>
+              </a:ext>
+            </a:extLst>
+          </p:cNvPr>
+          <p:cNvCxnSpPr>
+            <a:stCxn id="2" idx="1"/>
+            <a:endCxn id="65" idx="4"/>
+          </p:cNvCxnSpPr>
+          <p:nvPr/>
+        </p:nvCxnSpPr>
+        <p:spPr>
+          <a:xfrm rot="16200000" flipV="1">
+            <a:off x="6773061" y="820303"/>
+            <a:ext cx="789985" cy="1706584"/>
+          </a:xfrm>
+          <a:prstGeom prst="bentConnector3">
+            <a:avLst/>
+          </a:prstGeom>
+          <a:ln>
+            <a:headEnd type="triangle"/>
             <a:tailEnd type="triangle"/>
           </a:ln>
         </p:spPr>

</xml_diff>

<commit_message>
adcionado capítulo 4 e modificacoes nos modelos conceituais
</commit_message>
<xml_diff>
--- a/doc/diagramas/conceitual/Conceitual.pptx
+++ b/doc/diagramas/conceitual/Conceitual.pptx
@@ -4,8 +4,12 @@
   <p:sldMasterIdLst>
     <p:sldMasterId id="2147483648" r:id="rId1"/>
   </p:sldMasterIdLst>
+  <p:notesMasterIdLst>
+    <p:notesMasterId r:id="rId4"/>
+  </p:notesMasterIdLst>
   <p:sldIdLst>
     <p:sldId id="256" r:id="rId2"/>
+    <p:sldId id="257" r:id="rId3"/>
   </p:sldIdLst>
   <p:sldSz cx="12192000" cy="6858000"/>
   <p:notesSz cx="6858000" cy="9144000"/>
@@ -110,6 +114,523 @@
     </p:ext>
   </p:extLst>
 </p:presentation>
+</file>
+
+<file path=ppt/notesMasters/notesMaster1.xml><?xml version="1.0" encoding="utf-8"?>
+<p:notesMaster xmlns:a="http://schemas.openxmlformats.org/drawingml/2006/main" xmlns:r="http://schemas.openxmlformats.org/officeDocument/2006/relationships" xmlns:p="http://schemas.openxmlformats.org/presentationml/2006/main">
+  <p:cSld>
+    <p:bg>
+      <p:bgRef idx="1001">
+        <a:schemeClr val="bg1"/>
+      </p:bgRef>
+    </p:bg>
+    <p:spTree>
+      <p:nvGrpSpPr>
+        <p:cNvPr id="1" name=""/>
+        <p:cNvGrpSpPr/>
+        <p:nvPr/>
+      </p:nvGrpSpPr>
+      <p:grpSpPr>
+        <a:xfrm>
+          <a:off x="0" y="0"/>
+          <a:ext cx="0" cy="0"/>
+          <a:chOff x="0" y="0"/>
+          <a:chExt cx="0" cy="0"/>
+        </a:xfrm>
+      </p:grpSpPr>
+      <p:sp>
+        <p:nvSpPr>
+          <p:cNvPr id="2" name="Espaço Reservado para Cabeçalho 1"/>
+          <p:cNvSpPr>
+            <a:spLocks noGrp="1"/>
+          </p:cNvSpPr>
+          <p:nvPr>
+            <p:ph type="hdr" sz="quarter"/>
+          </p:nvPr>
+        </p:nvSpPr>
+        <p:spPr>
+          <a:xfrm>
+            <a:off x="0" y="0"/>
+            <a:ext cx="2971800" cy="458788"/>
+          </a:xfrm>
+          <a:prstGeom prst="rect">
+            <a:avLst/>
+          </a:prstGeom>
+        </p:spPr>
+        <p:txBody>
+          <a:bodyPr vert="horz" lIns="91440" tIns="45720" rIns="91440" bIns="45720" rtlCol="0"/>
+          <a:lstStyle>
+            <a:lvl1pPr algn="l">
+              <a:defRPr sz="1200"/>
+            </a:lvl1pPr>
+          </a:lstStyle>
+          <a:p>
+            <a:endParaRPr lang="pt-BR"/>
+          </a:p>
+        </p:txBody>
+      </p:sp>
+      <p:sp>
+        <p:nvSpPr>
+          <p:cNvPr id="3" name="Espaço Reservado para Data 2"/>
+          <p:cNvSpPr>
+            <a:spLocks noGrp="1"/>
+          </p:cNvSpPr>
+          <p:nvPr>
+            <p:ph type="dt" idx="1"/>
+          </p:nvPr>
+        </p:nvSpPr>
+        <p:spPr>
+          <a:xfrm>
+            <a:off x="3884613" y="0"/>
+            <a:ext cx="2971800" cy="458788"/>
+          </a:xfrm>
+          <a:prstGeom prst="rect">
+            <a:avLst/>
+          </a:prstGeom>
+        </p:spPr>
+        <p:txBody>
+          <a:bodyPr vert="horz" lIns="91440" tIns="45720" rIns="91440" bIns="45720" rtlCol="0"/>
+          <a:lstStyle>
+            <a:lvl1pPr algn="r">
+              <a:defRPr sz="1200"/>
+            </a:lvl1pPr>
+          </a:lstStyle>
+          <a:p>
+            <a:fld id="{8008BA6E-468E-4946-80E3-BA5DE588EE13}" type="datetimeFigureOut">
+              <a:rPr lang="pt-BR" smtClean="0"/>
+              <a:t>05/05/2019</a:t>
+            </a:fld>
+            <a:endParaRPr lang="pt-BR"/>
+          </a:p>
+        </p:txBody>
+      </p:sp>
+      <p:sp>
+        <p:nvSpPr>
+          <p:cNvPr id="4" name="Espaço Reservado para Imagem de Slide 3"/>
+          <p:cNvSpPr>
+            <a:spLocks noGrp="1" noRot="1" noChangeAspect="1"/>
+          </p:cNvSpPr>
+          <p:nvPr>
+            <p:ph type="sldImg" idx="2"/>
+          </p:nvPr>
+        </p:nvSpPr>
+        <p:spPr>
+          <a:xfrm>
+            <a:off x="685800" y="1143000"/>
+            <a:ext cx="5486400" cy="3086100"/>
+          </a:xfrm>
+          <a:prstGeom prst="rect">
+            <a:avLst/>
+          </a:prstGeom>
+          <a:noFill/>
+          <a:ln w="12700">
+            <a:solidFill>
+              <a:prstClr val="black"/>
+            </a:solidFill>
+          </a:ln>
+        </p:spPr>
+        <p:txBody>
+          <a:bodyPr vert="horz" lIns="91440" tIns="45720" rIns="91440" bIns="45720" rtlCol="0" anchor="ctr"/>
+          <a:lstStyle/>
+          <a:p>
+            <a:endParaRPr lang="pt-BR"/>
+          </a:p>
+        </p:txBody>
+      </p:sp>
+      <p:sp>
+        <p:nvSpPr>
+          <p:cNvPr id="5" name="Espaço Reservado para Anotações 4"/>
+          <p:cNvSpPr>
+            <a:spLocks noGrp="1"/>
+          </p:cNvSpPr>
+          <p:nvPr>
+            <p:ph type="body" sz="quarter" idx="3"/>
+          </p:nvPr>
+        </p:nvSpPr>
+        <p:spPr>
+          <a:xfrm>
+            <a:off x="685800" y="4400550"/>
+            <a:ext cx="5486400" cy="3600450"/>
+          </a:xfrm>
+          <a:prstGeom prst="rect">
+            <a:avLst/>
+          </a:prstGeom>
+        </p:spPr>
+        <p:txBody>
+          <a:bodyPr vert="horz" lIns="91440" tIns="45720" rIns="91440" bIns="45720" rtlCol="0"/>
+          <a:lstStyle/>
+          <a:p>
+            <a:pPr lvl="0"/>
+            <a:r>
+              <a:rPr lang="pt-BR"/>
+              <a:t>Clique para editar os estilos de texto Mestres</a:t>
+            </a:r>
+          </a:p>
+          <a:p>
+            <a:pPr lvl="1"/>
+            <a:r>
+              <a:rPr lang="pt-BR"/>
+              <a:t>Segundo nível</a:t>
+            </a:r>
+          </a:p>
+          <a:p>
+            <a:pPr lvl="2"/>
+            <a:r>
+              <a:rPr lang="pt-BR"/>
+              <a:t>Terceiro nível</a:t>
+            </a:r>
+          </a:p>
+          <a:p>
+            <a:pPr lvl="3"/>
+            <a:r>
+              <a:rPr lang="pt-BR"/>
+              <a:t>Quarto nível</a:t>
+            </a:r>
+          </a:p>
+          <a:p>
+            <a:pPr lvl="4"/>
+            <a:r>
+              <a:rPr lang="pt-BR"/>
+              <a:t>Quinto nível</a:t>
+            </a:r>
+          </a:p>
+        </p:txBody>
+      </p:sp>
+      <p:sp>
+        <p:nvSpPr>
+          <p:cNvPr id="6" name="Espaço Reservado para Rodapé 5"/>
+          <p:cNvSpPr>
+            <a:spLocks noGrp="1"/>
+          </p:cNvSpPr>
+          <p:nvPr>
+            <p:ph type="ftr" sz="quarter" idx="4"/>
+          </p:nvPr>
+        </p:nvSpPr>
+        <p:spPr>
+          <a:xfrm>
+            <a:off x="0" y="8685213"/>
+            <a:ext cx="2971800" cy="458787"/>
+          </a:xfrm>
+          <a:prstGeom prst="rect">
+            <a:avLst/>
+          </a:prstGeom>
+        </p:spPr>
+        <p:txBody>
+          <a:bodyPr vert="horz" lIns="91440" tIns="45720" rIns="91440" bIns="45720" rtlCol="0" anchor="b"/>
+          <a:lstStyle>
+            <a:lvl1pPr algn="l">
+              <a:defRPr sz="1200"/>
+            </a:lvl1pPr>
+          </a:lstStyle>
+          <a:p>
+            <a:endParaRPr lang="pt-BR"/>
+          </a:p>
+        </p:txBody>
+      </p:sp>
+      <p:sp>
+        <p:nvSpPr>
+          <p:cNvPr id="7" name="Espaço Reservado para Número de Slide 6"/>
+          <p:cNvSpPr>
+            <a:spLocks noGrp="1"/>
+          </p:cNvSpPr>
+          <p:nvPr>
+            <p:ph type="sldNum" sz="quarter" idx="5"/>
+          </p:nvPr>
+        </p:nvSpPr>
+        <p:spPr>
+          <a:xfrm>
+            <a:off x="3884613" y="8685213"/>
+            <a:ext cx="2971800" cy="458787"/>
+          </a:xfrm>
+          <a:prstGeom prst="rect">
+            <a:avLst/>
+          </a:prstGeom>
+        </p:spPr>
+        <p:txBody>
+          <a:bodyPr vert="horz" lIns="91440" tIns="45720" rIns="91440" bIns="45720" rtlCol="0" anchor="b"/>
+          <a:lstStyle>
+            <a:lvl1pPr algn="r">
+              <a:defRPr sz="1200"/>
+            </a:lvl1pPr>
+          </a:lstStyle>
+          <a:p>
+            <a:fld id="{52F35DA9-0A55-4FBB-BEB7-1E5B11B2DA61}" type="slidenum">
+              <a:rPr lang="pt-BR" smtClean="0"/>
+              <a:t>‹nº›</a:t>
+            </a:fld>
+            <a:endParaRPr lang="pt-BR"/>
+          </a:p>
+        </p:txBody>
+      </p:sp>
+    </p:spTree>
+    <p:extLst>
+      <p:ext uri="{BB962C8B-B14F-4D97-AF65-F5344CB8AC3E}">
+        <p14:creationId xmlns:p14="http://schemas.microsoft.com/office/powerpoint/2010/main" val="1790437384"/>
+      </p:ext>
+    </p:extLst>
+  </p:cSld>
+  <p:clrMap bg1="lt1" tx1="dk1" bg2="lt2" tx2="dk2" accent1="accent1" accent2="accent2" accent3="accent3" accent4="accent4" accent5="accent5" accent6="accent6" hlink="hlink" folHlink="folHlink"/>
+  <p:notesStyle>
+    <a:lvl1pPr marL="0" algn="l" defTabSz="914400" rtl="0" eaLnBrk="1" latinLnBrk="0" hangingPunct="1">
+      <a:defRPr sz="1200" kern="1200">
+        <a:solidFill>
+          <a:schemeClr val="tx1"/>
+        </a:solidFill>
+        <a:latin typeface="+mn-lt"/>
+        <a:ea typeface="+mn-ea"/>
+        <a:cs typeface="+mn-cs"/>
+      </a:defRPr>
+    </a:lvl1pPr>
+    <a:lvl2pPr marL="457200" algn="l" defTabSz="914400" rtl="0" eaLnBrk="1" latinLnBrk="0" hangingPunct="1">
+      <a:defRPr sz="1200" kern="1200">
+        <a:solidFill>
+          <a:schemeClr val="tx1"/>
+        </a:solidFill>
+        <a:latin typeface="+mn-lt"/>
+        <a:ea typeface="+mn-ea"/>
+        <a:cs typeface="+mn-cs"/>
+      </a:defRPr>
+    </a:lvl2pPr>
+    <a:lvl3pPr marL="914400" algn="l" defTabSz="914400" rtl="0" eaLnBrk="1" latinLnBrk="0" hangingPunct="1">
+      <a:defRPr sz="1200" kern="1200">
+        <a:solidFill>
+          <a:schemeClr val="tx1"/>
+        </a:solidFill>
+        <a:latin typeface="+mn-lt"/>
+        <a:ea typeface="+mn-ea"/>
+        <a:cs typeface="+mn-cs"/>
+      </a:defRPr>
+    </a:lvl3pPr>
+    <a:lvl4pPr marL="1371600" algn="l" defTabSz="914400" rtl="0" eaLnBrk="1" latinLnBrk="0" hangingPunct="1">
+      <a:defRPr sz="1200" kern="1200">
+        <a:solidFill>
+          <a:schemeClr val="tx1"/>
+        </a:solidFill>
+        <a:latin typeface="+mn-lt"/>
+        <a:ea typeface="+mn-ea"/>
+        <a:cs typeface="+mn-cs"/>
+      </a:defRPr>
+    </a:lvl4pPr>
+    <a:lvl5pPr marL="1828800" algn="l" defTabSz="914400" rtl="0" eaLnBrk="1" latinLnBrk="0" hangingPunct="1">
+      <a:defRPr sz="1200" kern="1200">
+        <a:solidFill>
+          <a:schemeClr val="tx1"/>
+        </a:solidFill>
+        <a:latin typeface="+mn-lt"/>
+        <a:ea typeface="+mn-ea"/>
+        <a:cs typeface="+mn-cs"/>
+      </a:defRPr>
+    </a:lvl5pPr>
+    <a:lvl6pPr marL="2286000" algn="l" defTabSz="914400" rtl="0" eaLnBrk="1" latinLnBrk="0" hangingPunct="1">
+      <a:defRPr sz="1200" kern="1200">
+        <a:solidFill>
+          <a:schemeClr val="tx1"/>
+        </a:solidFill>
+        <a:latin typeface="+mn-lt"/>
+        <a:ea typeface="+mn-ea"/>
+        <a:cs typeface="+mn-cs"/>
+      </a:defRPr>
+    </a:lvl6pPr>
+    <a:lvl7pPr marL="2743200" algn="l" defTabSz="914400" rtl="0" eaLnBrk="1" latinLnBrk="0" hangingPunct="1">
+      <a:defRPr sz="1200" kern="1200">
+        <a:solidFill>
+          <a:schemeClr val="tx1"/>
+        </a:solidFill>
+        <a:latin typeface="+mn-lt"/>
+        <a:ea typeface="+mn-ea"/>
+        <a:cs typeface="+mn-cs"/>
+      </a:defRPr>
+    </a:lvl7pPr>
+    <a:lvl8pPr marL="3200400" algn="l" defTabSz="914400" rtl="0" eaLnBrk="1" latinLnBrk="0" hangingPunct="1">
+      <a:defRPr sz="1200" kern="1200">
+        <a:solidFill>
+          <a:schemeClr val="tx1"/>
+        </a:solidFill>
+        <a:latin typeface="+mn-lt"/>
+        <a:ea typeface="+mn-ea"/>
+        <a:cs typeface="+mn-cs"/>
+      </a:defRPr>
+    </a:lvl8pPr>
+    <a:lvl9pPr marL="3657600" algn="l" defTabSz="914400" rtl="0" eaLnBrk="1" latinLnBrk="0" hangingPunct="1">
+      <a:defRPr sz="1200" kern="1200">
+        <a:solidFill>
+          <a:schemeClr val="tx1"/>
+        </a:solidFill>
+        <a:latin typeface="+mn-lt"/>
+        <a:ea typeface="+mn-ea"/>
+        <a:cs typeface="+mn-cs"/>
+      </a:defRPr>
+    </a:lvl9pPr>
+  </p:notesStyle>
+</p:notesMaster>
+</file>
+
+<file path=ppt/notesSlides/notesSlide1.xml><?xml version="1.0" encoding="utf-8"?>
+<p:notes xmlns:a="http://schemas.openxmlformats.org/drawingml/2006/main" xmlns:r="http://schemas.openxmlformats.org/officeDocument/2006/relationships" xmlns:p="http://schemas.openxmlformats.org/presentationml/2006/main">
+  <p:cSld>
+    <p:spTree>
+      <p:nvGrpSpPr>
+        <p:cNvPr id="1" name=""/>
+        <p:cNvGrpSpPr/>
+        <p:nvPr/>
+      </p:nvGrpSpPr>
+      <p:grpSpPr>
+        <a:xfrm>
+          <a:off x="0" y="0"/>
+          <a:ext cx="0" cy="0"/>
+          <a:chOff x="0" y="0"/>
+          <a:chExt cx="0" cy="0"/>
+        </a:xfrm>
+      </p:grpSpPr>
+      <p:sp>
+        <p:nvSpPr>
+          <p:cNvPr id="2" name="Espaço Reservado para Imagem de Slide 1"/>
+          <p:cNvSpPr>
+            <a:spLocks noGrp="1" noRot="1" noChangeAspect="1"/>
+          </p:cNvSpPr>
+          <p:nvPr>
+            <p:ph type="sldImg"/>
+          </p:nvPr>
+        </p:nvSpPr>
+        <p:spPr/>
+      </p:sp>
+      <p:sp>
+        <p:nvSpPr>
+          <p:cNvPr id="3" name="Espaço Reservado para Anotações 2"/>
+          <p:cNvSpPr>
+            <a:spLocks noGrp="1"/>
+          </p:cNvSpPr>
+          <p:nvPr>
+            <p:ph type="body" idx="1"/>
+          </p:nvPr>
+        </p:nvSpPr>
+        <p:spPr/>
+        <p:txBody>
+          <a:bodyPr/>
+          <a:lstStyle/>
+          <a:p>
+            <a:endParaRPr lang="pt-BR" dirty="0"/>
+          </a:p>
+        </p:txBody>
+      </p:sp>
+      <p:sp>
+        <p:nvSpPr>
+          <p:cNvPr id="4" name="Espaço Reservado para Número de Slide 3"/>
+          <p:cNvSpPr>
+            <a:spLocks noGrp="1"/>
+          </p:cNvSpPr>
+          <p:nvPr>
+            <p:ph type="sldNum" sz="quarter" idx="5"/>
+          </p:nvPr>
+        </p:nvSpPr>
+        <p:spPr/>
+        <p:txBody>
+          <a:bodyPr/>
+          <a:lstStyle/>
+          <a:p>
+            <a:fld id="{52F35DA9-0A55-4FBB-BEB7-1E5B11B2DA61}" type="slidenum">
+              <a:rPr lang="pt-BR" smtClean="0"/>
+              <a:t>1</a:t>
+            </a:fld>
+            <a:endParaRPr lang="pt-BR"/>
+          </a:p>
+        </p:txBody>
+      </p:sp>
+    </p:spTree>
+    <p:extLst>
+      <p:ext uri="{BB962C8B-B14F-4D97-AF65-F5344CB8AC3E}">
+        <p14:creationId xmlns:p14="http://schemas.microsoft.com/office/powerpoint/2010/main" val="3394336394"/>
+      </p:ext>
+    </p:extLst>
+  </p:cSld>
+  <p:clrMapOvr>
+    <a:masterClrMapping/>
+  </p:clrMapOvr>
+</p:notes>
+</file>
+
+<file path=ppt/notesSlides/notesSlide2.xml><?xml version="1.0" encoding="utf-8"?>
+<p:notes xmlns:a="http://schemas.openxmlformats.org/drawingml/2006/main" xmlns:r="http://schemas.openxmlformats.org/officeDocument/2006/relationships" xmlns:p="http://schemas.openxmlformats.org/presentationml/2006/main">
+  <p:cSld>
+    <p:spTree>
+      <p:nvGrpSpPr>
+        <p:cNvPr id="1" name=""/>
+        <p:cNvGrpSpPr/>
+        <p:nvPr/>
+      </p:nvGrpSpPr>
+      <p:grpSpPr>
+        <a:xfrm>
+          <a:off x="0" y="0"/>
+          <a:ext cx="0" cy="0"/>
+          <a:chOff x="0" y="0"/>
+          <a:chExt cx="0" cy="0"/>
+        </a:xfrm>
+      </p:grpSpPr>
+      <p:sp>
+        <p:nvSpPr>
+          <p:cNvPr id="2" name="Espaço Reservado para Imagem de Slide 1"/>
+          <p:cNvSpPr>
+            <a:spLocks noGrp="1" noRot="1" noChangeAspect="1"/>
+          </p:cNvSpPr>
+          <p:nvPr>
+            <p:ph type="sldImg"/>
+          </p:nvPr>
+        </p:nvSpPr>
+        <p:spPr/>
+      </p:sp>
+      <p:sp>
+        <p:nvSpPr>
+          <p:cNvPr id="3" name="Espaço Reservado para Anotações 2"/>
+          <p:cNvSpPr>
+            <a:spLocks noGrp="1"/>
+          </p:cNvSpPr>
+          <p:nvPr>
+            <p:ph type="body" idx="1"/>
+          </p:nvPr>
+        </p:nvSpPr>
+        <p:spPr/>
+        <p:txBody>
+          <a:bodyPr/>
+          <a:lstStyle/>
+          <a:p>
+            <a:endParaRPr lang="pt-BR" dirty="0"/>
+          </a:p>
+        </p:txBody>
+      </p:sp>
+      <p:sp>
+        <p:nvSpPr>
+          <p:cNvPr id="4" name="Espaço Reservado para Número de Slide 3"/>
+          <p:cNvSpPr>
+            <a:spLocks noGrp="1"/>
+          </p:cNvSpPr>
+          <p:nvPr>
+            <p:ph type="sldNum" sz="quarter" idx="5"/>
+          </p:nvPr>
+        </p:nvSpPr>
+        <p:spPr/>
+        <p:txBody>
+          <a:bodyPr/>
+          <a:lstStyle/>
+          <a:p>
+            <a:fld id="{52F35DA9-0A55-4FBB-BEB7-1E5B11B2DA61}" type="slidenum">
+              <a:rPr lang="pt-BR" smtClean="0"/>
+              <a:t>2</a:t>
+            </a:fld>
+            <a:endParaRPr lang="pt-BR"/>
+          </a:p>
+        </p:txBody>
+      </p:sp>
+    </p:spTree>
+    <p:extLst>
+      <p:ext uri="{BB962C8B-B14F-4D97-AF65-F5344CB8AC3E}">
+        <p14:creationId xmlns:p14="http://schemas.microsoft.com/office/powerpoint/2010/main" val="3373614779"/>
+      </p:ext>
+    </p:extLst>
+  </p:cSld>
+  <p:clrMapOvr>
+    <a:masterClrMapping/>
+  </p:clrMapOvr>
+</p:notes>
 </file>
 
 <file path=ppt/slideLayouts/slideLayout1.xml><?xml version="1.0" encoding="utf-8"?>
@@ -3048,8 +3569,8 @@
         </p:nvSpPr>
         <p:spPr>
           <a:xfrm>
-            <a:off x="3222172" y="3795880"/>
-            <a:ext cx="2194560" cy="631578"/>
+            <a:off x="2307770" y="3795880"/>
+            <a:ext cx="2194561" cy="631578"/>
           </a:xfrm>
           <a:prstGeom prst="ellipse">
             <a:avLst/>
@@ -3141,7 +3662,7 @@
         <p:spPr>
           <a:xfrm>
             <a:off x="2623718" y="456530"/>
-            <a:ext cx="2612139" cy="1477328"/>
+            <a:ext cx="2612139" cy="1200329"/>
           </a:xfrm>
           <a:prstGeom prst="rect">
             <a:avLst/>
@@ -3170,7 +3691,7 @@
             </a:pPr>
             <a:r>
               <a:rPr lang="pt-BR" dirty="0"/>
-              <a:t>Controlador de execução de trajetória</a:t>
+              <a:t>Controlador de execução de missões</a:t>
             </a:r>
           </a:p>
           <a:p>
@@ -3181,16 +3702,6 @@
             <a:r>
               <a:rPr lang="pt-BR" dirty="0"/>
               <a:t>IMU e GPS</a:t>
-            </a:r>
-          </a:p>
-          <a:p>
-            <a:pPr marL="285750" indent="-285750">
-              <a:buFont typeface="Arial" panose="020B0604020202020204" pitchFamily="34" charset="0"/>
-              <a:buChar char="•"/>
-            </a:pPr>
-            <a:r>
-              <a:rPr lang="pt-BR" dirty="0"/>
-              <a:t>Fotos</a:t>
             </a:r>
           </a:p>
         </p:txBody>
@@ -3245,7 +3756,7 @@
         <p:spPr>
           <a:xfrm flipV="1">
             <a:off x="2002971" y="4111669"/>
-            <a:ext cx="1219201" cy="7487"/>
+            <a:ext cx="304799" cy="7487"/>
           </a:xfrm>
           <a:prstGeom prst="line">
             <a:avLst/>
@@ -3275,7 +3786,7 @@
           <p:nvPr/>
         </p:nvPicPr>
         <p:blipFill>
-          <a:blip r:embed="rId2" cstate="print">
+          <a:blip r:embed="rId3" cstate="print">
             <a:extLst>
               <a:ext uri="{28A0092B-C50C-407E-A947-70E740481C1C}">
                 <a14:useLocalDpi xmlns:a14="http://schemas.microsoft.com/office/drawing/2010/main" val="0"/>
@@ -3316,7 +3827,7 @@
           <p:nvPr/>
         </p:nvPicPr>
         <p:blipFill>
-          <a:blip r:embed="rId2" cstate="print">
+          <a:blip r:embed="rId3" cstate="print">
             <a:extLst>
               <a:ext uri="{28A0092B-C50C-407E-A947-70E740481C1C}">
                 <a14:useLocalDpi xmlns:a14="http://schemas.microsoft.com/office/drawing/2010/main" val="0"/>
@@ -3357,7 +3868,7 @@
           <p:nvPr/>
         </p:nvPicPr>
         <p:blipFill>
-          <a:blip r:embed="rId2" cstate="print">
+          <a:blip r:embed="rId3" cstate="print">
             <a:extLst>
               <a:ext uri="{28A0092B-C50C-407E-A947-70E740481C1C}">
                 <a14:useLocalDpi xmlns:a14="http://schemas.microsoft.com/office/drawing/2010/main" val="0"/>
@@ -3371,7 +3882,7 @@
         </p:blipFill>
         <p:spPr bwMode="auto">
           <a:xfrm rot="5400000">
-            <a:off x="5575258" y="3780240"/>
+            <a:off x="4776581" y="3822684"/>
             <a:ext cx="601162" cy="601162"/>
           </a:xfrm>
           <a:prstGeom prst="rect">
@@ -3398,7 +3909,7 @@
           <p:nvPr/>
         </p:nvPicPr>
         <p:blipFill>
-          <a:blip r:embed="rId2" cstate="print">
+          <a:blip r:embed="rId3" cstate="print">
             <a:extLst>
               <a:ext uri="{28A0092B-C50C-407E-A947-70E740481C1C}">
                 <a14:useLocalDpi xmlns:a14="http://schemas.microsoft.com/office/drawing/2010/main" val="0"/>
@@ -3432,14 +3943,43 @@
       </p:pic>
       <p:sp>
         <p:nvSpPr>
-          <p:cNvPr id="20" name="Chave esquerda 19"/>
+          <p:cNvPr id="15" name="CaixaDeTexto 14"/>
+          <p:cNvSpPr txBox="1"/>
+          <p:nvPr/>
+        </p:nvSpPr>
+        <p:spPr>
+          <a:xfrm>
+            <a:off x="239700" y="2435577"/>
+            <a:ext cx="2612139" cy="369332"/>
+          </a:xfrm>
+          <a:prstGeom prst="rect">
+            <a:avLst/>
+          </a:prstGeom>
+          <a:noFill/>
+        </p:spPr>
+        <p:txBody>
+          <a:bodyPr wrap="square" rtlCol="0">
+            <a:spAutoFit/>
+          </a:bodyPr>
+          <a:lstStyle/>
+          <a:p>
+            <a:r>
+              <a:rPr lang="pt-BR" dirty="0"/>
+              <a:t>Comunicação proprietária</a:t>
+            </a:r>
+          </a:p>
+        </p:txBody>
+      </p:sp>
+      <p:sp>
+        <p:nvSpPr>
+          <p:cNvPr id="22" name="Chave esquerda 21"/>
           <p:cNvSpPr/>
           <p:nvPr/>
         </p:nvSpPr>
         <p:spPr>
           <a:xfrm>
-            <a:off x="1656395" y="2403522"/>
-            <a:ext cx="235132" cy="390253"/>
+            <a:off x="1010057" y="4754884"/>
+            <a:ext cx="235132" cy="1045025"/>
           </a:xfrm>
           <a:prstGeom prst="leftBrace">
             <a:avLst/>
@@ -3470,14 +4010,14 @@
       </p:sp>
       <p:sp>
         <p:nvSpPr>
-          <p:cNvPr id="15" name="CaixaDeTexto 14"/>
+          <p:cNvPr id="23" name="CaixaDeTexto 22"/>
           <p:cNvSpPr txBox="1"/>
           <p:nvPr/>
         </p:nvSpPr>
         <p:spPr>
           <a:xfrm>
-            <a:off x="1891527" y="2412798"/>
-            <a:ext cx="3648892" cy="369332"/>
+            <a:off x="1211381" y="4815732"/>
+            <a:ext cx="3648892" cy="923330"/>
           </a:xfrm>
           <a:prstGeom prst="rect">
             <a:avLst/>
@@ -3496,78 +4036,17 @@
             </a:pPr>
             <a:r>
               <a:rPr lang="pt-BR" dirty="0"/>
-              <a:t>Comunicação proprietária</a:t>
-            </a:r>
-          </a:p>
-        </p:txBody>
-      </p:sp>
-      <p:sp>
-        <p:nvSpPr>
-          <p:cNvPr id="22" name="Chave esquerda 21"/>
-          <p:cNvSpPr/>
-          <p:nvPr/>
-        </p:nvSpPr>
-        <p:spPr>
-          <a:xfrm>
-            <a:off x="1010057" y="4754884"/>
-            <a:ext cx="235132" cy="1045025"/>
-          </a:xfrm>
-          <a:prstGeom prst="leftBrace">
-            <a:avLst/>
-          </a:prstGeom>
-        </p:spPr>
-        <p:style>
-          <a:lnRef idx="1">
-            <a:schemeClr val="accent1"/>
-          </a:lnRef>
-          <a:fillRef idx="0">
-            <a:schemeClr val="accent1"/>
-          </a:fillRef>
-          <a:effectRef idx="0">
-            <a:schemeClr val="accent1"/>
-          </a:effectRef>
-          <a:fontRef idx="minor">
-            <a:schemeClr val="tx1"/>
-          </a:fontRef>
-        </p:style>
-        <p:txBody>
-          <a:bodyPr rtlCol="0" anchor="ctr"/>
-          <a:lstStyle/>
-          <a:p>
-            <a:pPr algn="ctr"/>
-            <a:endParaRPr lang="pt-BR"/>
-          </a:p>
-        </p:txBody>
-      </p:sp>
-      <p:sp>
-        <p:nvSpPr>
-          <p:cNvPr id="23" name="CaixaDeTexto 22"/>
-          <p:cNvSpPr txBox="1"/>
-          <p:nvPr/>
-        </p:nvSpPr>
-        <p:spPr>
-          <a:xfrm>
-            <a:off x="1211381" y="4815732"/>
-            <a:ext cx="3648892" cy="923330"/>
-          </a:xfrm>
-          <a:prstGeom prst="rect">
-            <a:avLst/>
-          </a:prstGeom>
-          <a:noFill/>
-        </p:spPr>
-        <p:txBody>
-          <a:bodyPr wrap="square" rtlCol="0">
-            <a:spAutoFit/>
-          </a:bodyPr>
-          <a:lstStyle/>
+              <a:t>Controle Manual</a:t>
+            </a:r>
+          </a:p>
           <a:p>
             <a:pPr marL="285750" indent="-285750">
               <a:buFont typeface="Arial" panose="020B0604020202020204" pitchFamily="34" charset="0"/>
               <a:buChar char="•"/>
             </a:pPr>
             <a:r>
-              <a:rPr lang="pt-BR" dirty="0"/>
-              <a:t>Controle Manual</a:t>
+              <a:rPr lang="pt-BR" i="1" dirty="0"/>
+              <a:t>Takeoff</a:t>
             </a:r>
           </a:p>
           <a:p>
@@ -3576,21 +4055,9 @@
               <a:buChar char="•"/>
             </a:pPr>
             <a:r>
-              <a:rPr lang="pt-BR" dirty="0" err="1"/>
-              <a:t>Takeoff</a:t>
-            </a:r>
-            <a:endParaRPr lang="pt-BR" dirty="0"/>
-          </a:p>
-          <a:p>
-            <a:pPr marL="285750" indent="-285750">
-              <a:buFont typeface="Arial" panose="020B0604020202020204" pitchFamily="34" charset="0"/>
-              <a:buChar char="•"/>
-            </a:pPr>
-            <a:r>
-              <a:rPr lang="pt-BR" dirty="0" err="1"/>
+              <a:rPr lang="pt-BR" i="1" dirty="0"/>
               <a:t>Landing</a:t>
             </a:r>
-            <a:endParaRPr lang="pt-BR" dirty="0"/>
           </a:p>
         </p:txBody>
       </p:sp>
@@ -3676,8 +4143,8 @@
         </p:nvSpPr>
         <p:spPr>
           <a:xfrm>
-            <a:off x="4591333" y="4754883"/>
-            <a:ext cx="235132" cy="1045026"/>
+            <a:off x="4177460" y="4754883"/>
+            <a:ext cx="241619" cy="1808477"/>
           </a:xfrm>
           <a:prstGeom prst="leftBrace">
             <a:avLst/>
@@ -3714,8 +4181,8 @@
         </p:nvSpPr>
         <p:spPr>
           <a:xfrm>
-            <a:off x="4826465" y="4760161"/>
-            <a:ext cx="3648892" cy="1477328"/>
+            <a:off x="4399789" y="4754883"/>
+            <a:ext cx="3373134" cy="2031325"/>
           </a:xfrm>
           <a:prstGeom prst="rect">
             <a:avLst/>
@@ -3734,7 +4201,7 @@
             </a:pPr>
             <a:r>
               <a:rPr lang="pt-BR" dirty="0"/>
-              <a:t>Escreve posição e orientação</a:t>
+              <a:t>Enviar ao VANT missões</a:t>
             </a:r>
           </a:p>
           <a:p>
@@ -3744,7 +4211,7 @@
             </a:pPr>
             <a:r>
               <a:rPr lang="pt-BR" dirty="0"/>
-              <a:t>Recebe orientação e posição</a:t>
+              <a:t>Receber comandos da estação de comando</a:t>
             </a:r>
           </a:p>
           <a:p>
@@ -3754,11 +4221,18 @@
             </a:pPr>
             <a:r>
               <a:rPr lang="pt-BR" dirty="0"/>
-              <a:t>Simulador de controlador de voo</a:t>
-            </a:r>
-          </a:p>
-          <a:p>
-            <a:endParaRPr lang="pt-BR" dirty="0"/>
+              <a:t>Simular o controlador de voo</a:t>
+            </a:r>
+          </a:p>
+          <a:p>
+            <a:pPr marL="285750" indent="-285750">
+              <a:buFont typeface="Arial" panose="020B0604020202020204" pitchFamily="34" charset="0"/>
+              <a:buChar char="•"/>
+            </a:pPr>
+            <a:r>
+              <a:rPr lang="pt-BR" dirty="0"/>
+              <a:t>Enviar ao simulador de VANT missões</a:t>
+            </a:r>
           </a:p>
           <a:p>
             <a:pPr marL="285750" indent="-285750">
@@ -3773,6 +4247,7 @@
         <p:nvCxnSpPr>
           <p:cNvPr id="37" name="Conector angulado 36"/>
           <p:cNvCxnSpPr>
+            <a:cxnSpLocks/>
             <a:stCxn id="6" idx="4"/>
             <a:endCxn id="38" idx="1"/>
           </p:cNvCxnSpPr>
@@ -3780,162 +4255,8 @@
         </p:nvCxnSpPr>
         <p:spPr>
           <a:xfrm rot="16200000" flipH="1">
-            <a:off x="4030423" y="4716486"/>
-            <a:ext cx="849938" cy="271881"/>
-          </a:xfrm>
-          <a:prstGeom prst="bentConnector2">
-            <a:avLst/>
-          </a:prstGeom>
-          <a:ln>
-            <a:tailEnd type="triangle"/>
-          </a:ln>
-        </p:spPr>
-        <p:style>
-          <a:lnRef idx="1">
-            <a:schemeClr val="accent1"/>
-          </a:lnRef>
-          <a:fillRef idx="0">
-            <a:schemeClr val="accent1"/>
-          </a:fillRef>
-          <a:effectRef idx="0">
-            <a:schemeClr val="accent1"/>
-          </a:effectRef>
-          <a:fontRef idx="minor">
-            <a:schemeClr val="tx1"/>
-          </a:fontRef>
-        </p:style>
-      </p:cxnSp>
-      <p:sp>
-        <p:nvSpPr>
-          <p:cNvPr id="43" name="Chave esquerda 42"/>
-          <p:cNvSpPr/>
-          <p:nvPr/>
-        </p:nvSpPr>
-        <p:spPr>
-          <a:xfrm>
-            <a:off x="9117875" y="4754883"/>
-            <a:ext cx="200296" cy="1280157"/>
-          </a:xfrm>
-          <a:prstGeom prst="leftBrace">
-            <a:avLst/>
-          </a:prstGeom>
-        </p:spPr>
-        <p:style>
-          <a:lnRef idx="1">
-            <a:schemeClr val="accent1"/>
-          </a:lnRef>
-          <a:fillRef idx="0">
-            <a:schemeClr val="accent1"/>
-          </a:fillRef>
-          <a:effectRef idx="0">
-            <a:schemeClr val="accent1"/>
-          </a:effectRef>
-          <a:fontRef idx="minor">
-            <a:schemeClr val="tx1"/>
-          </a:fontRef>
-        </p:style>
-        <p:txBody>
-          <a:bodyPr rtlCol="0" anchor="ctr"/>
-          <a:lstStyle/>
-          <a:p>
-            <a:pPr algn="ctr"/>
-            <a:endParaRPr lang="pt-BR"/>
-          </a:p>
-        </p:txBody>
-      </p:sp>
-      <p:sp>
-        <p:nvSpPr>
-          <p:cNvPr id="44" name="CaixaDeTexto 43"/>
-          <p:cNvSpPr txBox="1"/>
-          <p:nvPr/>
-        </p:nvSpPr>
-        <p:spPr>
-          <a:xfrm>
-            <a:off x="9340204" y="4734038"/>
-            <a:ext cx="2364116" cy="2031325"/>
-          </a:xfrm>
-          <a:prstGeom prst="rect">
-            <a:avLst/>
-          </a:prstGeom>
-          <a:noFill/>
-        </p:spPr>
-        <p:txBody>
-          <a:bodyPr wrap="square" rtlCol="0">
-            <a:spAutoFit/>
-          </a:bodyPr>
-          <a:lstStyle/>
-          <a:p>
-            <a:pPr marL="285750" indent="-285750">
-              <a:buFont typeface="Arial" panose="020B0604020202020204" pitchFamily="34" charset="0"/>
-              <a:buChar char="•"/>
-            </a:pPr>
-            <a:r>
-              <a:rPr lang="pt-BR" dirty="0"/>
-              <a:t>Visão 3D</a:t>
-            </a:r>
-          </a:p>
-          <a:p>
-            <a:pPr marL="285750" indent="-285750">
-              <a:buFont typeface="Arial" panose="020B0604020202020204" pitchFamily="34" charset="0"/>
-              <a:buChar char="•"/>
-            </a:pPr>
-            <a:r>
-              <a:rPr lang="pt-BR" dirty="0"/>
-              <a:t>Path planning</a:t>
-            </a:r>
-          </a:p>
-          <a:p>
-            <a:pPr marL="285750" indent="-285750">
-              <a:buFont typeface="Arial" panose="020B0604020202020204" pitchFamily="34" charset="0"/>
-              <a:buChar char="•"/>
-            </a:pPr>
-            <a:r>
-              <a:rPr lang="pt-BR" dirty="0"/>
-              <a:t>Rotas Adaptativas</a:t>
-            </a:r>
-          </a:p>
-          <a:p>
-            <a:pPr marL="285750" indent="-285750">
-              <a:buFont typeface="Arial" panose="020B0604020202020204" pitchFamily="34" charset="0"/>
-              <a:buChar char="•"/>
-            </a:pPr>
-            <a:r>
-              <a:rPr lang="pt-BR" dirty="0"/>
-              <a:t>Simulação</a:t>
-            </a:r>
-          </a:p>
-          <a:p>
-            <a:pPr marL="285750" indent="-285750">
-              <a:buFont typeface="Arial" panose="020B0604020202020204" pitchFamily="34" charset="0"/>
-              <a:buChar char="•"/>
-            </a:pPr>
-            <a:r>
-              <a:rPr lang="pt-BR" dirty="0"/>
-              <a:t>Gerenciador de módulos</a:t>
-            </a:r>
-          </a:p>
-          <a:p>
-            <a:pPr marL="285750" indent="-285750">
-              <a:buFont typeface="Arial" panose="020B0604020202020204" pitchFamily="34" charset="0"/>
-              <a:buChar char="•"/>
-            </a:pPr>
-            <a:endParaRPr lang="pt-BR" dirty="0"/>
-          </a:p>
-        </p:txBody>
-      </p:sp>
-      <p:cxnSp>
-        <p:nvCxnSpPr>
-          <p:cNvPr id="42" name="Conector angulado 41"/>
-          <p:cNvCxnSpPr>
-            <a:stCxn id="9" idx="2"/>
-            <a:endCxn id="43" idx="1"/>
-          </p:cNvCxnSpPr>
-          <p:nvPr/>
-        </p:nvCxnSpPr>
-        <p:spPr>
-          <a:xfrm rot="16200000" flipH="1">
-            <a:off x="8481487" y="4758573"/>
-            <a:ext cx="852587" cy="420189"/>
+            <a:off x="3175423" y="4657085"/>
+            <a:ext cx="1231664" cy="772409"/>
           </a:xfrm>
           <a:prstGeom prst="bentConnector2">
             <a:avLst/>
@@ -4169,50 +4490,6 @@
       </p:sp>
       <p:sp>
         <p:nvSpPr>
-          <p:cNvPr id="32" name="Chave esquerda 19">
-            <a:extLst>
-              <a:ext uri="{FF2B5EF4-FFF2-40B4-BE49-F238E27FC236}">
-                <a16:creationId xmlns:a16="http://schemas.microsoft.com/office/drawing/2014/main" id="{44161470-5167-4DF4-83BE-CFC6A7E0F564}"/>
-              </a:ext>
-            </a:extLst>
-          </p:cNvPr>
-          <p:cNvSpPr/>
-          <p:nvPr/>
-        </p:nvSpPr>
-        <p:spPr>
-          <a:xfrm rot="16200000">
-            <a:off x="6392322" y="3526592"/>
-            <a:ext cx="235132" cy="390253"/>
-          </a:xfrm>
-          <a:prstGeom prst="leftBrace">
-            <a:avLst/>
-          </a:prstGeom>
-        </p:spPr>
-        <p:style>
-          <a:lnRef idx="1">
-            <a:schemeClr val="accent1"/>
-          </a:lnRef>
-          <a:fillRef idx="0">
-            <a:schemeClr val="accent1"/>
-          </a:fillRef>
-          <a:effectRef idx="0">
-            <a:schemeClr val="accent1"/>
-          </a:effectRef>
-          <a:fontRef idx="minor">
-            <a:schemeClr val="tx1"/>
-          </a:fontRef>
-        </p:style>
-        <p:txBody>
-          <a:bodyPr rtlCol="0" anchor="ctr"/>
-          <a:lstStyle/>
-          <a:p>
-            <a:pPr algn="ctr"/>
-            <a:endParaRPr lang="pt-BR"/>
-          </a:p>
-        </p:txBody>
-      </p:sp>
-      <p:sp>
-        <p:nvSpPr>
           <p:cNvPr id="33" name="CaixaDeTexto 32">
             <a:extLst>
               <a:ext uri="{FF2B5EF4-FFF2-40B4-BE49-F238E27FC236}">
@@ -4225,8 +4502,8 @@
         </p:nvSpPr>
         <p:spPr>
           <a:xfrm>
-            <a:off x="4860273" y="3137250"/>
-            <a:ext cx="3648892" cy="369332"/>
+            <a:off x="5424539" y="3734289"/>
+            <a:ext cx="1481218" cy="646331"/>
           </a:xfrm>
           <a:prstGeom prst="rect">
             <a:avLst/>
@@ -4239,13 +4516,17 @@
           </a:bodyPr>
           <a:lstStyle/>
           <a:p>
-            <a:pPr marL="285750" indent="-285750">
-              <a:buFont typeface="Arial" panose="020B0604020202020204" pitchFamily="34" charset="0"/>
-              <a:buChar char="•"/>
-            </a:pPr>
+            <a:pPr algn="ctr"/>
             <a:r>
               <a:rPr lang="pt-BR" dirty="0"/>
-              <a:t>Comunicação proprietária</a:t>
+              <a:t>Comunicação</a:t>
+            </a:r>
+          </a:p>
+          <a:p>
+            <a:pPr algn="ctr"/>
+            <a:r>
+              <a:rPr lang="pt-BR" dirty="0"/>
+              <a:t> genérica</a:t>
             </a:r>
           </a:p>
         </p:txBody>
@@ -4613,10 +4894,2063 @@
           </a:fontRef>
         </p:style>
       </p:cxnSp>
+      <p:sp>
+        <p:nvSpPr>
+          <p:cNvPr id="45" name="Elipse 44">
+            <a:extLst>
+              <a:ext uri="{FF2B5EF4-FFF2-40B4-BE49-F238E27FC236}">
+                <a16:creationId xmlns:a16="http://schemas.microsoft.com/office/drawing/2014/main" id="{305E31E0-C2D4-41E4-A8A8-BD98577284CF}"/>
+              </a:ext>
+            </a:extLst>
+          </p:cNvPr>
+          <p:cNvSpPr/>
+          <p:nvPr/>
+        </p:nvSpPr>
+        <p:spPr>
+          <a:xfrm>
+            <a:off x="5288762" y="1929525"/>
+            <a:ext cx="1912981" cy="914401"/>
+          </a:xfrm>
+          <a:prstGeom prst="ellipse">
+            <a:avLst/>
+          </a:prstGeom>
+          <a:solidFill>
+            <a:schemeClr val="accent6"/>
+          </a:solidFill>
+        </p:spPr>
+        <p:style>
+          <a:lnRef idx="2">
+            <a:schemeClr val="accent1">
+              <a:shade val="50000"/>
+            </a:schemeClr>
+          </a:lnRef>
+          <a:fillRef idx="1">
+            <a:schemeClr val="accent1"/>
+          </a:fillRef>
+          <a:effectRef idx="0">
+            <a:schemeClr val="accent1"/>
+          </a:effectRef>
+          <a:fontRef idx="minor">
+            <a:schemeClr val="lt1"/>
+          </a:fontRef>
+        </p:style>
+        <p:txBody>
+          <a:bodyPr rtlCol="0" anchor="ctr"/>
+          <a:lstStyle/>
+          <a:p>
+            <a:pPr algn="ctr"/>
+            <a:r>
+              <a:rPr lang="pt-BR" dirty="0"/>
+              <a:t>Simulação</a:t>
+            </a:r>
+          </a:p>
+        </p:txBody>
+      </p:sp>
+      <p:cxnSp>
+        <p:nvCxnSpPr>
+          <p:cNvPr id="24" name="Conector de Seta Reta 23">
+            <a:extLst>
+              <a:ext uri="{FF2B5EF4-FFF2-40B4-BE49-F238E27FC236}">
+                <a16:creationId xmlns:a16="http://schemas.microsoft.com/office/drawing/2014/main" id="{E09AE68E-8930-43E0-8C9E-02109A2D5419}"/>
+              </a:ext>
+            </a:extLst>
+          </p:cNvPr>
+          <p:cNvCxnSpPr>
+            <a:stCxn id="45" idx="6"/>
+            <a:endCxn id="2" idx="2"/>
+          </p:cNvCxnSpPr>
+          <p:nvPr/>
+        </p:nvCxnSpPr>
+        <p:spPr>
+          <a:xfrm>
+            <a:off x="7201743" y="2386726"/>
+            <a:ext cx="539452" cy="5151"/>
+          </a:xfrm>
+          <a:prstGeom prst="straightConnector1">
+            <a:avLst/>
+          </a:prstGeom>
+          <a:ln>
+            <a:headEnd type="triangle"/>
+            <a:tailEnd type="triangle"/>
+          </a:ln>
+        </p:spPr>
+        <p:style>
+          <a:lnRef idx="1">
+            <a:schemeClr val="accent1"/>
+          </a:lnRef>
+          <a:fillRef idx="0">
+            <a:schemeClr val="accent1"/>
+          </a:fillRef>
+          <a:effectRef idx="0">
+            <a:schemeClr val="accent1"/>
+          </a:effectRef>
+          <a:fontRef idx="minor">
+            <a:schemeClr val="tx1"/>
+          </a:fontRef>
+        </p:style>
+      </p:cxnSp>
+      <p:sp>
+        <p:nvSpPr>
+          <p:cNvPr id="47" name="Retângulo 46">
+            <a:extLst>
+              <a:ext uri="{FF2B5EF4-FFF2-40B4-BE49-F238E27FC236}">
+                <a16:creationId xmlns:a16="http://schemas.microsoft.com/office/drawing/2014/main" id="{4C50BC5B-5DEC-4B90-965A-B626311EB319}"/>
+              </a:ext>
+            </a:extLst>
+          </p:cNvPr>
+          <p:cNvSpPr/>
+          <p:nvPr/>
+        </p:nvSpPr>
+        <p:spPr>
+          <a:xfrm>
+            <a:off x="10269486" y="5390300"/>
+            <a:ext cx="1469667" cy="1241435"/>
+          </a:xfrm>
+          <a:prstGeom prst="rect">
+            <a:avLst/>
+          </a:prstGeom>
+          <a:solidFill>
+            <a:srgbClr val="FFC000"/>
+          </a:solidFill>
+        </p:spPr>
+        <p:style>
+          <a:lnRef idx="2">
+            <a:schemeClr val="accent1">
+              <a:shade val="50000"/>
+            </a:schemeClr>
+          </a:lnRef>
+          <a:fillRef idx="1">
+            <a:schemeClr val="accent1"/>
+          </a:fillRef>
+          <a:effectRef idx="0">
+            <a:schemeClr val="accent1"/>
+          </a:effectRef>
+          <a:fontRef idx="minor">
+            <a:schemeClr val="lt1"/>
+          </a:fontRef>
+        </p:style>
+        <p:txBody>
+          <a:bodyPr rtlCol="0" anchor="ctr"/>
+          <a:lstStyle/>
+          <a:p>
+            <a:pPr algn="ctr"/>
+            <a:r>
+              <a:rPr lang="pt-BR" dirty="0"/>
+              <a:t>Controle para coleta de pontos</a:t>
+            </a:r>
+          </a:p>
+        </p:txBody>
+      </p:sp>
+      <p:cxnSp>
+        <p:nvCxnSpPr>
+          <p:cNvPr id="48" name="Conector: Angulado 47">
+            <a:extLst>
+              <a:ext uri="{FF2B5EF4-FFF2-40B4-BE49-F238E27FC236}">
+                <a16:creationId xmlns:a16="http://schemas.microsoft.com/office/drawing/2014/main" id="{ABD772D5-1DF0-4E50-9ACD-B4C5E8B2B0F6}"/>
+              </a:ext>
+            </a:extLst>
+          </p:cNvPr>
+          <p:cNvCxnSpPr>
+            <a:cxnSpLocks/>
+            <a:stCxn id="9" idx="3"/>
+            <a:endCxn id="47" idx="1"/>
+          </p:cNvCxnSpPr>
+          <p:nvPr/>
+        </p:nvCxnSpPr>
+        <p:spPr>
+          <a:xfrm>
+            <a:off x="9797143" y="4085175"/>
+            <a:ext cx="472343" cy="1925843"/>
+          </a:xfrm>
+          <a:prstGeom prst="bentConnector3">
+            <a:avLst>
+              <a:gd name="adj1" fmla="val 50000"/>
+            </a:avLst>
+          </a:prstGeom>
+          <a:ln>
+            <a:headEnd type="triangle"/>
+            <a:tailEnd type="triangle"/>
+          </a:ln>
+        </p:spPr>
+        <p:style>
+          <a:lnRef idx="1">
+            <a:schemeClr val="accent1"/>
+          </a:lnRef>
+          <a:fillRef idx="0">
+            <a:schemeClr val="accent1"/>
+          </a:fillRef>
+          <a:effectRef idx="0">
+            <a:schemeClr val="accent1"/>
+          </a:effectRef>
+          <a:fontRef idx="minor">
+            <a:schemeClr val="tx1"/>
+          </a:fontRef>
+        </p:style>
+      </p:cxnSp>
     </p:spTree>
     <p:extLst>
       <p:ext uri="{BB962C8B-B14F-4D97-AF65-F5344CB8AC3E}">
         <p14:creationId xmlns:p14="http://schemas.microsoft.com/office/powerpoint/2010/main" val="3961123703"/>
+      </p:ext>
+    </p:extLst>
+  </p:cSld>
+  <p:clrMapOvr>
+    <a:masterClrMapping/>
+  </p:clrMapOvr>
+</p:sld>
+</file>
+
+<file path=ppt/slides/slide2.xml><?xml version="1.0" encoding="utf-8"?>
+<p:sld xmlns:a="http://schemas.openxmlformats.org/drawingml/2006/main" xmlns:r="http://schemas.openxmlformats.org/officeDocument/2006/relationships" xmlns:p="http://schemas.openxmlformats.org/presentationml/2006/main">
+  <p:cSld>
+    <p:spTree>
+      <p:nvGrpSpPr>
+        <p:cNvPr id="1" name=""/>
+        <p:cNvGrpSpPr/>
+        <p:nvPr/>
+      </p:nvGrpSpPr>
+      <p:grpSpPr>
+        <a:xfrm>
+          <a:off x="0" y="0"/>
+          <a:ext cx="0" cy="0"/>
+          <a:chOff x="0" y="0"/>
+          <a:chExt cx="0" cy="0"/>
+        </a:xfrm>
+      </p:grpSpPr>
+      <p:sp>
+        <p:nvSpPr>
+          <p:cNvPr id="4" name="Retângulo 3"/>
+          <p:cNvSpPr/>
+          <p:nvPr/>
+        </p:nvSpPr>
+        <p:spPr>
+          <a:xfrm>
+            <a:off x="727191" y="608035"/>
+            <a:ext cx="1275780" cy="914400"/>
+          </a:xfrm>
+          <a:prstGeom prst="rect">
+            <a:avLst/>
+          </a:prstGeom>
+          <a:solidFill>
+            <a:srgbClr val="FFC000"/>
+          </a:solidFill>
+        </p:spPr>
+        <p:style>
+          <a:lnRef idx="2">
+            <a:schemeClr val="accent1">
+              <a:shade val="50000"/>
+            </a:schemeClr>
+          </a:lnRef>
+          <a:fillRef idx="1">
+            <a:schemeClr val="accent1"/>
+          </a:fillRef>
+          <a:effectRef idx="0">
+            <a:schemeClr val="accent1"/>
+          </a:effectRef>
+          <a:fontRef idx="minor">
+            <a:schemeClr val="lt1"/>
+          </a:fontRef>
+        </p:style>
+        <p:txBody>
+          <a:bodyPr rtlCol="0" anchor="ctr"/>
+          <a:lstStyle/>
+          <a:p>
+            <a:pPr algn="ctr"/>
+            <a:r>
+              <a:rPr lang="pt-BR" dirty="0"/>
+              <a:t>DJI </a:t>
+            </a:r>
+            <a:r>
+              <a:rPr lang="pt-BR" i="1" dirty="0"/>
+              <a:t>Inspire</a:t>
+            </a:r>
+            <a:r>
+              <a:rPr lang="pt-BR" dirty="0"/>
+              <a:t> 1</a:t>
+            </a:r>
+          </a:p>
+        </p:txBody>
+      </p:sp>
+      <p:sp>
+        <p:nvSpPr>
+          <p:cNvPr id="5" name="Retângulo 4"/>
+          <p:cNvSpPr/>
+          <p:nvPr/>
+        </p:nvSpPr>
+        <p:spPr>
+          <a:xfrm>
+            <a:off x="725321" y="3661956"/>
+            <a:ext cx="1277650" cy="914400"/>
+          </a:xfrm>
+          <a:prstGeom prst="rect">
+            <a:avLst/>
+          </a:prstGeom>
+          <a:solidFill>
+            <a:srgbClr val="FFC000"/>
+          </a:solidFill>
+        </p:spPr>
+        <p:style>
+          <a:lnRef idx="2">
+            <a:schemeClr val="accent1">
+              <a:shade val="50000"/>
+            </a:schemeClr>
+          </a:lnRef>
+          <a:fillRef idx="1">
+            <a:schemeClr val="accent1"/>
+          </a:fillRef>
+          <a:effectRef idx="0">
+            <a:schemeClr val="accent1"/>
+          </a:effectRef>
+          <a:fontRef idx="minor">
+            <a:schemeClr val="lt1"/>
+          </a:fontRef>
+        </p:style>
+        <p:txBody>
+          <a:bodyPr rtlCol="0" anchor="ctr"/>
+          <a:lstStyle/>
+          <a:p>
+            <a:pPr algn="ctr"/>
+            <a:r>
+              <a:rPr lang="pt-BR" dirty="0"/>
+              <a:t>GL658A</a:t>
+            </a:r>
+          </a:p>
+          <a:p>
+            <a:pPr algn="ctr"/>
+            <a:r>
+              <a:rPr lang="pt-BR" dirty="0"/>
+              <a:t>RC</a:t>
+            </a:r>
+          </a:p>
+        </p:txBody>
+      </p:sp>
+      <p:sp>
+        <p:nvSpPr>
+          <p:cNvPr id="6" name="Elipse 5"/>
+          <p:cNvSpPr/>
+          <p:nvPr/>
+        </p:nvSpPr>
+        <p:spPr>
+          <a:xfrm>
+            <a:off x="4014347" y="3795564"/>
+            <a:ext cx="1743267" cy="631578"/>
+          </a:xfrm>
+          <a:prstGeom prst="ellipse">
+            <a:avLst/>
+          </a:prstGeom>
+          <a:solidFill>
+            <a:schemeClr val="accent6"/>
+          </a:solidFill>
+        </p:spPr>
+        <p:style>
+          <a:lnRef idx="2">
+            <a:schemeClr val="accent1">
+              <a:shade val="50000"/>
+            </a:schemeClr>
+          </a:lnRef>
+          <a:fillRef idx="1">
+            <a:schemeClr val="accent1"/>
+          </a:fillRef>
+          <a:effectRef idx="0">
+            <a:schemeClr val="accent1"/>
+          </a:effectRef>
+          <a:fontRef idx="minor">
+            <a:schemeClr val="lt1"/>
+          </a:fontRef>
+        </p:style>
+        <p:txBody>
+          <a:bodyPr rtlCol="0" anchor="ctr"/>
+          <a:lstStyle/>
+          <a:p>
+            <a:pPr algn="ctr"/>
+            <a:r>
+              <a:rPr lang="pt-BR" sz="1600" dirty="0"/>
+              <a:t>Gerenciador de Voo</a:t>
+            </a:r>
+          </a:p>
+        </p:txBody>
+      </p:sp>
+      <p:sp>
+        <p:nvSpPr>
+          <p:cNvPr id="9" name="Retângulo 8"/>
+          <p:cNvSpPr/>
+          <p:nvPr/>
+        </p:nvSpPr>
+        <p:spPr>
+          <a:xfrm>
+            <a:off x="7598229" y="3627975"/>
+            <a:ext cx="2198914" cy="914400"/>
+          </a:xfrm>
+          <a:prstGeom prst="rect">
+            <a:avLst/>
+          </a:prstGeom>
+          <a:solidFill>
+            <a:srgbClr val="FFC000"/>
+          </a:solidFill>
+        </p:spPr>
+        <p:style>
+          <a:lnRef idx="2">
+            <a:schemeClr val="accent1">
+              <a:shade val="50000"/>
+            </a:schemeClr>
+          </a:lnRef>
+          <a:fillRef idx="1">
+            <a:schemeClr val="accent1"/>
+          </a:fillRef>
+          <a:effectRef idx="0">
+            <a:schemeClr val="accent1"/>
+          </a:effectRef>
+          <a:fontRef idx="minor">
+            <a:schemeClr val="lt1"/>
+          </a:fontRef>
+        </p:style>
+        <p:txBody>
+          <a:bodyPr rtlCol="0" anchor="ctr"/>
+          <a:lstStyle/>
+          <a:p>
+            <a:pPr algn="ctr"/>
+            <a:r>
+              <a:rPr lang="pt-BR" dirty="0"/>
+              <a:t>Estação de comando:</a:t>
+            </a:r>
+          </a:p>
+          <a:p>
+            <a:pPr algn="ctr"/>
+            <a:r>
+              <a:rPr lang="pt-BR" dirty="0"/>
+              <a:t>MSI GL62M 7 REX + Linux</a:t>
+            </a:r>
+          </a:p>
+        </p:txBody>
+      </p:sp>
+      <p:sp>
+        <p:nvSpPr>
+          <p:cNvPr id="10" name="CaixaDeTexto 9"/>
+          <p:cNvSpPr txBox="1"/>
+          <p:nvPr/>
+        </p:nvSpPr>
+        <p:spPr>
+          <a:xfrm>
+            <a:off x="2623718" y="456530"/>
+            <a:ext cx="2612139" cy="1200329"/>
+          </a:xfrm>
+          <a:prstGeom prst="rect">
+            <a:avLst/>
+          </a:prstGeom>
+          <a:noFill/>
+        </p:spPr>
+        <p:txBody>
+          <a:bodyPr wrap="square" rtlCol="0">
+            <a:spAutoFit/>
+          </a:bodyPr>
+          <a:lstStyle/>
+          <a:p>
+            <a:pPr marL="285750" indent="-285750">
+              <a:buFont typeface="Arial" panose="020B0604020202020204" pitchFamily="34" charset="0"/>
+              <a:buChar char="•"/>
+            </a:pPr>
+            <a:r>
+              <a:rPr lang="pt-BR" dirty="0"/>
+              <a:t>Controlador de voo</a:t>
+            </a:r>
+          </a:p>
+          <a:p>
+            <a:pPr marL="285750" indent="-285750">
+              <a:buFont typeface="Arial" panose="020B0604020202020204" pitchFamily="34" charset="0"/>
+              <a:buChar char="•"/>
+            </a:pPr>
+            <a:r>
+              <a:rPr lang="pt-BR" dirty="0"/>
+              <a:t>Controlador de execução de missões</a:t>
+            </a:r>
+          </a:p>
+          <a:p>
+            <a:pPr marL="285750" indent="-285750">
+              <a:buFont typeface="Arial" panose="020B0604020202020204" pitchFamily="34" charset="0"/>
+              <a:buChar char="•"/>
+            </a:pPr>
+            <a:r>
+              <a:rPr lang="pt-BR" dirty="0"/>
+              <a:t>IMU e GPS</a:t>
+            </a:r>
+          </a:p>
+        </p:txBody>
+      </p:sp>
+      <p:sp>
+        <p:nvSpPr>
+          <p:cNvPr id="11" name="Chave esquerda 10"/>
+          <p:cNvSpPr/>
+          <p:nvPr/>
+        </p:nvSpPr>
+        <p:spPr>
+          <a:xfrm>
+            <a:off x="2360022" y="510537"/>
+            <a:ext cx="235132" cy="1101911"/>
+          </a:xfrm>
+          <a:prstGeom prst="leftBrace">
+            <a:avLst/>
+          </a:prstGeom>
+        </p:spPr>
+        <p:style>
+          <a:lnRef idx="1">
+            <a:schemeClr val="accent1"/>
+          </a:lnRef>
+          <a:fillRef idx="0">
+            <a:schemeClr val="accent1"/>
+          </a:fillRef>
+          <a:effectRef idx="0">
+            <a:schemeClr val="accent1"/>
+          </a:effectRef>
+          <a:fontRef idx="minor">
+            <a:schemeClr val="tx1"/>
+          </a:fontRef>
+        </p:style>
+        <p:txBody>
+          <a:bodyPr rtlCol="0" anchor="ctr"/>
+          <a:lstStyle/>
+          <a:p>
+            <a:pPr algn="ctr"/>
+            <a:endParaRPr lang="pt-BR"/>
+          </a:p>
+        </p:txBody>
+      </p:sp>
+      <p:pic>
+        <p:nvPicPr>
+          <p:cNvPr id="1028" name="Picture 4" descr="Imagem relacionada"/>
+          <p:cNvPicPr>
+            <a:picLocks noChangeAspect="1" noChangeArrowheads="1"/>
+          </p:cNvPicPr>
+          <p:nvPr/>
+        </p:nvPicPr>
+        <p:blipFill>
+          <a:blip r:embed="rId3" cstate="print">
+            <a:extLst>
+              <a:ext uri="{28A0092B-C50C-407E-A947-70E740481C1C}">
+                <a14:useLocalDpi xmlns:a14="http://schemas.microsoft.com/office/drawing/2010/main" val="0"/>
+              </a:ext>
+            </a:extLst>
+          </a:blip>
+          <a:srcRect/>
+          <a:stretch>
+            <a:fillRect/>
+          </a:stretch>
+        </p:blipFill>
+        <p:spPr bwMode="auto">
+          <a:xfrm>
+            <a:off x="1052150" y="2882266"/>
+            <a:ext cx="601162" cy="601162"/>
+          </a:xfrm>
+          <a:prstGeom prst="rect">
+            <a:avLst/>
+          </a:prstGeom>
+          <a:noFill/>
+          <a:extLst>
+            <a:ext uri="{909E8E84-426E-40DD-AFC4-6F175D3DCCD1}">
+              <a14:hiddenFill xmlns:a14="http://schemas.microsoft.com/office/drawing/2010/main">
+                <a:solidFill>
+                  <a:srgbClr val="FFFFFF"/>
+                </a:solidFill>
+              </a14:hiddenFill>
+            </a:ext>
+          </a:extLst>
+        </p:spPr>
+      </p:pic>
+      <p:pic>
+        <p:nvPicPr>
+          <p:cNvPr id="17" name="Picture 4" descr="Imagem relacionada"/>
+          <p:cNvPicPr>
+            <a:picLocks noChangeAspect="1" noChangeArrowheads="1"/>
+          </p:cNvPicPr>
+          <p:nvPr/>
+        </p:nvPicPr>
+        <p:blipFill>
+          <a:blip r:embed="rId3" cstate="print">
+            <a:extLst>
+              <a:ext uri="{28A0092B-C50C-407E-A947-70E740481C1C}">
+                <a14:useLocalDpi xmlns:a14="http://schemas.microsoft.com/office/drawing/2010/main" val="0"/>
+              </a:ext>
+            </a:extLst>
+          </a:blip>
+          <a:srcRect/>
+          <a:stretch>
+            <a:fillRect/>
+          </a:stretch>
+        </p:blipFill>
+        <p:spPr bwMode="auto">
+          <a:xfrm rot="10800000">
+            <a:off x="1072470" y="1690452"/>
+            <a:ext cx="601162" cy="601162"/>
+          </a:xfrm>
+          <a:prstGeom prst="rect">
+            <a:avLst/>
+          </a:prstGeom>
+          <a:noFill/>
+          <a:extLst>
+            <a:ext uri="{909E8E84-426E-40DD-AFC4-6F175D3DCCD1}">
+              <a14:hiddenFill xmlns:a14="http://schemas.microsoft.com/office/drawing/2010/main">
+                <a:solidFill>
+                  <a:srgbClr val="FFFFFF"/>
+                </a:solidFill>
+              </a14:hiddenFill>
+            </a:ext>
+          </a:extLst>
+        </p:spPr>
+      </p:pic>
+      <p:pic>
+        <p:nvPicPr>
+          <p:cNvPr id="18" name="Picture 4" descr="Imagem relacionada"/>
+          <p:cNvPicPr>
+            <a:picLocks noChangeAspect="1" noChangeArrowheads="1"/>
+          </p:cNvPicPr>
+          <p:nvPr/>
+        </p:nvPicPr>
+        <p:blipFill>
+          <a:blip r:embed="rId3" cstate="print">
+            <a:extLst>
+              <a:ext uri="{28A0092B-C50C-407E-A947-70E740481C1C}">
+                <a14:useLocalDpi xmlns:a14="http://schemas.microsoft.com/office/drawing/2010/main" val="0"/>
+              </a:ext>
+            </a:extLst>
+          </a:blip>
+          <a:srcRect/>
+          <a:stretch>
+            <a:fillRect/>
+          </a:stretch>
+        </p:blipFill>
+        <p:spPr bwMode="auto">
+          <a:xfrm rot="5400000">
+            <a:off x="5800521" y="3810719"/>
+            <a:ext cx="601162" cy="601162"/>
+          </a:xfrm>
+          <a:prstGeom prst="rect">
+            <a:avLst/>
+          </a:prstGeom>
+          <a:noFill/>
+          <a:extLst>
+            <a:ext uri="{909E8E84-426E-40DD-AFC4-6F175D3DCCD1}">
+              <a14:hiddenFill xmlns:a14="http://schemas.microsoft.com/office/drawing/2010/main">
+                <a:solidFill>
+                  <a:srgbClr val="FFFFFF"/>
+                </a:solidFill>
+              </a14:hiddenFill>
+            </a:ext>
+          </a:extLst>
+        </p:spPr>
+      </p:pic>
+      <p:pic>
+        <p:nvPicPr>
+          <p:cNvPr id="19" name="Picture 4" descr="Imagem relacionada"/>
+          <p:cNvPicPr>
+            <a:picLocks noChangeAspect="1" noChangeArrowheads="1"/>
+          </p:cNvPicPr>
+          <p:nvPr/>
+        </p:nvPicPr>
+        <p:blipFill>
+          <a:blip r:embed="rId3" cstate="print">
+            <a:extLst>
+              <a:ext uri="{28A0092B-C50C-407E-A947-70E740481C1C}">
+                <a14:useLocalDpi xmlns:a14="http://schemas.microsoft.com/office/drawing/2010/main" val="0"/>
+              </a:ext>
+            </a:extLst>
+          </a:blip>
+          <a:srcRect/>
+          <a:stretch>
+            <a:fillRect/>
+          </a:stretch>
+        </p:blipFill>
+        <p:spPr bwMode="auto">
+          <a:xfrm rot="16200000">
+            <a:off x="7031312" y="3800560"/>
+            <a:ext cx="601162" cy="601162"/>
+          </a:xfrm>
+          <a:prstGeom prst="rect">
+            <a:avLst/>
+          </a:prstGeom>
+          <a:noFill/>
+          <a:extLst>
+            <a:ext uri="{909E8E84-426E-40DD-AFC4-6F175D3DCCD1}">
+              <a14:hiddenFill xmlns:a14="http://schemas.microsoft.com/office/drawing/2010/main">
+                <a:solidFill>
+                  <a:srgbClr val="FFFFFF"/>
+                </a:solidFill>
+              </a14:hiddenFill>
+            </a:ext>
+          </a:extLst>
+        </p:spPr>
+      </p:pic>
+      <p:sp>
+        <p:nvSpPr>
+          <p:cNvPr id="15" name="CaixaDeTexto 14"/>
+          <p:cNvSpPr txBox="1"/>
+          <p:nvPr/>
+        </p:nvSpPr>
+        <p:spPr>
+          <a:xfrm>
+            <a:off x="583081" y="2422500"/>
+            <a:ext cx="1634701" cy="369332"/>
+          </a:xfrm>
+          <a:prstGeom prst="rect">
+            <a:avLst/>
+          </a:prstGeom>
+          <a:noFill/>
+        </p:spPr>
+        <p:txBody>
+          <a:bodyPr wrap="square" rtlCol="0">
+            <a:spAutoFit/>
+          </a:bodyPr>
+          <a:lstStyle/>
+          <a:p>
+            <a:r>
+              <a:rPr lang="pt-BR" dirty="0"/>
+              <a:t>DJI </a:t>
+            </a:r>
+            <a:r>
+              <a:rPr lang="pt-BR" i="1" dirty="0"/>
+              <a:t>LightBridge</a:t>
+            </a:r>
+          </a:p>
+        </p:txBody>
+      </p:sp>
+      <p:sp>
+        <p:nvSpPr>
+          <p:cNvPr id="22" name="Chave esquerda 21"/>
+          <p:cNvSpPr/>
+          <p:nvPr/>
+        </p:nvSpPr>
+        <p:spPr>
+          <a:xfrm>
+            <a:off x="452847" y="4965993"/>
+            <a:ext cx="127516" cy="1045025"/>
+          </a:xfrm>
+          <a:prstGeom prst="leftBrace">
+            <a:avLst/>
+          </a:prstGeom>
+        </p:spPr>
+        <p:style>
+          <a:lnRef idx="1">
+            <a:schemeClr val="accent1"/>
+          </a:lnRef>
+          <a:fillRef idx="0">
+            <a:schemeClr val="accent1"/>
+          </a:fillRef>
+          <a:effectRef idx="0">
+            <a:schemeClr val="accent1"/>
+          </a:effectRef>
+          <a:fontRef idx="minor">
+            <a:schemeClr val="tx1"/>
+          </a:fontRef>
+        </p:style>
+        <p:txBody>
+          <a:bodyPr rtlCol="0" anchor="ctr"/>
+          <a:lstStyle/>
+          <a:p>
+            <a:pPr algn="ctr"/>
+            <a:endParaRPr lang="pt-BR"/>
+          </a:p>
+        </p:txBody>
+      </p:sp>
+      <p:sp>
+        <p:nvSpPr>
+          <p:cNvPr id="23" name="CaixaDeTexto 22"/>
+          <p:cNvSpPr txBox="1"/>
+          <p:nvPr/>
+        </p:nvSpPr>
+        <p:spPr>
+          <a:xfrm>
+            <a:off x="644864" y="4983603"/>
+            <a:ext cx="1978854" cy="1200329"/>
+          </a:xfrm>
+          <a:prstGeom prst="rect">
+            <a:avLst/>
+          </a:prstGeom>
+          <a:noFill/>
+        </p:spPr>
+        <p:txBody>
+          <a:bodyPr wrap="square" rtlCol="0">
+            <a:spAutoFit/>
+          </a:bodyPr>
+          <a:lstStyle/>
+          <a:p>
+            <a:pPr marL="285750" indent="-285750">
+              <a:buFont typeface="Arial" panose="020B0604020202020204" pitchFamily="34" charset="0"/>
+              <a:buChar char="•"/>
+            </a:pPr>
+            <a:r>
+              <a:rPr lang="pt-BR" dirty="0"/>
+              <a:t>Controle Manual</a:t>
+            </a:r>
+          </a:p>
+          <a:p>
+            <a:pPr marL="285750" indent="-285750">
+              <a:buFont typeface="Arial" panose="020B0604020202020204" pitchFamily="34" charset="0"/>
+              <a:buChar char="•"/>
+            </a:pPr>
+            <a:r>
+              <a:rPr lang="pt-BR" i="1" dirty="0"/>
+              <a:t>Takeoff</a:t>
+            </a:r>
+          </a:p>
+          <a:p>
+            <a:pPr marL="285750" indent="-285750">
+              <a:buFont typeface="Arial" panose="020B0604020202020204" pitchFamily="34" charset="0"/>
+              <a:buChar char="•"/>
+            </a:pPr>
+            <a:r>
+              <a:rPr lang="pt-BR" i="1" dirty="0"/>
+              <a:t>Landing</a:t>
+            </a:r>
+          </a:p>
+        </p:txBody>
+      </p:sp>
+      <p:cxnSp>
+        <p:nvCxnSpPr>
+          <p:cNvPr id="21" name="Conector angulado 20"/>
+          <p:cNvCxnSpPr>
+            <a:cxnSpLocks/>
+            <a:stCxn id="5" idx="1"/>
+            <a:endCxn id="22" idx="1"/>
+          </p:cNvCxnSpPr>
+          <p:nvPr/>
+        </p:nvCxnSpPr>
+        <p:spPr>
+          <a:xfrm rot="10800000" flipV="1">
+            <a:off x="452847" y="4119156"/>
+            <a:ext cx="272474" cy="1369350"/>
+          </a:xfrm>
+          <a:prstGeom prst="bentConnector3">
+            <a:avLst>
+              <a:gd name="adj1" fmla="val 183898"/>
+            </a:avLst>
+          </a:prstGeom>
+          <a:ln>
+            <a:tailEnd type="triangle"/>
+          </a:ln>
+        </p:spPr>
+        <p:style>
+          <a:lnRef idx="1">
+            <a:schemeClr val="accent1"/>
+          </a:lnRef>
+          <a:fillRef idx="0">
+            <a:schemeClr val="accent1"/>
+          </a:fillRef>
+          <a:effectRef idx="0">
+            <a:schemeClr val="accent1"/>
+          </a:effectRef>
+          <a:fontRef idx="minor">
+            <a:schemeClr val="tx1"/>
+          </a:fontRef>
+        </p:style>
+      </p:cxnSp>
+      <p:cxnSp>
+        <p:nvCxnSpPr>
+          <p:cNvPr id="25" name="Conector de seta reta 24"/>
+          <p:cNvCxnSpPr>
+            <a:cxnSpLocks/>
+            <a:stCxn id="4" idx="3"/>
+            <a:endCxn id="11" idx="1"/>
+          </p:cNvCxnSpPr>
+          <p:nvPr/>
+        </p:nvCxnSpPr>
+        <p:spPr>
+          <a:xfrm flipV="1">
+            <a:off x="2002971" y="1061493"/>
+            <a:ext cx="357051" cy="3742"/>
+          </a:xfrm>
+          <a:prstGeom prst="straightConnector1">
+            <a:avLst/>
+          </a:prstGeom>
+          <a:ln>
+            <a:tailEnd type="triangle"/>
+          </a:ln>
+        </p:spPr>
+        <p:style>
+          <a:lnRef idx="1">
+            <a:schemeClr val="accent1"/>
+          </a:lnRef>
+          <a:fillRef idx="0">
+            <a:schemeClr val="accent1"/>
+          </a:fillRef>
+          <a:effectRef idx="0">
+            <a:schemeClr val="accent1"/>
+          </a:effectRef>
+          <a:fontRef idx="minor">
+            <a:schemeClr val="tx1"/>
+          </a:fontRef>
+        </p:style>
+      </p:cxnSp>
+      <p:sp>
+        <p:nvSpPr>
+          <p:cNvPr id="38" name="Chave esquerda 37"/>
+          <p:cNvSpPr/>
+          <p:nvPr/>
+        </p:nvSpPr>
+        <p:spPr>
+          <a:xfrm>
+            <a:off x="5372343" y="4672770"/>
+            <a:ext cx="241619" cy="1808477"/>
+          </a:xfrm>
+          <a:prstGeom prst="leftBrace">
+            <a:avLst/>
+          </a:prstGeom>
+        </p:spPr>
+        <p:style>
+          <a:lnRef idx="1">
+            <a:schemeClr val="accent1"/>
+          </a:lnRef>
+          <a:fillRef idx="0">
+            <a:schemeClr val="accent1"/>
+          </a:fillRef>
+          <a:effectRef idx="0">
+            <a:schemeClr val="accent1"/>
+          </a:effectRef>
+          <a:fontRef idx="minor">
+            <a:schemeClr val="tx1"/>
+          </a:fontRef>
+        </p:style>
+        <p:txBody>
+          <a:bodyPr rtlCol="0" anchor="ctr"/>
+          <a:lstStyle/>
+          <a:p>
+            <a:pPr algn="ctr"/>
+            <a:endParaRPr lang="pt-BR"/>
+          </a:p>
+        </p:txBody>
+      </p:sp>
+      <p:sp>
+        <p:nvSpPr>
+          <p:cNvPr id="39" name="CaixaDeTexto 38"/>
+          <p:cNvSpPr txBox="1"/>
+          <p:nvPr/>
+        </p:nvSpPr>
+        <p:spPr>
+          <a:xfrm>
+            <a:off x="5574206" y="4734566"/>
+            <a:ext cx="3373134" cy="2031325"/>
+          </a:xfrm>
+          <a:prstGeom prst="rect">
+            <a:avLst/>
+          </a:prstGeom>
+          <a:noFill/>
+        </p:spPr>
+        <p:txBody>
+          <a:bodyPr wrap="square" rtlCol="0">
+            <a:spAutoFit/>
+          </a:bodyPr>
+          <a:lstStyle/>
+          <a:p>
+            <a:pPr marL="285750" indent="-285750">
+              <a:buFont typeface="Arial" panose="020B0604020202020204" pitchFamily="34" charset="0"/>
+              <a:buChar char="•"/>
+            </a:pPr>
+            <a:r>
+              <a:rPr lang="pt-BR" dirty="0"/>
+              <a:t>Enviar ao VANT missões</a:t>
+            </a:r>
+          </a:p>
+          <a:p>
+            <a:pPr marL="285750" indent="-285750">
+              <a:buFont typeface="Arial" panose="020B0604020202020204" pitchFamily="34" charset="0"/>
+              <a:buChar char="•"/>
+            </a:pPr>
+            <a:r>
+              <a:rPr lang="pt-BR" dirty="0"/>
+              <a:t>Receber comandos da estação de comando</a:t>
+            </a:r>
+          </a:p>
+          <a:p>
+            <a:pPr marL="285750" indent="-285750">
+              <a:buFont typeface="Arial" panose="020B0604020202020204" pitchFamily="34" charset="0"/>
+              <a:buChar char="•"/>
+            </a:pPr>
+            <a:r>
+              <a:rPr lang="pt-BR" dirty="0"/>
+              <a:t>Simular o controlador de voo</a:t>
+            </a:r>
+          </a:p>
+          <a:p>
+            <a:pPr marL="285750" indent="-285750">
+              <a:buFont typeface="Arial" panose="020B0604020202020204" pitchFamily="34" charset="0"/>
+              <a:buChar char="•"/>
+            </a:pPr>
+            <a:r>
+              <a:rPr lang="pt-BR" dirty="0"/>
+              <a:t>Enviar ao simulador de VANT missões</a:t>
+            </a:r>
+          </a:p>
+          <a:p>
+            <a:pPr marL="285750" indent="-285750">
+              <a:buFont typeface="Arial" panose="020B0604020202020204" pitchFamily="34" charset="0"/>
+              <a:buChar char="•"/>
+            </a:pPr>
+            <a:endParaRPr lang="pt-BR" dirty="0"/>
+          </a:p>
+        </p:txBody>
+      </p:sp>
+      <p:cxnSp>
+        <p:nvCxnSpPr>
+          <p:cNvPr id="37" name="Conector angulado 36"/>
+          <p:cNvCxnSpPr>
+            <a:cxnSpLocks/>
+            <a:stCxn id="6" idx="4"/>
+            <a:endCxn id="38" idx="1"/>
+          </p:cNvCxnSpPr>
+          <p:nvPr/>
+        </p:nvCxnSpPr>
+        <p:spPr>
+          <a:xfrm rot="16200000" flipH="1">
+            <a:off x="4554229" y="4758894"/>
+            <a:ext cx="1149867" cy="486362"/>
+          </a:xfrm>
+          <a:prstGeom prst="bentConnector2">
+            <a:avLst/>
+          </a:prstGeom>
+          <a:ln>
+            <a:tailEnd type="triangle"/>
+          </a:ln>
+        </p:spPr>
+        <p:style>
+          <a:lnRef idx="1">
+            <a:schemeClr val="accent1"/>
+          </a:lnRef>
+          <a:fillRef idx="0">
+            <a:schemeClr val="accent1"/>
+          </a:fillRef>
+          <a:effectRef idx="0">
+            <a:schemeClr val="accent1"/>
+          </a:effectRef>
+          <a:fontRef idx="minor">
+            <a:schemeClr val="tx1"/>
+          </a:fontRef>
+        </p:style>
+      </p:cxnSp>
+      <p:sp>
+        <p:nvSpPr>
+          <p:cNvPr id="2" name="Elipse 1">
+            <a:extLst>
+              <a:ext uri="{FF2B5EF4-FFF2-40B4-BE49-F238E27FC236}">
+                <a16:creationId xmlns:a16="http://schemas.microsoft.com/office/drawing/2014/main" id="{71B6F9EF-9A70-41A5-83B7-D18BC1AE6D06}"/>
+              </a:ext>
+            </a:extLst>
+          </p:cNvPr>
+          <p:cNvSpPr/>
+          <p:nvPr/>
+        </p:nvSpPr>
+        <p:spPr>
+          <a:xfrm>
+            <a:off x="7741195" y="1934676"/>
+            <a:ext cx="1912981" cy="914401"/>
+          </a:xfrm>
+          <a:prstGeom prst="ellipse">
+            <a:avLst/>
+          </a:prstGeom>
+          <a:solidFill>
+            <a:schemeClr val="accent6"/>
+          </a:solidFill>
+        </p:spPr>
+        <p:style>
+          <a:lnRef idx="2">
+            <a:schemeClr val="accent1">
+              <a:shade val="50000"/>
+            </a:schemeClr>
+          </a:lnRef>
+          <a:fillRef idx="1">
+            <a:schemeClr val="accent1"/>
+          </a:fillRef>
+          <a:effectRef idx="0">
+            <a:schemeClr val="accent1"/>
+          </a:effectRef>
+          <a:fontRef idx="minor">
+            <a:schemeClr val="lt1"/>
+          </a:fontRef>
+        </p:style>
+        <p:txBody>
+          <a:bodyPr rtlCol="0" anchor="ctr"/>
+          <a:lstStyle/>
+          <a:p>
+            <a:pPr algn="ctr"/>
+            <a:r>
+              <a:rPr lang="pt-BR" sz="1600" dirty="0"/>
+              <a:t>Gerenciador de módulos: ROS</a:t>
+            </a:r>
+          </a:p>
+        </p:txBody>
+      </p:sp>
+      <p:sp>
+        <p:nvSpPr>
+          <p:cNvPr id="27" name="Elipse 26">
+            <a:extLst>
+              <a:ext uri="{FF2B5EF4-FFF2-40B4-BE49-F238E27FC236}">
+                <a16:creationId xmlns:a16="http://schemas.microsoft.com/office/drawing/2014/main" id="{BA8D2E14-7616-4A27-8EF4-049D69493936}"/>
+              </a:ext>
+            </a:extLst>
+          </p:cNvPr>
+          <p:cNvSpPr/>
+          <p:nvPr/>
+        </p:nvSpPr>
+        <p:spPr>
+          <a:xfrm>
+            <a:off x="10038683" y="348126"/>
+            <a:ext cx="1912981" cy="914401"/>
+          </a:xfrm>
+          <a:prstGeom prst="ellipse">
+            <a:avLst/>
+          </a:prstGeom>
+          <a:solidFill>
+            <a:schemeClr val="accent6"/>
+          </a:solidFill>
+        </p:spPr>
+        <p:style>
+          <a:lnRef idx="2">
+            <a:schemeClr val="accent1">
+              <a:shade val="50000"/>
+            </a:schemeClr>
+          </a:lnRef>
+          <a:fillRef idx="1">
+            <a:schemeClr val="accent1"/>
+          </a:fillRef>
+          <a:effectRef idx="0">
+            <a:schemeClr val="accent1"/>
+          </a:effectRef>
+          <a:fontRef idx="minor">
+            <a:schemeClr val="lt1"/>
+          </a:fontRef>
+        </p:style>
+        <p:txBody>
+          <a:bodyPr rtlCol="0" anchor="ctr"/>
+          <a:lstStyle/>
+          <a:p>
+            <a:pPr algn="ctr"/>
+            <a:r>
+              <a:rPr lang="pt-BR" dirty="0"/>
+              <a:t>Atualizador de mapa</a:t>
+            </a:r>
+          </a:p>
+        </p:txBody>
+      </p:sp>
+      <p:sp>
+        <p:nvSpPr>
+          <p:cNvPr id="28" name="Elipse 27">
+            <a:extLst>
+              <a:ext uri="{FF2B5EF4-FFF2-40B4-BE49-F238E27FC236}">
+                <a16:creationId xmlns:a16="http://schemas.microsoft.com/office/drawing/2014/main" id="{8D7634C4-6B52-4729-964F-6938FFCD8DB5}"/>
+              </a:ext>
+            </a:extLst>
+          </p:cNvPr>
+          <p:cNvSpPr/>
+          <p:nvPr/>
+        </p:nvSpPr>
+        <p:spPr>
+          <a:xfrm>
+            <a:off x="7747545" y="349743"/>
+            <a:ext cx="1912981" cy="914401"/>
+          </a:xfrm>
+          <a:prstGeom prst="ellipse">
+            <a:avLst/>
+          </a:prstGeom>
+          <a:solidFill>
+            <a:schemeClr val="accent6"/>
+          </a:solidFill>
+        </p:spPr>
+        <p:style>
+          <a:lnRef idx="2">
+            <a:schemeClr val="accent1">
+              <a:shade val="50000"/>
+            </a:schemeClr>
+          </a:lnRef>
+          <a:fillRef idx="1">
+            <a:schemeClr val="accent1"/>
+          </a:fillRef>
+          <a:effectRef idx="0">
+            <a:schemeClr val="accent1"/>
+          </a:effectRef>
+          <a:fontRef idx="minor">
+            <a:schemeClr val="lt1"/>
+          </a:fontRef>
+        </p:style>
+        <p:txBody>
+          <a:bodyPr rtlCol="0" anchor="ctr"/>
+          <a:lstStyle/>
+          <a:p>
+            <a:pPr algn="ctr"/>
+            <a:r>
+              <a:rPr lang="pt-BR" dirty="0"/>
+              <a:t>Aquisição de pontos</a:t>
+            </a:r>
+          </a:p>
+        </p:txBody>
+      </p:sp>
+      <p:sp>
+        <p:nvSpPr>
+          <p:cNvPr id="29" name="Elipse 28">
+            <a:extLst>
+              <a:ext uri="{FF2B5EF4-FFF2-40B4-BE49-F238E27FC236}">
+                <a16:creationId xmlns:a16="http://schemas.microsoft.com/office/drawing/2014/main" id="{743D010C-5F6D-4DC1-890A-E9695FA4A132}"/>
+              </a:ext>
+            </a:extLst>
+          </p:cNvPr>
+          <p:cNvSpPr/>
+          <p:nvPr/>
+        </p:nvSpPr>
+        <p:spPr>
+          <a:xfrm>
+            <a:off x="10136778" y="1937179"/>
+            <a:ext cx="1912981" cy="914401"/>
+          </a:xfrm>
+          <a:prstGeom prst="ellipse">
+            <a:avLst/>
+          </a:prstGeom>
+          <a:solidFill>
+            <a:schemeClr val="accent6"/>
+          </a:solidFill>
+        </p:spPr>
+        <p:style>
+          <a:lnRef idx="2">
+            <a:schemeClr val="accent1">
+              <a:shade val="50000"/>
+            </a:schemeClr>
+          </a:lnRef>
+          <a:fillRef idx="1">
+            <a:schemeClr val="accent1"/>
+          </a:fillRef>
+          <a:effectRef idx="0">
+            <a:schemeClr val="accent1"/>
+          </a:effectRef>
+          <a:fontRef idx="minor">
+            <a:schemeClr val="lt1"/>
+          </a:fontRef>
+        </p:style>
+        <p:txBody>
+          <a:bodyPr rtlCol="0" anchor="ctr"/>
+          <a:lstStyle/>
+          <a:p>
+            <a:pPr algn="ctr"/>
+            <a:r>
+              <a:rPr lang="pt-BR" dirty="0"/>
+              <a:t>Executor de rotas</a:t>
+            </a:r>
+          </a:p>
+        </p:txBody>
+      </p:sp>
+      <p:sp>
+        <p:nvSpPr>
+          <p:cNvPr id="33" name="CaixaDeTexto 32">
+            <a:extLst>
+              <a:ext uri="{FF2B5EF4-FFF2-40B4-BE49-F238E27FC236}">
+                <a16:creationId xmlns:a16="http://schemas.microsoft.com/office/drawing/2014/main" id="{C16E10F4-1F46-4E5E-97B4-68C22B3B074A}"/>
+              </a:ext>
+            </a:extLst>
+          </p:cNvPr>
+          <p:cNvSpPr txBox="1"/>
+          <p:nvPr/>
+        </p:nvSpPr>
+        <p:spPr>
+          <a:xfrm>
+            <a:off x="6192647" y="3912882"/>
+            <a:ext cx="1037646" cy="369332"/>
+          </a:xfrm>
+          <a:prstGeom prst="rect">
+            <a:avLst/>
+          </a:prstGeom>
+          <a:noFill/>
+        </p:spPr>
+        <p:txBody>
+          <a:bodyPr wrap="square" rtlCol="0">
+            <a:spAutoFit/>
+          </a:bodyPr>
+          <a:lstStyle/>
+          <a:p>
+            <a:pPr algn="ctr"/>
+            <a:r>
+              <a:rPr lang="pt-BR" dirty="0"/>
+              <a:t>TCPROS</a:t>
+            </a:r>
+          </a:p>
+        </p:txBody>
+      </p:sp>
+      <p:cxnSp>
+        <p:nvCxnSpPr>
+          <p:cNvPr id="50" name="Conector: Angulado 49">
+            <a:extLst>
+              <a:ext uri="{FF2B5EF4-FFF2-40B4-BE49-F238E27FC236}">
+                <a16:creationId xmlns:a16="http://schemas.microsoft.com/office/drawing/2014/main" id="{7BA99CC8-4A36-4F90-9666-0E2D9CDC06EC}"/>
+              </a:ext>
+            </a:extLst>
+          </p:cNvPr>
+          <p:cNvCxnSpPr>
+            <a:cxnSpLocks/>
+            <a:stCxn id="2" idx="7"/>
+            <a:endCxn id="27" idx="3"/>
+          </p:cNvCxnSpPr>
+          <p:nvPr/>
+        </p:nvCxnSpPr>
+        <p:spPr>
+          <a:xfrm rot="5400000" flipH="1" flipV="1">
+            <a:off x="9376444" y="1126199"/>
+            <a:ext cx="939971" cy="944807"/>
+          </a:xfrm>
+          <a:prstGeom prst="bentConnector3">
+            <a:avLst/>
+          </a:prstGeom>
+          <a:ln>
+            <a:headEnd type="triangle"/>
+            <a:tailEnd type="triangle"/>
+          </a:ln>
+        </p:spPr>
+        <p:style>
+          <a:lnRef idx="1">
+            <a:schemeClr val="accent1"/>
+          </a:lnRef>
+          <a:fillRef idx="0">
+            <a:schemeClr val="accent1"/>
+          </a:fillRef>
+          <a:effectRef idx="0">
+            <a:schemeClr val="accent1"/>
+          </a:effectRef>
+          <a:fontRef idx="minor">
+            <a:schemeClr val="tx1"/>
+          </a:fontRef>
+        </p:style>
+      </p:cxnSp>
+      <p:cxnSp>
+        <p:nvCxnSpPr>
+          <p:cNvPr id="53" name="Conector de Seta Reta 52">
+            <a:extLst>
+              <a:ext uri="{FF2B5EF4-FFF2-40B4-BE49-F238E27FC236}">
+                <a16:creationId xmlns:a16="http://schemas.microsoft.com/office/drawing/2014/main" id="{0D32E73A-7A15-4671-8D42-E923FDD97C95}"/>
+              </a:ext>
+            </a:extLst>
+          </p:cNvPr>
+          <p:cNvCxnSpPr>
+            <a:stCxn id="2" idx="6"/>
+            <a:endCxn id="29" idx="2"/>
+          </p:cNvCxnSpPr>
+          <p:nvPr/>
+        </p:nvCxnSpPr>
+        <p:spPr>
+          <a:xfrm>
+            <a:off x="9654176" y="2391877"/>
+            <a:ext cx="482602" cy="2503"/>
+          </a:xfrm>
+          <a:prstGeom prst="straightConnector1">
+            <a:avLst/>
+          </a:prstGeom>
+          <a:ln>
+            <a:headEnd type="triangle"/>
+            <a:tailEnd type="triangle"/>
+          </a:ln>
+        </p:spPr>
+        <p:style>
+          <a:lnRef idx="1">
+            <a:schemeClr val="accent1"/>
+          </a:lnRef>
+          <a:fillRef idx="0">
+            <a:schemeClr val="accent1"/>
+          </a:fillRef>
+          <a:effectRef idx="0">
+            <a:schemeClr val="accent1"/>
+          </a:effectRef>
+          <a:fontRef idx="minor">
+            <a:schemeClr val="tx1"/>
+          </a:fontRef>
+        </p:style>
+      </p:cxnSp>
+      <p:cxnSp>
+        <p:nvCxnSpPr>
+          <p:cNvPr id="55" name="Conector de Seta Reta 54">
+            <a:extLst>
+              <a:ext uri="{FF2B5EF4-FFF2-40B4-BE49-F238E27FC236}">
+                <a16:creationId xmlns:a16="http://schemas.microsoft.com/office/drawing/2014/main" id="{C4680F0C-A325-4A5A-A710-746FFBD7B7D0}"/>
+              </a:ext>
+            </a:extLst>
+          </p:cNvPr>
+          <p:cNvCxnSpPr>
+            <a:stCxn id="28" idx="4"/>
+            <a:endCxn id="2" idx="0"/>
+          </p:cNvCxnSpPr>
+          <p:nvPr/>
+        </p:nvCxnSpPr>
+        <p:spPr>
+          <a:xfrm flipH="1">
+            <a:off x="8697686" y="1264144"/>
+            <a:ext cx="6350" cy="670532"/>
+          </a:xfrm>
+          <a:prstGeom prst="straightConnector1">
+            <a:avLst/>
+          </a:prstGeom>
+          <a:ln>
+            <a:headEnd type="triangle"/>
+            <a:tailEnd type="triangle"/>
+          </a:ln>
+        </p:spPr>
+        <p:style>
+          <a:lnRef idx="1">
+            <a:schemeClr val="accent1"/>
+          </a:lnRef>
+          <a:fillRef idx="0">
+            <a:schemeClr val="accent1"/>
+          </a:fillRef>
+          <a:effectRef idx="0">
+            <a:schemeClr val="accent1"/>
+          </a:effectRef>
+          <a:fontRef idx="minor">
+            <a:schemeClr val="tx1"/>
+          </a:fontRef>
+        </p:style>
+      </p:cxnSp>
+      <p:sp>
+        <p:nvSpPr>
+          <p:cNvPr id="57" name="Elipse 56">
+            <a:extLst>
+              <a:ext uri="{FF2B5EF4-FFF2-40B4-BE49-F238E27FC236}">
+                <a16:creationId xmlns:a16="http://schemas.microsoft.com/office/drawing/2014/main" id="{1B90BB71-7219-41F8-9A0C-7694C8774DB6}"/>
+              </a:ext>
+            </a:extLst>
+          </p:cNvPr>
+          <p:cNvSpPr/>
+          <p:nvPr/>
+        </p:nvSpPr>
+        <p:spPr>
+          <a:xfrm>
+            <a:off x="10130119" y="3297724"/>
+            <a:ext cx="1912981" cy="914401"/>
+          </a:xfrm>
+          <a:prstGeom prst="ellipse">
+            <a:avLst/>
+          </a:prstGeom>
+          <a:solidFill>
+            <a:schemeClr val="accent6"/>
+          </a:solidFill>
+        </p:spPr>
+        <p:style>
+          <a:lnRef idx="2">
+            <a:schemeClr val="accent1">
+              <a:shade val="50000"/>
+            </a:schemeClr>
+          </a:lnRef>
+          <a:fillRef idx="1">
+            <a:schemeClr val="accent1"/>
+          </a:fillRef>
+          <a:effectRef idx="0">
+            <a:schemeClr val="accent1"/>
+          </a:effectRef>
+          <a:fontRef idx="minor">
+            <a:schemeClr val="lt1"/>
+          </a:fontRef>
+        </p:style>
+        <p:txBody>
+          <a:bodyPr rtlCol="0" anchor="ctr"/>
+          <a:lstStyle/>
+          <a:p>
+            <a:pPr algn="ctr"/>
+            <a:r>
+              <a:rPr lang="pt-BR" i="1" dirty="0"/>
+              <a:t>Motion Planning: MoveIt</a:t>
+            </a:r>
+          </a:p>
+        </p:txBody>
+      </p:sp>
+      <p:cxnSp>
+        <p:nvCxnSpPr>
+          <p:cNvPr id="60" name="Conector de Seta Reta 59">
+            <a:extLst>
+              <a:ext uri="{FF2B5EF4-FFF2-40B4-BE49-F238E27FC236}">
+                <a16:creationId xmlns:a16="http://schemas.microsoft.com/office/drawing/2014/main" id="{E33716DC-FE8F-4AFE-B34A-52F497A8272A}"/>
+              </a:ext>
+            </a:extLst>
+          </p:cNvPr>
+          <p:cNvCxnSpPr>
+            <a:stCxn id="2" idx="4"/>
+            <a:endCxn id="9" idx="0"/>
+          </p:cNvCxnSpPr>
+          <p:nvPr/>
+        </p:nvCxnSpPr>
+        <p:spPr>
+          <a:xfrm>
+            <a:off x="8697686" y="2849077"/>
+            <a:ext cx="0" cy="778898"/>
+          </a:xfrm>
+          <a:prstGeom prst="straightConnector1">
+            <a:avLst/>
+          </a:prstGeom>
+          <a:ln>
+            <a:headEnd type="triangle"/>
+            <a:tailEnd type="triangle"/>
+          </a:ln>
+        </p:spPr>
+        <p:style>
+          <a:lnRef idx="1">
+            <a:schemeClr val="accent1"/>
+          </a:lnRef>
+          <a:fillRef idx="0">
+            <a:schemeClr val="accent1"/>
+          </a:fillRef>
+          <a:effectRef idx="0">
+            <a:schemeClr val="accent1"/>
+          </a:effectRef>
+          <a:fontRef idx="minor">
+            <a:schemeClr val="tx1"/>
+          </a:fontRef>
+        </p:style>
+      </p:cxnSp>
+      <p:cxnSp>
+        <p:nvCxnSpPr>
+          <p:cNvPr id="63" name="Conector: Angulado 62">
+            <a:extLst>
+              <a:ext uri="{FF2B5EF4-FFF2-40B4-BE49-F238E27FC236}">
+                <a16:creationId xmlns:a16="http://schemas.microsoft.com/office/drawing/2014/main" id="{C652DE59-CA79-4E5A-91BE-13CDB8ADDF12}"/>
+              </a:ext>
+            </a:extLst>
+          </p:cNvPr>
+          <p:cNvCxnSpPr>
+            <a:stCxn id="2" idx="5"/>
+            <a:endCxn id="57" idx="1"/>
+          </p:cNvCxnSpPr>
+          <p:nvPr/>
+        </p:nvCxnSpPr>
+        <p:spPr>
+          <a:xfrm rot="16200000" flipH="1">
+            <a:off x="9533913" y="2555278"/>
+            <a:ext cx="716469" cy="1036243"/>
+          </a:xfrm>
+          <a:prstGeom prst="bentConnector3">
+            <a:avLst/>
+          </a:prstGeom>
+          <a:ln>
+            <a:headEnd type="triangle"/>
+            <a:tailEnd type="triangle"/>
+          </a:ln>
+        </p:spPr>
+        <p:style>
+          <a:lnRef idx="1">
+            <a:schemeClr val="accent1"/>
+          </a:lnRef>
+          <a:fillRef idx="0">
+            <a:schemeClr val="accent1"/>
+          </a:fillRef>
+          <a:effectRef idx="0">
+            <a:schemeClr val="accent1"/>
+          </a:effectRef>
+          <a:fontRef idx="minor">
+            <a:schemeClr val="tx1"/>
+          </a:fontRef>
+        </p:style>
+      </p:cxnSp>
+      <p:sp>
+        <p:nvSpPr>
+          <p:cNvPr id="65" name="Elipse 64">
+            <a:extLst>
+              <a:ext uri="{FF2B5EF4-FFF2-40B4-BE49-F238E27FC236}">
+                <a16:creationId xmlns:a16="http://schemas.microsoft.com/office/drawing/2014/main" id="{365AA1B7-656D-4444-81E3-AC6F1EF0FA9B}"/>
+              </a:ext>
+            </a:extLst>
+          </p:cNvPr>
+          <p:cNvSpPr/>
+          <p:nvPr/>
+        </p:nvSpPr>
+        <p:spPr>
+          <a:xfrm>
+            <a:off x="5358270" y="364201"/>
+            <a:ext cx="1912981" cy="914401"/>
+          </a:xfrm>
+          <a:prstGeom prst="ellipse">
+            <a:avLst/>
+          </a:prstGeom>
+          <a:solidFill>
+            <a:schemeClr val="accent6"/>
+          </a:solidFill>
+        </p:spPr>
+        <p:style>
+          <a:lnRef idx="2">
+            <a:schemeClr val="accent1">
+              <a:shade val="50000"/>
+            </a:schemeClr>
+          </a:lnRef>
+          <a:fillRef idx="1">
+            <a:schemeClr val="accent1"/>
+          </a:fillRef>
+          <a:effectRef idx="0">
+            <a:schemeClr val="accent1"/>
+          </a:effectRef>
+          <a:fontRef idx="minor">
+            <a:schemeClr val="lt1"/>
+          </a:fontRef>
+        </p:style>
+        <p:txBody>
+          <a:bodyPr rtlCol="0" anchor="ctr"/>
+          <a:lstStyle/>
+          <a:p>
+            <a:pPr algn="ctr"/>
+            <a:r>
+              <a:rPr lang="pt-BR" sz="1600" dirty="0"/>
+              <a:t>Visualização:</a:t>
+            </a:r>
+          </a:p>
+          <a:p>
+            <a:pPr algn="ctr"/>
+            <a:r>
+              <a:rPr lang="pt-BR" sz="1600" dirty="0"/>
+              <a:t>RVIZ</a:t>
+            </a:r>
+          </a:p>
+        </p:txBody>
+      </p:sp>
+      <p:cxnSp>
+        <p:nvCxnSpPr>
+          <p:cNvPr id="66" name="Conector: Angulado 65">
+            <a:extLst>
+              <a:ext uri="{FF2B5EF4-FFF2-40B4-BE49-F238E27FC236}">
+                <a16:creationId xmlns:a16="http://schemas.microsoft.com/office/drawing/2014/main" id="{79815850-83BB-40B3-AE02-7519F8A84B8E}"/>
+              </a:ext>
+            </a:extLst>
+          </p:cNvPr>
+          <p:cNvCxnSpPr>
+            <a:stCxn id="2" idx="1"/>
+            <a:endCxn id="65" idx="4"/>
+          </p:cNvCxnSpPr>
+          <p:nvPr/>
+        </p:nvCxnSpPr>
+        <p:spPr>
+          <a:xfrm rot="16200000" flipV="1">
+            <a:off x="6773061" y="820303"/>
+            <a:ext cx="789985" cy="1706584"/>
+          </a:xfrm>
+          <a:prstGeom prst="bentConnector3">
+            <a:avLst/>
+          </a:prstGeom>
+          <a:ln>
+            <a:headEnd type="triangle"/>
+            <a:tailEnd type="triangle"/>
+          </a:ln>
+        </p:spPr>
+        <p:style>
+          <a:lnRef idx="1">
+            <a:schemeClr val="accent1"/>
+          </a:lnRef>
+          <a:fillRef idx="0">
+            <a:schemeClr val="accent1"/>
+          </a:fillRef>
+          <a:effectRef idx="0">
+            <a:schemeClr val="accent1"/>
+          </a:effectRef>
+          <a:fontRef idx="minor">
+            <a:schemeClr val="tx1"/>
+          </a:fontRef>
+        </p:style>
+      </p:cxnSp>
+      <p:sp>
+        <p:nvSpPr>
+          <p:cNvPr id="45" name="Elipse 44">
+            <a:extLst>
+              <a:ext uri="{FF2B5EF4-FFF2-40B4-BE49-F238E27FC236}">
+                <a16:creationId xmlns:a16="http://schemas.microsoft.com/office/drawing/2014/main" id="{305E31E0-C2D4-41E4-A8A8-BD98577284CF}"/>
+              </a:ext>
+            </a:extLst>
+          </p:cNvPr>
+          <p:cNvSpPr/>
+          <p:nvPr/>
+        </p:nvSpPr>
+        <p:spPr>
+          <a:xfrm>
+            <a:off x="5288762" y="1929525"/>
+            <a:ext cx="1912981" cy="914401"/>
+          </a:xfrm>
+          <a:prstGeom prst="ellipse">
+            <a:avLst/>
+          </a:prstGeom>
+          <a:solidFill>
+            <a:schemeClr val="accent6"/>
+          </a:solidFill>
+        </p:spPr>
+        <p:style>
+          <a:lnRef idx="2">
+            <a:schemeClr val="accent1">
+              <a:shade val="50000"/>
+            </a:schemeClr>
+          </a:lnRef>
+          <a:fillRef idx="1">
+            <a:schemeClr val="accent1"/>
+          </a:fillRef>
+          <a:effectRef idx="0">
+            <a:schemeClr val="accent1"/>
+          </a:effectRef>
+          <a:fontRef idx="minor">
+            <a:schemeClr val="lt1"/>
+          </a:fontRef>
+        </p:style>
+        <p:txBody>
+          <a:bodyPr rtlCol="0" anchor="ctr"/>
+          <a:lstStyle/>
+          <a:p>
+            <a:pPr algn="ctr"/>
+            <a:r>
+              <a:rPr lang="pt-BR" sz="1600" dirty="0"/>
+              <a:t>Simulação: Gazebo</a:t>
+            </a:r>
+          </a:p>
+        </p:txBody>
+      </p:sp>
+      <p:cxnSp>
+        <p:nvCxnSpPr>
+          <p:cNvPr id="24" name="Conector de Seta Reta 23">
+            <a:extLst>
+              <a:ext uri="{FF2B5EF4-FFF2-40B4-BE49-F238E27FC236}">
+                <a16:creationId xmlns:a16="http://schemas.microsoft.com/office/drawing/2014/main" id="{E09AE68E-8930-43E0-8C9E-02109A2D5419}"/>
+              </a:ext>
+            </a:extLst>
+          </p:cNvPr>
+          <p:cNvCxnSpPr>
+            <a:stCxn id="45" idx="6"/>
+            <a:endCxn id="2" idx="2"/>
+          </p:cNvCxnSpPr>
+          <p:nvPr/>
+        </p:nvCxnSpPr>
+        <p:spPr>
+          <a:xfrm>
+            <a:off x="7201743" y="2386726"/>
+            <a:ext cx="539452" cy="5151"/>
+          </a:xfrm>
+          <a:prstGeom prst="straightConnector1">
+            <a:avLst/>
+          </a:prstGeom>
+          <a:ln>
+            <a:headEnd type="triangle"/>
+            <a:tailEnd type="triangle"/>
+          </a:ln>
+        </p:spPr>
+        <p:style>
+          <a:lnRef idx="1">
+            <a:schemeClr val="accent1"/>
+          </a:lnRef>
+          <a:fillRef idx="0">
+            <a:schemeClr val="accent1"/>
+          </a:fillRef>
+          <a:effectRef idx="0">
+            <a:schemeClr val="accent1"/>
+          </a:effectRef>
+          <a:fontRef idx="minor">
+            <a:schemeClr val="tx1"/>
+          </a:fontRef>
+        </p:style>
+      </p:cxnSp>
+      <p:sp>
+        <p:nvSpPr>
+          <p:cNvPr id="46" name="Retângulo 45">
+            <a:extLst>
+              <a:ext uri="{FF2B5EF4-FFF2-40B4-BE49-F238E27FC236}">
+                <a16:creationId xmlns:a16="http://schemas.microsoft.com/office/drawing/2014/main" id="{CD06D3B3-600F-46B5-B003-ED2A1059BFAB}"/>
+              </a:ext>
+            </a:extLst>
+          </p:cNvPr>
+          <p:cNvSpPr/>
+          <p:nvPr/>
+        </p:nvSpPr>
+        <p:spPr>
+          <a:xfrm>
+            <a:off x="2509809" y="3658119"/>
+            <a:ext cx="1277650" cy="914400"/>
+          </a:xfrm>
+          <a:prstGeom prst="rect">
+            <a:avLst/>
+          </a:prstGeom>
+          <a:solidFill>
+            <a:srgbClr val="FFC000"/>
+          </a:solidFill>
+        </p:spPr>
+        <p:style>
+          <a:lnRef idx="2">
+            <a:schemeClr val="accent1">
+              <a:shade val="50000"/>
+            </a:schemeClr>
+          </a:lnRef>
+          <a:fillRef idx="1">
+            <a:schemeClr val="accent1"/>
+          </a:fillRef>
+          <a:effectRef idx="0">
+            <a:schemeClr val="accent1"/>
+          </a:effectRef>
+          <a:fontRef idx="minor">
+            <a:schemeClr val="lt1"/>
+          </a:fontRef>
+        </p:style>
+        <p:txBody>
+          <a:bodyPr rtlCol="0" anchor="ctr"/>
+          <a:lstStyle/>
+          <a:p>
+            <a:pPr algn="ctr"/>
+            <a:r>
+              <a:rPr lang="pt-BR" i="1" dirty="0"/>
+              <a:t>Moto C Plus</a:t>
+            </a:r>
+          </a:p>
+        </p:txBody>
+      </p:sp>
+      <p:cxnSp>
+        <p:nvCxnSpPr>
+          <p:cNvPr id="35" name="Conector de Seta Reta 34">
+            <a:extLst>
+              <a:ext uri="{FF2B5EF4-FFF2-40B4-BE49-F238E27FC236}">
+                <a16:creationId xmlns:a16="http://schemas.microsoft.com/office/drawing/2014/main" id="{51E79D0C-214C-4553-A449-FBB9E2C28317}"/>
+              </a:ext>
+            </a:extLst>
+          </p:cNvPr>
+          <p:cNvCxnSpPr>
+            <a:stCxn id="5" idx="3"/>
+            <a:endCxn id="46" idx="1"/>
+          </p:cNvCxnSpPr>
+          <p:nvPr/>
+        </p:nvCxnSpPr>
+        <p:spPr>
+          <a:xfrm flipV="1">
+            <a:off x="2002971" y="4115319"/>
+            <a:ext cx="506838" cy="3837"/>
+          </a:xfrm>
+          <a:prstGeom prst="straightConnector1">
+            <a:avLst/>
+          </a:prstGeom>
+          <a:ln>
+            <a:headEnd type="triangle"/>
+            <a:tailEnd type="triangle"/>
+          </a:ln>
+        </p:spPr>
+        <p:style>
+          <a:lnRef idx="1">
+            <a:schemeClr val="accent1"/>
+          </a:lnRef>
+          <a:fillRef idx="0">
+            <a:schemeClr val="accent1"/>
+          </a:fillRef>
+          <a:effectRef idx="0">
+            <a:schemeClr val="accent1"/>
+          </a:effectRef>
+          <a:fontRef idx="minor">
+            <a:schemeClr val="tx1"/>
+          </a:fontRef>
+        </p:style>
+      </p:cxnSp>
+      <p:cxnSp>
+        <p:nvCxnSpPr>
+          <p:cNvPr id="40" name="Conector: Angulado 39">
+            <a:extLst>
+              <a:ext uri="{FF2B5EF4-FFF2-40B4-BE49-F238E27FC236}">
+                <a16:creationId xmlns:a16="http://schemas.microsoft.com/office/drawing/2014/main" id="{4AD69AB7-DE0B-4011-8039-E19E10CF715D}"/>
+              </a:ext>
+            </a:extLst>
+          </p:cNvPr>
+          <p:cNvCxnSpPr>
+            <a:cxnSpLocks/>
+          </p:cNvCxnSpPr>
+          <p:nvPr/>
+        </p:nvCxnSpPr>
+        <p:spPr>
+          <a:xfrm rot="16200000" flipH="1">
+            <a:off x="2056315" y="4412199"/>
+            <a:ext cx="670234" cy="270081"/>
+          </a:xfrm>
+          <a:prstGeom prst="bentConnector3">
+            <a:avLst>
+              <a:gd name="adj1" fmla="val 101540"/>
+            </a:avLst>
+          </a:prstGeom>
+          <a:ln>
+            <a:tailEnd type="triangle"/>
+          </a:ln>
+        </p:spPr>
+        <p:style>
+          <a:lnRef idx="1">
+            <a:schemeClr val="accent1"/>
+          </a:lnRef>
+          <a:fillRef idx="0">
+            <a:schemeClr val="accent1"/>
+          </a:fillRef>
+          <a:effectRef idx="0">
+            <a:schemeClr val="accent1"/>
+          </a:effectRef>
+          <a:fontRef idx="minor">
+            <a:schemeClr val="tx1"/>
+          </a:fontRef>
+        </p:style>
+      </p:cxnSp>
+      <p:sp>
+        <p:nvSpPr>
+          <p:cNvPr id="56" name="CaixaDeTexto 55">
+            <a:extLst>
+              <a:ext uri="{FF2B5EF4-FFF2-40B4-BE49-F238E27FC236}">
+                <a16:creationId xmlns:a16="http://schemas.microsoft.com/office/drawing/2014/main" id="{29B5574B-E766-4938-9931-D49975E36BA0}"/>
+              </a:ext>
+            </a:extLst>
+          </p:cNvPr>
+          <p:cNvSpPr txBox="1"/>
+          <p:nvPr/>
+        </p:nvSpPr>
+        <p:spPr>
+          <a:xfrm>
+            <a:off x="2552891" y="4692218"/>
+            <a:ext cx="684842" cy="369332"/>
+          </a:xfrm>
+          <a:prstGeom prst="rect">
+            <a:avLst/>
+          </a:prstGeom>
+          <a:noFill/>
+        </p:spPr>
+        <p:txBody>
+          <a:bodyPr wrap="square" rtlCol="0">
+            <a:spAutoFit/>
+          </a:bodyPr>
+          <a:lstStyle/>
+          <a:p>
+            <a:r>
+              <a:rPr lang="pt-BR" dirty="0"/>
+              <a:t>USB</a:t>
+            </a:r>
+          </a:p>
+        </p:txBody>
+      </p:sp>
+      <p:cxnSp>
+        <p:nvCxnSpPr>
+          <p:cNvPr id="52" name="Conector de Seta Reta 51">
+            <a:extLst>
+              <a:ext uri="{FF2B5EF4-FFF2-40B4-BE49-F238E27FC236}">
+                <a16:creationId xmlns:a16="http://schemas.microsoft.com/office/drawing/2014/main" id="{639CFD7C-65F9-43B0-813C-92CBFE11C270}"/>
+              </a:ext>
+            </a:extLst>
+          </p:cNvPr>
+          <p:cNvCxnSpPr>
+            <a:cxnSpLocks/>
+            <a:stCxn id="46" idx="3"/>
+            <a:endCxn id="6" idx="2"/>
+          </p:cNvCxnSpPr>
+          <p:nvPr/>
+        </p:nvCxnSpPr>
+        <p:spPr>
+          <a:xfrm flipV="1">
+            <a:off x="3787459" y="4111353"/>
+            <a:ext cx="226888" cy="3966"/>
+          </a:xfrm>
+          <a:prstGeom prst="straightConnector1">
+            <a:avLst/>
+          </a:prstGeom>
+          <a:ln>
+            <a:headEnd type="triangle"/>
+            <a:tailEnd type="triangle"/>
+          </a:ln>
+        </p:spPr>
+        <p:style>
+          <a:lnRef idx="1">
+            <a:schemeClr val="accent1"/>
+          </a:lnRef>
+          <a:fillRef idx="0">
+            <a:schemeClr val="accent1"/>
+          </a:fillRef>
+          <a:effectRef idx="0">
+            <a:schemeClr val="accent1"/>
+          </a:effectRef>
+          <a:fontRef idx="minor">
+            <a:schemeClr val="tx1"/>
+          </a:fontRef>
+        </p:style>
+      </p:cxnSp>
+      <p:sp>
+        <p:nvSpPr>
+          <p:cNvPr id="64" name="Retângulo 63">
+            <a:extLst>
+              <a:ext uri="{FF2B5EF4-FFF2-40B4-BE49-F238E27FC236}">
+                <a16:creationId xmlns:a16="http://schemas.microsoft.com/office/drawing/2014/main" id="{42F8BBA1-1A92-451C-8BE4-2FE5EE3D7CB0}"/>
+              </a:ext>
+            </a:extLst>
+          </p:cNvPr>
+          <p:cNvSpPr/>
+          <p:nvPr/>
+        </p:nvSpPr>
+        <p:spPr>
+          <a:xfrm>
+            <a:off x="10269486" y="5390300"/>
+            <a:ext cx="1469667" cy="1241435"/>
+          </a:xfrm>
+          <a:prstGeom prst="rect">
+            <a:avLst/>
+          </a:prstGeom>
+          <a:solidFill>
+            <a:srgbClr val="FFC000"/>
+          </a:solidFill>
+        </p:spPr>
+        <p:style>
+          <a:lnRef idx="2">
+            <a:schemeClr val="accent1">
+              <a:shade val="50000"/>
+            </a:schemeClr>
+          </a:lnRef>
+          <a:fillRef idx="1">
+            <a:schemeClr val="accent1"/>
+          </a:fillRef>
+          <a:effectRef idx="0">
+            <a:schemeClr val="accent1"/>
+          </a:effectRef>
+          <a:fontRef idx="minor">
+            <a:schemeClr val="lt1"/>
+          </a:fontRef>
+        </p:style>
+        <p:txBody>
+          <a:bodyPr rtlCol="0" anchor="ctr"/>
+          <a:lstStyle/>
+          <a:p>
+            <a:pPr algn="ctr"/>
+            <a:r>
+              <a:rPr lang="pt-BR" dirty="0"/>
+              <a:t>Controle USB para jogos genérico</a:t>
+            </a:r>
+          </a:p>
+        </p:txBody>
+      </p:sp>
+      <p:cxnSp>
+        <p:nvCxnSpPr>
+          <p:cNvPr id="59" name="Conector: Angulado 58">
+            <a:extLst>
+              <a:ext uri="{FF2B5EF4-FFF2-40B4-BE49-F238E27FC236}">
+                <a16:creationId xmlns:a16="http://schemas.microsoft.com/office/drawing/2014/main" id="{37DB8425-D0EA-419F-8310-C1DDCDE7D4BB}"/>
+              </a:ext>
+            </a:extLst>
+          </p:cNvPr>
+          <p:cNvCxnSpPr>
+            <a:cxnSpLocks/>
+            <a:stCxn id="9" idx="3"/>
+            <a:endCxn id="64" idx="1"/>
+          </p:cNvCxnSpPr>
+          <p:nvPr/>
+        </p:nvCxnSpPr>
+        <p:spPr>
+          <a:xfrm>
+            <a:off x="9797143" y="4085175"/>
+            <a:ext cx="472343" cy="1925843"/>
+          </a:xfrm>
+          <a:prstGeom prst="bentConnector3">
+            <a:avLst>
+              <a:gd name="adj1" fmla="val 50000"/>
+            </a:avLst>
+          </a:prstGeom>
+          <a:ln>
+            <a:headEnd type="triangle"/>
+            <a:tailEnd type="triangle"/>
+          </a:ln>
+        </p:spPr>
+        <p:style>
+          <a:lnRef idx="1">
+            <a:schemeClr val="accent1"/>
+          </a:lnRef>
+          <a:fillRef idx="0">
+            <a:schemeClr val="accent1"/>
+          </a:fillRef>
+          <a:effectRef idx="0">
+            <a:schemeClr val="accent1"/>
+          </a:effectRef>
+          <a:fontRef idx="minor">
+            <a:schemeClr val="tx1"/>
+          </a:fontRef>
+        </p:style>
+      </p:cxnSp>
+    </p:spTree>
+    <p:extLst>
+      <p:ext uri="{BB962C8B-B14F-4D97-AF65-F5344CB8AC3E}">
+        <p14:creationId xmlns:p14="http://schemas.microsoft.com/office/powerpoint/2010/main" val="3598449459"/>
       </p:ext>
     </p:extLst>
   </p:cSld>
@@ -4885,4 +7219,299 @@
     </a:ext>
   </a:extLst>
 </a:theme>
+</file>
+
+<file path=ppt/theme/theme2.xml><?xml version="1.0" encoding="utf-8"?>
+<a:theme xmlns:a="http://schemas.openxmlformats.org/drawingml/2006/main" name="Tema do Office">
+  <a:themeElements>
+    <a:clrScheme name="Office">
+      <a:dk1>
+        <a:sysClr val="windowText" lastClr="000000"/>
+      </a:dk1>
+      <a:lt1>
+        <a:sysClr val="window" lastClr="FFFFFF"/>
+      </a:lt1>
+      <a:dk2>
+        <a:srgbClr val="44546A"/>
+      </a:dk2>
+      <a:lt2>
+        <a:srgbClr val="E7E6E6"/>
+      </a:lt2>
+      <a:accent1>
+        <a:srgbClr val="4472C4"/>
+      </a:accent1>
+      <a:accent2>
+        <a:srgbClr val="ED7D31"/>
+      </a:accent2>
+      <a:accent3>
+        <a:srgbClr val="A5A5A5"/>
+      </a:accent3>
+      <a:accent4>
+        <a:srgbClr val="FFC000"/>
+      </a:accent4>
+      <a:accent5>
+        <a:srgbClr val="5B9BD5"/>
+      </a:accent5>
+      <a:accent6>
+        <a:srgbClr val="70AD47"/>
+      </a:accent6>
+      <a:hlink>
+        <a:srgbClr val="0563C1"/>
+      </a:hlink>
+      <a:folHlink>
+        <a:srgbClr val="954F72"/>
+      </a:folHlink>
+    </a:clrScheme>
+    <a:fontScheme name="Office">
+      <a:majorFont>
+        <a:latin typeface="Calibri Light" panose="020F0302020204030204"/>
+        <a:ea typeface=""/>
+        <a:cs typeface=""/>
+        <a:font script="Jpan" typeface="游ゴシック Light"/>
+        <a:font script="Hang" typeface="맑은 고딕"/>
+        <a:font script="Hans" typeface="等线 Light"/>
+        <a:font script="Hant" typeface="新細明體"/>
+        <a:font script="Arab" typeface="Times New Roman"/>
+        <a:font script="Hebr" typeface="Times New Roman"/>
+        <a:font script="Thai" typeface="Angsana New"/>
+        <a:font script="Ethi" typeface="Nyala"/>
+        <a:font script="Beng" typeface="Vrinda"/>
+        <a:font script="Gujr" typeface="Shruti"/>
+        <a:font script="Khmr" typeface="MoolBoran"/>
+        <a:font script="Knda" typeface="Tunga"/>
+        <a:font script="Guru" typeface="Raavi"/>
+        <a:font script="Cans" typeface="Euphemia"/>
+        <a:font script="Cher" typeface="Plantagenet Cherokee"/>
+        <a:font script="Yiii" typeface="Microsoft Yi Baiti"/>
+        <a:font script="Tibt" typeface="Microsoft Himalaya"/>
+        <a:font script="Thaa" typeface="MV Boli"/>
+        <a:font script="Deva" typeface="Mangal"/>
+        <a:font script="Telu" typeface="Gautami"/>
+        <a:font script="Taml" typeface="Latha"/>
+        <a:font script="Syrc" typeface="Estrangelo Edessa"/>
+        <a:font script="Orya" typeface="Kalinga"/>
+        <a:font script="Mlym" typeface="Kartika"/>
+        <a:font script="Laoo" typeface="DokChampa"/>
+        <a:font script="Sinh" typeface="Iskoola Pota"/>
+        <a:font script="Mong" typeface="Mongolian Baiti"/>
+        <a:font script="Viet" typeface="Times New Roman"/>
+        <a:font script="Uigh" typeface="Microsoft Uighur"/>
+        <a:font script="Geor" typeface="Sylfaen"/>
+        <a:font script="Armn" typeface="Arial"/>
+        <a:font script="Bugi" typeface="Leelawadee UI"/>
+        <a:font script="Bopo" typeface="Microsoft JhengHei"/>
+        <a:font script="Java" typeface="Javanese Text"/>
+        <a:font script="Lisu" typeface="Segoe UI"/>
+        <a:font script="Mymr" typeface="Myanmar Text"/>
+        <a:font script="Nkoo" typeface="Ebrima"/>
+        <a:font script="Olck" typeface="Nirmala UI"/>
+        <a:font script="Osma" typeface="Ebrima"/>
+        <a:font script="Phag" typeface="Phagspa"/>
+        <a:font script="Syrn" typeface="Estrangelo Edessa"/>
+        <a:font script="Syrj" typeface="Estrangelo Edessa"/>
+        <a:font script="Syre" typeface="Estrangelo Edessa"/>
+        <a:font script="Sora" typeface="Nirmala UI"/>
+        <a:font script="Tale" typeface="Microsoft Tai Le"/>
+        <a:font script="Talu" typeface="Microsoft New Tai Lue"/>
+        <a:font script="Tfng" typeface="Ebrima"/>
+      </a:majorFont>
+      <a:minorFont>
+        <a:latin typeface="Calibri" panose="020F0502020204030204"/>
+        <a:ea typeface=""/>
+        <a:cs typeface=""/>
+        <a:font script="Jpan" typeface="游ゴシック"/>
+        <a:font script="Hang" typeface="맑은 고딕"/>
+        <a:font script="Hans" typeface="等线"/>
+        <a:font script="Hant" typeface="新細明體"/>
+        <a:font script="Arab" typeface="Arial"/>
+        <a:font script="Hebr" typeface="Arial"/>
+        <a:font script="Thai" typeface="Cordia New"/>
+        <a:font script="Ethi" typeface="Nyala"/>
+        <a:font script="Beng" typeface="Vrinda"/>
+        <a:font script="Gujr" typeface="Shruti"/>
+        <a:font script="Khmr" typeface="DaunPenh"/>
+        <a:font script="Knda" typeface="Tunga"/>
+        <a:font script="Guru" typeface="Raavi"/>
+        <a:font script="Cans" typeface="Euphemia"/>
+        <a:font script="Cher" typeface="Plantagenet Cherokee"/>
+        <a:font script="Yiii" typeface="Microsoft Yi Baiti"/>
+        <a:font script="Tibt" typeface="Microsoft Himalaya"/>
+        <a:font script="Thaa" typeface="MV Boli"/>
+        <a:font script="Deva" typeface="Mangal"/>
+        <a:font script="Telu" typeface="Gautami"/>
+        <a:font script="Taml" typeface="Latha"/>
+        <a:font script="Syrc" typeface="Estrangelo Edessa"/>
+        <a:font script="Orya" typeface="Kalinga"/>
+        <a:font script="Mlym" typeface="Kartika"/>
+        <a:font script="Laoo" typeface="DokChampa"/>
+        <a:font script="Sinh" typeface="Iskoola Pota"/>
+        <a:font script="Mong" typeface="Mongolian Baiti"/>
+        <a:font script="Viet" typeface="Arial"/>
+        <a:font script="Uigh" typeface="Microsoft Uighur"/>
+        <a:font script="Geor" typeface="Sylfaen"/>
+        <a:font script="Armn" typeface="Arial"/>
+        <a:font script="Bugi" typeface="Leelawadee UI"/>
+        <a:font script="Bopo" typeface="Microsoft JhengHei"/>
+        <a:font script="Java" typeface="Javanese Text"/>
+        <a:font script="Lisu" typeface="Segoe UI"/>
+        <a:font script="Mymr" typeface="Myanmar Text"/>
+        <a:font script="Nkoo" typeface="Ebrima"/>
+        <a:font script="Olck" typeface="Nirmala UI"/>
+        <a:font script="Osma" typeface="Ebrima"/>
+        <a:font script="Phag" typeface="Phagspa"/>
+        <a:font script="Syrn" typeface="Estrangelo Edessa"/>
+        <a:font script="Syrj" typeface="Estrangelo Edessa"/>
+        <a:font script="Syre" typeface="Estrangelo Edessa"/>
+        <a:font script="Sora" typeface="Nirmala UI"/>
+        <a:font script="Tale" typeface="Microsoft Tai Le"/>
+        <a:font script="Talu" typeface="Microsoft New Tai Lue"/>
+        <a:font script="Tfng" typeface="Ebrima"/>
+      </a:minorFont>
+    </a:fontScheme>
+    <a:fmtScheme name="Office">
+      <a:fillStyleLst>
+        <a:solidFill>
+          <a:schemeClr val="phClr"/>
+        </a:solidFill>
+        <a:gradFill rotWithShape="1">
+          <a:gsLst>
+            <a:gs pos="0">
+              <a:schemeClr val="phClr">
+                <a:lumMod val="110000"/>
+                <a:satMod val="105000"/>
+                <a:tint val="67000"/>
+              </a:schemeClr>
+            </a:gs>
+            <a:gs pos="50000">
+              <a:schemeClr val="phClr">
+                <a:lumMod val="105000"/>
+                <a:satMod val="103000"/>
+                <a:tint val="73000"/>
+              </a:schemeClr>
+            </a:gs>
+            <a:gs pos="100000">
+              <a:schemeClr val="phClr">
+                <a:lumMod val="105000"/>
+                <a:satMod val="109000"/>
+                <a:tint val="81000"/>
+              </a:schemeClr>
+            </a:gs>
+          </a:gsLst>
+          <a:lin ang="5400000" scaled="0"/>
+        </a:gradFill>
+        <a:gradFill rotWithShape="1">
+          <a:gsLst>
+            <a:gs pos="0">
+              <a:schemeClr val="phClr">
+                <a:satMod val="103000"/>
+                <a:lumMod val="102000"/>
+                <a:tint val="94000"/>
+              </a:schemeClr>
+            </a:gs>
+            <a:gs pos="50000">
+              <a:schemeClr val="phClr">
+                <a:satMod val="110000"/>
+                <a:lumMod val="100000"/>
+                <a:shade val="100000"/>
+              </a:schemeClr>
+            </a:gs>
+            <a:gs pos="100000">
+              <a:schemeClr val="phClr">
+                <a:lumMod val="99000"/>
+                <a:satMod val="120000"/>
+                <a:shade val="78000"/>
+              </a:schemeClr>
+            </a:gs>
+          </a:gsLst>
+          <a:lin ang="5400000" scaled="0"/>
+        </a:gradFill>
+      </a:fillStyleLst>
+      <a:lnStyleLst>
+        <a:ln w="6350" cap="flat" cmpd="sng" algn="ctr">
+          <a:solidFill>
+            <a:schemeClr val="phClr"/>
+          </a:solidFill>
+          <a:prstDash val="solid"/>
+          <a:miter lim="800000"/>
+        </a:ln>
+        <a:ln w="12700" cap="flat" cmpd="sng" algn="ctr">
+          <a:solidFill>
+            <a:schemeClr val="phClr"/>
+          </a:solidFill>
+          <a:prstDash val="solid"/>
+          <a:miter lim="800000"/>
+        </a:ln>
+        <a:ln w="19050" cap="flat" cmpd="sng" algn="ctr">
+          <a:solidFill>
+            <a:schemeClr val="phClr"/>
+          </a:solidFill>
+          <a:prstDash val="solid"/>
+          <a:miter lim="800000"/>
+        </a:ln>
+      </a:lnStyleLst>
+      <a:effectStyleLst>
+        <a:effectStyle>
+          <a:effectLst/>
+        </a:effectStyle>
+        <a:effectStyle>
+          <a:effectLst/>
+        </a:effectStyle>
+        <a:effectStyle>
+          <a:effectLst>
+            <a:outerShdw blurRad="57150" dist="19050" dir="5400000" algn="ctr" rotWithShape="0">
+              <a:srgbClr val="000000">
+                <a:alpha val="63000"/>
+              </a:srgbClr>
+            </a:outerShdw>
+          </a:effectLst>
+        </a:effectStyle>
+      </a:effectStyleLst>
+      <a:bgFillStyleLst>
+        <a:solidFill>
+          <a:schemeClr val="phClr"/>
+        </a:solidFill>
+        <a:solidFill>
+          <a:schemeClr val="phClr">
+            <a:tint val="95000"/>
+            <a:satMod val="170000"/>
+          </a:schemeClr>
+        </a:solidFill>
+        <a:gradFill rotWithShape="1">
+          <a:gsLst>
+            <a:gs pos="0">
+              <a:schemeClr val="phClr">
+                <a:tint val="93000"/>
+                <a:satMod val="150000"/>
+                <a:shade val="98000"/>
+                <a:lumMod val="102000"/>
+              </a:schemeClr>
+            </a:gs>
+            <a:gs pos="50000">
+              <a:schemeClr val="phClr">
+                <a:tint val="98000"/>
+                <a:satMod val="130000"/>
+                <a:shade val="90000"/>
+                <a:lumMod val="103000"/>
+              </a:schemeClr>
+            </a:gs>
+            <a:gs pos="100000">
+              <a:schemeClr val="phClr">
+                <a:shade val="63000"/>
+                <a:satMod val="120000"/>
+              </a:schemeClr>
+            </a:gs>
+          </a:gsLst>
+          <a:lin ang="5400000" scaled="0"/>
+        </a:gradFill>
+      </a:bgFillStyleLst>
+    </a:fmtScheme>
+  </a:themeElements>
+  <a:objectDefaults/>
+  <a:extraClrSchemeLst/>
+  <a:extLst>
+    <a:ext uri="{05A4C25C-085E-4340-85A3-A5531E510DB2}">
+      <thm15:themeFamily xmlns:thm15="http://schemas.microsoft.com/office/thememl/2012/main" name="Office Theme" id="{62F939B6-93AF-4DB8-9C6B-D6C7DFDC589F}" vid="{4A3C46E8-61CC-4603-A589-7422A47A8E4A}"/>
+    </a:ext>
+  </a:extLst>
+</a:theme>
 </file>
</xml_diff>

<commit_message>
adicionado tres primeiros topics do capitulo 5
</commit_message>
<xml_diff>
--- a/doc/diagramas/conceitual/Conceitual.pptx
+++ b/doc/diagramas/conceitual/Conceitual.pptx
@@ -5,11 +5,12 @@
     <p:sldMasterId id="2147483648" r:id="rId1"/>
   </p:sldMasterIdLst>
   <p:notesMasterIdLst>
-    <p:notesMasterId r:id="rId4"/>
+    <p:notesMasterId r:id="rId5"/>
   </p:notesMasterIdLst>
   <p:sldIdLst>
     <p:sldId id="256" r:id="rId2"/>
     <p:sldId id="257" r:id="rId3"/>
+    <p:sldId id="258" r:id="rId4"/>
   </p:sldIdLst>
   <p:sldSz cx="12192000" cy="6858000"/>
   <p:notesSz cx="6858000" cy="9144000"/>
@@ -198,7 +199,7 @@
           <a:p>
             <a:fld id="{8008BA6E-468E-4946-80E3-BA5DE588EE13}" type="datetimeFigureOut">
               <a:rPr lang="pt-BR" smtClean="0"/>
-              <a:t>05/05/2019</a:t>
+              <a:t>06/05/2019</a:t>
             </a:fld>
             <a:endParaRPr lang="pt-BR"/>
           </a:p>
@@ -762,7 +763,7 @@
           <a:p>
             <a:fld id="{4E198183-1849-47C3-B91A-B1E2FC32FD0B}" type="datetimeFigureOut">
               <a:rPr lang="pt-BR" smtClean="0"/>
-              <a:t>05/05/2019</a:t>
+              <a:t>06/05/2019</a:t>
             </a:fld>
             <a:endParaRPr lang="pt-BR"/>
           </a:p>
@@ -930,7 +931,7 @@
           <a:p>
             <a:fld id="{4E198183-1849-47C3-B91A-B1E2FC32FD0B}" type="datetimeFigureOut">
               <a:rPr lang="pt-BR" smtClean="0"/>
-              <a:t>05/05/2019</a:t>
+              <a:t>06/05/2019</a:t>
             </a:fld>
             <a:endParaRPr lang="pt-BR"/>
           </a:p>
@@ -1108,7 +1109,7 @@
           <a:p>
             <a:fld id="{4E198183-1849-47C3-B91A-B1E2FC32FD0B}" type="datetimeFigureOut">
               <a:rPr lang="pt-BR" smtClean="0"/>
-              <a:t>05/05/2019</a:t>
+              <a:t>06/05/2019</a:t>
             </a:fld>
             <a:endParaRPr lang="pt-BR"/>
           </a:p>
@@ -1276,7 +1277,7 @@
           <a:p>
             <a:fld id="{4E198183-1849-47C3-B91A-B1E2FC32FD0B}" type="datetimeFigureOut">
               <a:rPr lang="pt-BR" smtClean="0"/>
-              <a:t>05/05/2019</a:t>
+              <a:t>06/05/2019</a:t>
             </a:fld>
             <a:endParaRPr lang="pt-BR"/>
           </a:p>
@@ -1521,7 +1522,7 @@
           <a:p>
             <a:fld id="{4E198183-1849-47C3-B91A-B1E2FC32FD0B}" type="datetimeFigureOut">
               <a:rPr lang="pt-BR" smtClean="0"/>
-              <a:t>05/05/2019</a:t>
+              <a:t>06/05/2019</a:t>
             </a:fld>
             <a:endParaRPr lang="pt-BR"/>
           </a:p>
@@ -1750,7 +1751,7 @@
           <a:p>
             <a:fld id="{4E198183-1849-47C3-B91A-B1E2FC32FD0B}" type="datetimeFigureOut">
               <a:rPr lang="pt-BR" smtClean="0"/>
-              <a:t>05/05/2019</a:t>
+              <a:t>06/05/2019</a:t>
             </a:fld>
             <a:endParaRPr lang="pt-BR"/>
           </a:p>
@@ -2114,7 +2115,7 @@
           <a:p>
             <a:fld id="{4E198183-1849-47C3-B91A-B1E2FC32FD0B}" type="datetimeFigureOut">
               <a:rPr lang="pt-BR" smtClean="0"/>
-              <a:t>05/05/2019</a:t>
+              <a:t>06/05/2019</a:t>
             </a:fld>
             <a:endParaRPr lang="pt-BR"/>
           </a:p>
@@ -2231,7 +2232,7 @@
           <a:p>
             <a:fld id="{4E198183-1849-47C3-B91A-B1E2FC32FD0B}" type="datetimeFigureOut">
               <a:rPr lang="pt-BR" smtClean="0"/>
-              <a:t>05/05/2019</a:t>
+              <a:t>06/05/2019</a:t>
             </a:fld>
             <a:endParaRPr lang="pt-BR"/>
           </a:p>
@@ -2326,7 +2327,7 @@
           <a:p>
             <a:fld id="{4E198183-1849-47C3-B91A-B1E2FC32FD0B}" type="datetimeFigureOut">
               <a:rPr lang="pt-BR" smtClean="0"/>
-              <a:t>05/05/2019</a:t>
+              <a:t>06/05/2019</a:t>
             </a:fld>
             <a:endParaRPr lang="pt-BR"/>
           </a:p>
@@ -2601,7 +2602,7 @@
           <a:p>
             <a:fld id="{4E198183-1849-47C3-B91A-B1E2FC32FD0B}" type="datetimeFigureOut">
               <a:rPr lang="pt-BR" smtClean="0"/>
-              <a:t>05/05/2019</a:t>
+              <a:t>06/05/2019</a:t>
             </a:fld>
             <a:endParaRPr lang="pt-BR"/>
           </a:p>
@@ -2853,7 +2854,7 @@
           <a:p>
             <a:fld id="{4E198183-1849-47C3-B91A-B1E2FC32FD0B}" type="datetimeFigureOut">
               <a:rPr lang="pt-BR" smtClean="0"/>
-              <a:t>05/05/2019</a:t>
+              <a:t>06/05/2019</a:t>
             </a:fld>
             <a:endParaRPr lang="pt-BR"/>
           </a:p>
@@ -3064,7 +3065,7 @@
           <a:p>
             <a:fld id="{4E198183-1849-47C3-B91A-B1E2FC32FD0B}" type="datetimeFigureOut">
               <a:rPr lang="pt-BR" smtClean="0"/>
-              <a:t>05/05/2019</a:t>
+              <a:t>06/05/2019</a:t>
             </a:fld>
             <a:endParaRPr lang="pt-BR"/>
           </a:p>
@@ -6951,6 +6952,729 @@
     <p:extLst>
       <p:ext uri="{BB962C8B-B14F-4D97-AF65-F5344CB8AC3E}">
         <p14:creationId xmlns:p14="http://schemas.microsoft.com/office/powerpoint/2010/main" val="3598449459"/>
+      </p:ext>
+    </p:extLst>
+  </p:cSld>
+  <p:clrMapOvr>
+    <a:masterClrMapping/>
+  </p:clrMapOvr>
+</p:sld>
+</file>
+
+<file path=ppt/slides/slide3.xml><?xml version="1.0" encoding="utf-8"?>
+<p:sld xmlns:a="http://schemas.openxmlformats.org/drawingml/2006/main" xmlns:r="http://schemas.openxmlformats.org/officeDocument/2006/relationships" xmlns:p="http://schemas.openxmlformats.org/presentationml/2006/main">
+  <p:cSld>
+    <p:spTree>
+      <p:nvGrpSpPr>
+        <p:cNvPr id="1" name=""/>
+        <p:cNvGrpSpPr/>
+        <p:nvPr/>
+      </p:nvGrpSpPr>
+      <p:grpSpPr>
+        <a:xfrm>
+          <a:off x="0" y="0"/>
+          <a:ext cx="0" cy="0"/>
+          <a:chOff x="0" y="0"/>
+          <a:chExt cx="0" cy="0"/>
+        </a:xfrm>
+      </p:grpSpPr>
+      <p:sp>
+        <p:nvSpPr>
+          <p:cNvPr id="4" name="Retângulo 3">
+            <a:extLst>
+              <a:ext uri="{FF2B5EF4-FFF2-40B4-BE49-F238E27FC236}">
+                <a16:creationId xmlns:a16="http://schemas.microsoft.com/office/drawing/2014/main" id="{D5842690-60E9-48ED-8F2D-BFAD47CB6A7B}"/>
+              </a:ext>
+            </a:extLst>
+          </p:cNvPr>
+          <p:cNvSpPr/>
+          <p:nvPr/>
+        </p:nvSpPr>
+        <p:spPr>
+          <a:xfrm>
+            <a:off x="5689443" y="1675620"/>
+            <a:ext cx="2564091" cy="3478491"/>
+          </a:xfrm>
+          <a:prstGeom prst="rect">
+            <a:avLst/>
+          </a:prstGeom>
+          <a:solidFill>
+            <a:schemeClr val="accent2">
+              <a:lumMod val="75000"/>
+            </a:schemeClr>
+          </a:solidFill>
+        </p:spPr>
+        <p:style>
+          <a:lnRef idx="2">
+            <a:schemeClr val="accent1">
+              <a:shade val="50000"/>
+            </a:schemeClr>
+          </a:lnRef>
+          <a:fillRef idx="1">
+            <a:schemeClr val="accent1"/>
+          </a:fillRef>
+          <a:effectRef idx="0">
+            <a:schemeClr val="accent1"/>
+          </a:effectRef>
+          <a:fontRef idx="minor">
+            <a:schemeClr val="lt1"/>
+          </a:fontRef>
+        </p:style>
+        <p:txBody>
+          <a:bodyPr rtlCol="0" anchor="ctr"/>
+          <a:lstStyle/>
+          <a:p>
+            <a:pPr algn="ctr"/>
+            <a:r>
+              <a:rPr lang="pt-BR" sz="4800" dirty="0"/>
+              <a:t>ROS</a:t>
+            </a:r>
+          </a:p>
+        </p:txBody>
+      </p:sp>
+      <p:sp>
+        <p:nvSpPr>
+          <p:cNvPr id="5" name="Retângulo 4">
+            <a:extLst>
+              <a:ext uri="{FF2B5EF4-FFF2-40B4-BE49-F238E27FC236}">
+                <a16:creationId xmlns:a16="http://schemas.microsoft.com/office/drawing/2014/main" id="{26071264-175D-4C06-B256-C7CC16A780F8}"/>
+              </a:ext>
+            </a:extLst>
+          </p:cNvPr>
+          <p:cNvSpPr/>
+          <p:nvPr/>
+        </p:nvSpPr>
+        <p:spPr>
+          <a:xfrm>
+            <a:off x="8253534" y="1675620"/>
+            <a:ext cx="2564091" cy="1157142"/>
+          </a:xfrm>
+          <a:prstGeom prst="rect">
+            <a:avLst/>
+          </a:prstGeom>
+          <a:solidFill>
+            <a:srgbClr val="00B050"/>
+          </a:solidFill>
+        </p:spPr>
+        <p:style>
+          <a:lnRef idx="2">
+            <a:schemeClr val="accent1">
+              <a:shade val="50000"/>
+            </a:schemeClr>
+          </a:lnRef>
+          <a:fillRef idx="1">
+            <a:schemeClr val="accent1"/>
+          </a:fillRef>
+          <a:effectRef idx="0">
+            <a:schemeClr val="accent1"/>
+          </a:effectRef>
+          <a:fontRef idx="minor">
+            <a:schemeClr val="lt1"/>
+          </a:fontRef>
+        </p:style>
+        <p:txBody>
+          <a:bodyPr rtlCol="0" anchor="ctr"/>
+          <a:lstStyle/>
+          <a:p>
+            <a:pPr algn="ctr"/>
+            <a:r>
+              <a:rPr lang="pt-BR" sz="2000" dirty="0"/>
+              <a:t>Módulo coleta de dados</a:t>
+            </a:r>
+          </a:p>
+        </p:txBody>
+      </p:sp>
+      <p:sp>
+        <p:nvSpPr>
+          <p:cNvPr id="6" name="Retângulo 5">
+            <a:extLst>
+              <a:ext uri="{FF2B5EF4-FFF2-40B4-BE49-F238E27FC236}">
+                <a16:creationId xmlns:a16="http://schemas.microsoft.com/office/drawing/2014/main" id="{2BD0C31B-C188-4F12-B6C1-2697E7A915E6}"/>
+              </a:ext>
+            </a:extLst>
+          </p:cNvPr>
+          <p:cNvSpPr/>
+          <p:nvPr/>
+        </p:nvSpPr>
+        <p:spPr>
+          <a:xfrm>
+            <a:off x="8253534" y="2839829"/>
+            <a:ext cx="2564091" cy="1157142"/>
+          </a:xfrm>
+          <a:prstGeom prst="rect">
+            <a:avLst/>
+          </a:prstGeom>
+          <a:solidFill>
+            <a:srgbClr val="00B050"/>
+          </a:solidFill>
+        </p:spPr>
+        <p:style>
+          <a:lnRef idx="2">
+            <a:schemeClr val="accent1">
+              <a:shade val="50000"/>
+            </a:schemeClr>
+          </a:lnRef>
+          <a:fillRef idx="1">
+            <a:schemeClr val="accent1"/>
+          </a:fillRef>
+          <a:effectRef idx="0">
+            <a:schemeClr val="accent1"/>
+          </a:effectRef>
+          <a:fontRef idx="minor">
+            <a:schemeClr val="lt1"/>
+          </a:fontRef>
+        </p:style>
+        <p:txBody>
+          <a:bodyPr rtlCol="0" anchor="ctr"/>
+          <a:lstStyle/>
+          <a:p>
+            <a:pPr algn="ctr"/>
+            <a:r>
+              <a:rPr lang="pt-BR" sz="2000" dirty="0"/>
+              <a:t>Módulo de execução de rotas</a:t>
+            </a:r>
+          </a:p>
+        </p:txBody>
+      </p:sp>
+      <p:sp>
+        <p:nvSpPr>
+          <p:cNvPr id="7" name="Retângulo 6">
+            <a:extLst>
+              <a:ext uri="{FF2B5EF4-FFF2-40B4-BE49-F238E27FC236}">
+                <a16:creationId xmlns:a16="http://schemas.microsoft.com/office/drawing/2014/main" id="{70A52BC8-A6D2-472B-BA9B-C130D1ECF160}"/>
+              </a:ext>
+            </a:extLst>
+          </p:cNvPr>
+          <p:cNvSpPr/>
+          <p:nvPr/>
+        </p:nvSpPr>
+        <p:spPr>
+          <a:xfrm>
+            <a:off x="8253533" y="3996968"/>
+            <a:ext cx="2564091" cy="1157142"/>
+          </a:xfrm>
+          <a:prstGeom prst="rect">
+            <a:avLst/>
+          </a:prstGeom>
+          <a:solidFill>
+            <a:srgbClr val="00B050"/>
+          </a:solidFill>
+        </p:spPr>
+        <p:style>
+          <a:lnRef idx="2">
+            <a:schemeClr val="accent1">
+              <a:shade val="50000"/>
+            </a:schemeClr>
+          </a:lnRef>
+          <a:fillRef idx="1">
+            <a:schemeClr val="accent1"/>
+          </a:fillRef>
+          <a:effectRef idx="0">
+            <a:schemeClr val="accent1"/>
+          </a:effectRef>
+          <a:fontRef idx="minor">
+            <a:schemeClr val="lt1"/>
+          </a:fontRef>
+        </p:style>
+        <p:txBody>
+          <a:bodyPr rtlCol="0" anchor="ctr"/>
+          <a:lstStyle/>
+          <a:p>
+            <a:pPr algn="ctr"/>
+            <a:r>
+              <a:rPr lang="pt-BR" sz="2000" dirty="0"/>
+              <a:t>Módulo de atualização de mapas</a:t>
+            </a:r>
+          </a:p>
+        </p:txBody>
+      </p:sp>
+      <p:sp>
+        <p:nvSpPr>
+          <p:cNvPr id="8" name="Retângulo 7">
+            <a:extLst>
+              <a:ext uri="{FF2B5EF4-FFF2-40B4-BE49-F238E27FC236}">
+                <a16:creationId xmlns:a16="http://schemas.microsoft.com/office/drawing/2014/main" id="{763D329B-ACFE-4654-A49E-32875DCC9521}"/>
+              </a:ext>
+            </a:extLst>
+          </p:cNvPr>
+          <p:cNvSpPr/>
+          <p:nvPr/>
+        </p:nvSpPr>
+        <p:spPr>
+          <a:xfrm>
+            <a:off x="1141674" y="1696823"/>
+            <a:ext cx="2564091" cy="1732177"/>
+          </a:xfrm>
+          <a:prstGeom prst="rect">
+            <a:avLst/>
+          </a:prstGeom>
+          <a:solidFill>
+            <a:srgbClr val="00B050"/>
+          </a:solidFill>
+        </p:spPr>
+        <p:style>
+          <a:lnRef idx="2">
+            <a:schemeClr val="accent1">
+              <a:shade val="50000"/>
+            </a:schemeClr>
+          </a:lnRef>
+          <a:fillRef idx="1">
+            <a:schemeClr val="accent1"/>
+          </a:fillRef>
+          <a:effectRef idx="0">
+            <a:schemeClr val="accent1"/>
+          </a:effectRef>
+          <a:fontRef idx="minor">
+            <a:schemeClr val="lt1"/>
+          </a:fontRef>
+        </p:style>
+        <p:txBody>
+          <a:bodyPr rtlCol="0" anchor="ctr"/>
+          <a:lstStyle/>
+          <a:p>
+            <a:pPr algn="ctr"/>
+            <a:r>
+              <a:rPr lang="pt-BR" sz="2000" dirty="0"/>
+              <a:t>Gerenciador de voo</a:t>
+            </a:r>
+          </a:p>
+        </p:txBody>
+      </p:sp>
+      <p:sp>
+        <p:nvSpPr>
+          <p:cNvPr id="9" name="Retângulo 8">
+            <a:extLst>
+              <a:ext uri="{FF2B5EF4-FFF2-40B4-BE49-F238E27FC236}">
+                <a16:creationId xmlns:a16="http://schemas.microsoft.com/office/drawing/2014/main" id="{1943F22D-EAC6-42CB-84BB-8895EAA8536F}"/>
+              </a:ext>
+            </a:extLst>
+          </p:cNvPr>
+          <p:cNvSpPr/>
+          <p:nvPr/>
+        </p:nvSpPr>
+        <p:spPr>
+          <a:xfrm>
+            <a:off x="1141677" y="3433408"/>
+            <a:ext cx="2564091" cy="1732178"/>
+          </a:xfrm>
+          <a:prstGeom prst="rect">
+            <a:avLst/>
+          </a:prstGeom>
+          <a:solidFill>
+            <a:srgbClr val="7030A0"/>
+          </a:solidFill>
+        </p:spPr>
+        <p:style>
+          <a:lnRef idx="2">
+            <a:schemeClr val="accent1">
+              <a:shade val="50000"/>
+            </a:schemeClr>
+          </a:lnRef>
+          <a:fillRef idx="1">
+            <a:schemeClr val="accent1"/>
+          </a:fillRef>
+          <a:effectRef idx="0">
+            <a:schemeClr val="accent1"/>
+          </a:effectRef>
+          <a:fontRef idx="minor">
+            <a:schemeClr val="lt1"/>
+          </a:fontRef>
+        </p:style>
+        <p:txBody>
+          <a:bodyPr rtlCol="0" anchor="ctr"/>
+          <a:lstStyle/>
+          <a:p>
+            <a:pPr algn="ctr"/>
+            <a:r>
+              <a:rPr lang="pt-BR" sz="2000" dirty="0"/>
+              <a:t>Simulador de controlador de voo </a:t>
+            </a:r>
+          </a:p>
+        </p:txBody>
+      </p:sp>
+      <p:sp>
+        <p:nvSpPr>
+          <p:cNvPr id="11" name="Retângulo 10">
+            <a:extLst>
+              <a:ext uri="{FF2B5EF4-FFF2-40B4-BE49-F238E27FC236}">
+                <a16:creationId xmlns:a16="http://schemas.microsoft.com/office/drawing/2014/main" id="{C295414E-0B35-4055-828A-BA9995173F2D}"/>
+              </a:ext>
+            </a:extLst>
+          </p:cNvPr>
+          <p:cNvSpPr/>
+          <p:nvPr/>
+        </p:nvSpPr>
+        <p:spPr>
+          <a:xfrm>
+            <a:off x="5689442" y="5161177"/>
+            <a:ext cx="5128182" cy="855838"/>
+          </a:xfrm>
+          <a:prstGeom prst="rect">
+            <a:avLst/>
+          </a:prstGeom>
+          <a:solidFill>
+            <a:srgbClr val="7030A0"/>
+          </a:solidFill>
+        </p:spPr>
+        <p:style>
+          <a:lnRef idx="2">
+            <a:schemeClr val="accent1">
+              <a:shade val="50000"/>
+            </a:schemeClr>
+          </a:lnRef>
+          <a:fillRef idx="1">
+            <a:schemeClr val="accent1"/>
+          </a:fillRef>
+          <a:effectRef idx="0">
+            <a:schemeClr val="accent1"/>
+          </a:effectRef>
+          <a:fontRef idx="minor">
+            <a:schemeClr val="lt1"/>
+          </a:fontRef>
+        </p:style>
+        <p:txBody>
+          <a:bodyPr rtlCol="0" anchor="ctr"/>
+          <a:lstStyle/>
+          <a:p>
+            <a:pPr algn="ctr"/>
+            <a:r>
+              <a:rPr lang="pt-BR" sz="2000" dirty="0"/>
+              <a:t>Simulador Gazebo</a:t>
+            </a:r>
+          </a:p>
+        </p:txBody>
+      </p:sp>
+      <p:sp>
+        <p:nvSpPr>
+          <p:cNvPr id="12" name="Retângulo 11">
+            <a:extLst>
+              <a:ext uri="{FF2B5EF4-FFF2-40B4-BE49-F238E27FC236}">
+                <a16:creationId xmlns:a16="http://schemas.microsoft.com/office/drawing/2014/main" id="{1AC3AB78-3DFC-4CD7-8DF8-CCDAFA255C92}"/>
+              </a:ext>
+            </a:extLst>
+          </p:cNvPr>
+          <p:cNvSpPr/>
+          <p:nvPr/>
+        </p:nvSpPr>
+        <p:spPr>
+          <a:xfrm>
+            <a:off x="5689441" y="909693"/>
+            <a:ext cx="5128184" cy="772996"/>
+          </a:xfrm>
+          <a:prstGeom prst="rect">
+            <a:avLst/>
+          </a:prstGeom>
+          <a:solidFill>
+            <a:srgbClr val="7030A0"/>
+          </a:solidFill>
+        </p:spPr>
+        <p:style>
+          <a:lnRef idx="2">
+            <a:schemeClr val="accent1">
+              <a:shade val="50000"/>
+            </a:schemeClr>
+          </a:lnRef>
+          <a:fillRef idx="1">
+            <a:schemeClr val="accent1"/>
+          </a:fillRef>
+          <a:effectRef idx="0">
+            <a:schemeClr val="accent1"/>
+          </a:effectRef>
+          <a:fontRef idx="minor">
+            <a:schemeClr val="lt1"/>
+          </a:fontRef>
+        </p:style>
+        <p:txBody>
+          <a:bodyPr rtlCol="0" anchor="ctr"/>
+          <a:lstStyle/>
+          <a:p>
+            <a:pPr algn="ctr"/>
+            <a:r>
+              <a:rPr lang="pt-BR" sz="2000" dirty="0"/>
+              <a:t>Visualizador </a:t>
+            </a:r>
+            <a:r>
+              <a:rPr lang="pt-BR" sz="2000" dirty="0" err="1"/>
+              <a:t>RViz</a:t>
+            </a:r>
+            <a:endParaRPr lang="pt-BR" sz="2000" dirty="0"/>
+          </a:p>
+        </p:txBody>
+      </p:sp>
+      <p:sp>
+        <p:nvSpPr>
+          <p:cNvPr id="13" name="Retângulo 12">
+            <a:extLst>
+              <a:ext uri="{FF2B5EF4-FFF2-40B4-BE49-F238E27FC236}">
+                <a16:creationId xmlns:a16="http://schemas.microsoft.com/office/drawing/2014/main" id="{367B15F2-BDA8-4A99-BEA5-EEC0D3630969}"/>
+              </a:ext>
+            </a:extLst>
+          </p:cNvPr>
+          <p:cNvSpPr/>
+          <p:nvPr/>
+        </p:nvSpPr>
+        <p:spPr>
+          <a:xfrm>
+            <a:off x="4260715" y="1696822"/>
+            <a:ext cx="776427" cy="3478491"/>
+          </a:xfrm>
+          <a:prstGeom prst="rect">
+            <a:avLst/>
+          </a:prstGeom>
+          <a:solidFill>
+            <a:schemeClr val="accent2">
+              <a:lumMod val="75000"/>
+            </a:schemeClr>
+          </a:solidFill>
+        </p:spPr>
+        <p:style>
+          <a:lnRef idx="2">
+            <a:schemeClr val="accent1">
+              <a:shade val="50000"/>
+            </a:schemeClr>
+          </a:lnRef>
+          <a:fillRef idx="1">
+            <a:schemeClr val="accent1"/>
+          </a:fillRef>
+          <a:effectRef idx="0">
+            <a:schemeClr val="accent1"/>
+          </a:effectRef>
+          <a:fontRef idx="minor">
+            <a:schemeClr val="lt1"/>
+          </a:fontRef>
+        </p:style>
+        <p:txBody>
+          <a:bodyPr vert="vert270" rtlCol="0" anchor="ctr"/>
+          <a:lstStyle/>
+          <a:p>
+            <a:pPr algn="ctr"/>
+            <a:r>
+              <a:rPr lang="pt-BR" sz="4800" dirty="0"/>
+              <a:t>TCPROS</a:t>
+            </a:r>
+          </a:p>
+        </p:txBody>
+      </p:sp>
+      <p:sp>
+        <p:nvSpPr>
+          <p:cNvPr id="14" name="Retângulo 13">
+            <a:extLst>
+              <a:ext uri="{FF2B5EF4-FFF2-40B4-BE49-F238E27FC236}">
+                <a16:creationId xmlns:a16="http://schemas.microsoft.com/office/drawing/2014/main" id="{18CA4149-BC5C-4D85-AC6B-EE28AE290379}"/>
+              </a:ext>
+            </a:extLst>
+          </p:cNvPr>
+          <p:cNvSpPr/>
+          <p:nvPr/>
+        </p:nvSpPr>
+        <p:spPr>
+          <a:xfrm rot="16200000">
+            <a:off x="-873587" y="3160056"/>
+            <a:ext cx="3478491" cy="552024"/>
+          </a:xfrm>
+          <a:prstGeom prst="rect">
+            <a:avLst/>
+          </a:prstGeom>
+          <a:solidFill>
+            <a:schemeClr val="tx2">
+              <a:lumMod val="75000"/>
+            </a:schemeClr>
+          </a:solidFill>
+        </p:spPr>
+        <p:style>
+          <a:lnRef idx="2">
+            <a:schemeClr val="accent1">
+              <a:shade val="50000"/>
+            </a:schemeClr>
+          </a:lnRef>
+          <a:fillRef idx="1">
+            <a:schemeClr val="accent1"/>
+          </a:fillRef>
+          <a:effectRef idx="0">
+            <a:schemeClr val="accent1"/>
+          </a:effectRef>
+          <a:fontRef idx="minor">
+            <a:schemeClr val="lt1"/>
+          </a:fontRef>
+        </p:style>
+        <p:txBody>
+          <a:bodyPr rtlCol="0" anchor="ctr"/>
+          <a:lstStyle/>
+          <a:p>
+            <a:pPr algn="ctr"/>
+            <a:r>
+              <a:rPr lang="pt-BR" sz="2000" dirty="0"/>
+              <a:t>Moto C Plus + Android</a:t>
+            </a:r>
+          </a:p>
+        </p:txBody>
+      </p:sp>
+      <p:sp>
+        <p:nvSpPr>
+          <p:cNvPr id="15" name="Retângulo 14">
+            <a:extLst>
+              <a:ext uri="{FF2B5EF4-FFF2-40B4-BE49-F238E27FC236}">
+                <a16:creationId xmlns:a16="http://schemas.microsoft.com/office/drawing/2014/main" id="{CC4BE7C0-3171-48CF-A21B-F6A2C13FD71E}"/>
+              </a:ext>
+            </a:extLst>
+          </p:cNvPr>
+          <p:cNvSpPr/>
+          <p:nvPr/>
+        </p:nvSpPr>
+        <p:spPr>
+          <a:xfrm>
+            <a:off x="10817624" y="923827"/>
+            <a:ext cx="641559" cy="5093188"/>
+          </a:xfrm>
+          <a:prstGeom prst="rect">
+            <a:avLst/>
+          </a:prstGeom>
+          <a:solidFill>
+            <a:schemeClr val="tx2">
+              <a:lumMod val="75000"/>
+            </a:schemeClr>
+          </a:solidFill>
+        </p:spPr>
+        <p:style>
+          <a:lnRef idx="2">
+            <a:schemeClr val="accent1">
+              <a:shade val="50000"/>
+            </a:schemeClr>
+          </a:lnRef>
+          <a:fillRef idx="1">
+            <a:schemeClr val="accent1"/>
+          </a:fillRef>
+          <a:effectRef idx="0">
+            <a:schemeClr val="accent1"/>
+          </a:effectRef>
+          <a:fontRef idx="minor">
+            <a:schemeClr val="lt1"/>
+          </a:fontRef>
+        </p:style>
+        <p:txBody>
+          <a:bodyPr vert="vert270" rtlCol="0" anchor="ctr"/>
+          <a:lstStyle/>
+          <a:p>
+            <a:pPr algn="ctr"/>
+            <a:r>
+              <a:rPr lang="pt-BR" sz="2000" dirty="0"/>
+              <a:t>Estação de comando + Linux</a:t>
+            </a:r>
+          </a:p>
+        </p:txBody>
+      </p:sp>
+      <p:sp>
+        <p:nvSpPr>
+          <p:cNvPr id="16" name="Retângulo 15">
+            <a:extLst>
+              <a:ext uri="{FF2B5EF4-FFF2-40B4-BE49-F238E27FC236}">
+                <a16:creationId xmlns:a16="http://schemas.microsoft.com/office/drawing/2014/main" id="{D81182C8-1D0F-4C02-A535-1240088FE2AB}"/>
+              </a:ext>
+            </a:extLst>
+          </p:cNvPr>
+          <p:cNvSpPr/>
+          <p:nvPr/>
+        </p:nvSpPr>
+        <p:spPr>
+          <a:xfrm>
+            <a:off x="5047880" y="923827"/>
+            <a:ext cx="641559" cy="5093188"/>
+          </a:xfrm>
+          <a:prstGeom prst="rect">
+            <a:avLst/>
+          </a:prstGeom>
+          <a:solidFill>
+            <a:schemeClr val="tx2">
+              <a:lumMod val="75000"/>
+            </a:schemeClr>
+          </a:solidFill>
+        </p:spPr>
+        <p:style>
+          <a:lnRef idx="2">
+            <a:schemeClr val="accent1">
+              <a:shade val="50000"/>
+            </a:schemeClr>
+          </a:lnRef>
+          <a:fillRef idx="1">
+            <a:schemeClr val="accent1"/>
+          </a:fillRef>
+          <a:effectRef idx="0">
+            <a:schemeClr val="accent1"/>
+          </a:effectRef>
+          <a:fontRef idx="minor">
+            <a:schemeClr val="lt1"/>
+          </a:fontRef>
+        </p:style>
+        <p:txBody>
+          <a:bodyPr vert="vert270" rtlCol="0" anchor="ctr"/>
+          <a:lstStyle/>
+          <a:p>
+            <a:pPr algn="ctr"/>
+            <a:r>
+              <a:rPr lang="pt-BR" sz="2000" dirty="0"/>
+              <a:t>Estação de comando + Linux</a:t>
+            </a:r>
+          </a:p>
+        </p:txBody>
+      </p:sp>
+      <p:sp>
+        <p:nvSpPr>
+          <p:cNvPr id="17" name="Retângulo 16">
+            <a:extLst>
+              <a:ext uri="{FF2B5EF4-FFF2-40B4-BE49-F238E27FC236}">
+                <a16:creationId xmlns:a16="http://schemas.microsoft.com/office/drawing/2014/main" id="{35E0124D-B2FB-48EC-9486-026749EAA669}"/>
+              </a:ext>
+            </a:extLst>
+          </p:cNvPr>
+          <p:cNvSpPr/>
+          <p:nvPr/>
+        </p:nvSpPr>
+        <p:spPr>
+          <a:xfrm rot="16200000">
+            <a:off x="2248387" y="3160057"/>
+            <a:ext cx="3478491" cy="552024"/>
+          </a:xfrm>
+          <a:prstGeom prst="rect">
+            <a:avLst/>
+          </a:prstGeom>
+          <a:solidFill>
+            <a:schemeClr val="tx2">
+              <a:lumMod val="75000"/>
+            </a:schemeClr>
+          </a:solidFill>
+        </p:spPr>
+        <p:style>
+          <a:lnRef idx="2">
+            <a:schemeClr val="accent1">
+              <a:shade val="50000"/>
+            </a:schemeClr>
+          </a:lnRef>
+          <a:fillRef idx="1">
+            <a:schemeClr val="accent1"/>
+          </a:fillRef>
+          <a:effectRef idx="0">
+            <a:schemeClr val="accent1"/>
+          </a:effectRef>
+          <a:fontRef idx="minor">
+            <a:schemeClr val="lt1"/>
+          </a:fontRef>
+        </p:style>
+        <p:txBody>
+          <a:bodyPr rtlCol="0" anchor="ctr"/>
+          <a:lstStyle/>
+          <a:p>
+            <a:pPr algn="ctr"/>
+            <a:r>
+              <a:rPr lang="pt-BR" sz="2000" dirty="0"/>
+              <a:t>Moto C Plus + Android</a:t>
+            </a:r>
+          </a:p>
+        </p:txBody>
+      </p:sp>
+    </p:spTree>
+    <p:extLst>
+      <p:ext uri="{BB962C8B-B14F-4D97-AF65-F5344CB8AC3E}">
+        <p14:creationId xmlns:p14="http://schemas.microsoft.com/office/powerpoint/2010/main" val="2193913337"/>
       </p:ext>
     </p:extLst>
   </p:cSld>

</xml_diff>

<commit_message>
adicionado ajustes na formatação
</commit_message>
<xml_diff>
--- a/doc/diagramas/conceitual/Conceitual.pptx
+++ b/doc/diagramas/conceitual/Conceitual.pptx
@@ -199,7 +199,7 @@
           <a:p>
             <a:fld id="{8008BA6E-468E-4946-80E3-BA5DE588EE13}" type="datetimeFigureOut">
               <a:rPr lang="pt-BR" smtClean="0"/>
-              <a:t>06/05/2019</a:t>
+              <a:t>08/07/2019</a:t>
             </a:fld>
             <a:endParaRPr lang="pt-BR"/>
           </a:p>
@@ -763,7 +763,7 @@
           <a:p>
             <a:fld id="{4E198183-1849-47C3-B91A-B1E2FC32FD0B}" type="datetimeFigureOut">
               <a:rPr lang="pt-BR" smtClean="0"/>
-              <a:t>06/05/2019</a:t>
+              <a:t>08/07/2019</a:t>
             </a:fld>
             <a:endParaRPr lang="pt-BR"/>
           </a:p>
@@ -931,7 +931,7 @@
           <a:p>
             <a:fld id="{4E198183-1849-47C3-B91A-B1E2FC32FD0B}" type="datetimeFigureOut">
               <a:rPr lang="pt-BR" smtClean="0"/>
-              <a:t>06/05/2019</a:t>
+              <a:t>08/07/2019</a:t>
             </a:fld>
             <a:endParaRPr lang="pt-BR"/>
           </a:p>
@@ -1109,7 +1109,7 @@
           <a:p>
             <a:fld id="{4E198183-1849-47C3-B91A-B1E2FC32FD0B}" type="datetimeFigureOut">
               <a:rPr lang="pt-BR" smtClean="0"/>
-              <a:t>06/05/2019</a:t>
+              <a:t>08/07/2019</a:t>
             </a:fld>
             <a:endParaRPr lang="pt-BR"/>
           </a:p>
@@ -1277,7 +1277,7 @@
           <a:p>
             <a:fld id="{4E198183-1849-47C3-B91A-B1E2FC32FD0B}" type="datetimeFigureOut">
               <a:rPr lang="pt-BR" smtClean="0"/>
-              <a:t>06/05/2019</a:t>
+              <a:t>08/07/2019</a:t>
             </a:fld>
             <a:endParaRPr lang="pt-BR"/>
           </a:p>
@@ -1522,7 +1522,7 @@
           <a:p>
             <a:fld id="{4E198183-1849-47C3-B91A-B1E2FC32FD0B}" type="datetimeFigureOut">
               <a:rPr lang="pt-BR" smtClean="0"/>
-              <a:t>06/05/2019</a:t>
+              <a:t>08/07/2019</a:t>
             </a:fld>
             <a:endParaRPr lang="pt-BR"/>
           </a:p>
@@ -1751,7 +1751,7 @@
           <a:p>
             <a:fld id="{4E198183-1849-47C3-B91A-B1E2FC32FD0B}" type="datetimeFigureOut">
               <a:rPr lang="pt-BR" smtClean="0"/>
-              <a:t>06/05/2019</a:t>
+              <a:t>08/07/2019</a:t>
             </a:fld>
             <a:endParaRPr lang="pt-BR"/>
           </a:p>
@@ -2115,7 +2115,7 @@
           <a:p>
             <a:fld id="{4E198183-1849-47C3-B91A-B1E2FC32FD0B}" type="datetimeFigureOut">
               <a:rPr lang="pt-BR" smtClean="0"/>
-              <a:t>06/05/2019</a:t>
+              <a:t>08/07/2019</a:t>
             </a:fld>
             <a:endParaRPr lang="pt-BR"/>
           </a:p>
@@ -2232,7 +2232,7 @@
           <a:p>
             <a:fld id="{4E198183-1849-47C3-B91A-B1E2FC32FD0B}" type="datetimeFigureOut">
               <a:rPr lang="pt-BR" smtClean="0"/>
-              <a:t>06/05/2019</a:t>
+              <a:t>08/07/2019</a:t>
             </a:fld>
             <a:endParaRPr lang="pt-BR"/>
           </a:p>
@@ -2327,7 +2327,7 @@
           <a:p>
             <a:fld id="{4E198183-1849-47C3-B91A-B1E2FC32FD0B}" type="datetimeFigureOut">
               <a:rPr lang="pt-BR" smtClean="0"/>
-              <a:t>06/05/2019</a:t>
+              <a:t>08/07/2019</a:t>
             </a:fld>
             <a:endParaRPr lang="pt-BR"/>
           </a:p>
@@ -2602,7 +2602,7 @@
           <a:p>
             <a:fld id="{4E198183-1849-47C3-B91A-B1E2FC32FD0B}" type="datetimeFigureOut">
               <a:rPr lang="pt-BR" smtClean="0"/>
-              <a:t>06/05/2019</a:t>
+              <a:t>08/07/2019</a:t>
             </a:fld>
             <a:endParaRPr lang="pt-BR"/>
           </a:p>
@@ -2854,7 +2854,7 @@
           <a:p>
             <a:fld id="{4E198183-1849-47C3-B91A-B1E2FC32FD0B}" type="datetimeFigureOut">
               <a:rPr lang="pt-BR" smtClean="0"/>
-              <a:t>06/05/2019</a:t>
+              <a:t>08/07/2019</a:t>
             </a:fld>
             <a:endParaRPr lang="pt-BR"/>
           </a:p>
@@ -3065,7 +3065,7 @@
           <a:p>
             <a:fld id="{4E198183-1849-47C3-B91A-B1E2FC32FD0B}" type="datetimeFigureOut">
               <a:rPr lang="pt-BR" smtClean="0"/>
-              <a:t>06/05/2019</a:t>
+              <a:t>08/07/2019</a:t>
             </a:fld>
             <a:endParaRPr lang="pt-BR"/>
           </a:p>
@@ -4286,7 +4286,7 @@
           <p:cNvPr id="2" name="Elipse 1">
             <a:extLst>
               <a:ext uri="{FF2B5EF4-FFF2-40B4-BE49-F238E27FC236}">
-                <a16:creationId xmlns:a16="http://schemas.microsoft.com/office/drawing/2014/main" id="{71B6F9EF-9A70-41A5-83B7-D18BC1AE6D06}"/>
+                <a16:creationId xmlns:a16="http://schemas.microsoft.com/office/drawing/2014/main" xmlns="" id="{71B6F9EF-9A70-41A5-83B7-D18BC1AE6D06}"/>
               </a:ext>
             </a:extLst>
           </p:cNvPr>
@@ -4338,7 +4338,7 @@
           <p:cNvPr id="27" name="Elipse 26">
             <a:extLst>
               <a:ext uri="{FF2B5EF4-FFF2-40B4-BE49-F238E27FC236}">
-                <a16:creationId xmlns:a16="http://schemas.microsoft.com/office/drawing/2014/main" id="{BA8D2E14-7616-4A27-8EF4-049D69493936}"/>
+                <a16:creationId xmlns:a16="http://schemas.microsoft.com/office/drawing/2014/main" xmlns="" id="{BA8D2E14-7616-4A27-8EF4-049D69493936}"/>
               </a:ext>
             </a:extLst>
           </p:cNvPr>
@@ -4390,7 +4390,7 @@
           <p:cNvPr id="28" name="Elipse 27">
             <a:extLst>
               <a:ext uri="{FF2B5EF4-FFF2-40B4-BE49-F238E27FC236}">
-                <a16:creationId xmlns:a16="http://schemas.microsoft.com/office/drawing/2014/main" id="{8D7634C4-6B52-4729-964F-6938FFCD8DB5}"/>
+                <a16:creationId xmlns:a16="http://schemas.microsoft.com/office/drawing/2014/main" xmlns="" id="{8D7634C4-6B52-4729-964F-6938FFCD8DB5}"/>
               </a:ext>
             </a:extLst>
           </p:cNvPr>
@@ -4442,7 +4442,7 @@
           <p:cNvPr id="29" name="Elipse 28">
             <a:extLst>
               <a:ext uri="{FF2B5EF4-FFF2-40B4-BE49-F238E27FC236}">
-                <a16:creationId xmlns:a16="http://schemas.microsoft.com/office/drawing/2014/main" id="{743D010C-5F6D-4DC1-890A-E9695FA4A132}"/>
+                <a16:creationId xmlns:a16="http://schemas.microsoft.com/office/drawing/2014/main" xmlns="" id="{743D010C-5F6D-4DC1-890A-E9695FA4A132}"/>
               </a:ext>
             </a:extLst>
           </p:cNvPr>
@@ -4494,7 +4494,7 @@
           <p:cNvPr id="33" name="CaixaDeTexto 32">
             <a:extLst>
               <a:ext uri="{FF2B5EF4-FFF2-40B4-BE49-F238E27FC236}">
-                <a16:creationId xmlns:a16="http://schemas.microsoft.com/office/drawing/2014/main" id="{C16E10F4-1F46-4E5E-97B4-68C22B3B074A}"/>
+                <a16:creationId xmlns:a16="http://schemas.microsoft.com/office/drawing/2014/main" xmlns="" id="{C16E10F4-1F46-4E5E-97B4-68C22B3B074A}"/>
               </a:ext>
             </a:extLst>
           </p:cNvPr>
@@ -4537,7 +4537,7 @@
           <p:cNvPr id="50" name="Conector: Angulado 49">
             <a:extLst>
               <a:ext uri="{FF2B5EF4-FFF2-40B4-BE49-F238E27FC236}">
-                <a16:creationId xmlns:a16="http://schemas.microsoft.com/office/drawing/2014/main" id="{7BA99CC8-4A36-4F90-9666-0E2D9CDC06EC}"/>
+                <a16:creationId xmlns:a16="http://schemas.microsoft.com/office/drawing/2014/main" xmlns="" id="{7BA99CC8-4A36-4F90-9666-0E2D9CDC06EC}"/>
               </a:ext>
             </a:extLst>
           </p:cNvPr>
@@ -4581,7 +4581,7 @@
           <p:cNvPr id="53" name="Conector de Seta Reta 52">
             <a:extLst>
               <a:ext uri="{FF2B5EF4-FFF2-40B4-BE49-F238E27FC236}">
-                <a16:creationId xmlns:a16="http://schemas.microsoft.com/office/drawing/2014/main" id="{0D32E73A-7A15-4671-8D42-E923FDD97C95}"/>
+                <a16:creationId xmlns:a16="http://schemas.microsoft.com/office/drawing/2014/main" xmlns="" id="{0D32E73A-7A15-4671-8D42-E923FDD97C95}"/>
               </a:ext>
             </a:extLst>
           </p:cNvPr>
@@ -4624,7 +4624,7 @@
           <p:cNvPr id="55" name="Conector de Seta Reta 54">
             <a:extLst>
               <a:ext uri="{FF2B5EF4-FFF2-40B4-BE49-F238E27FC236}">
-                <a16:creationId xmlns:a16="http://schemas.microsoft.com/office/drawing/2014/main" id="{C4680F0C-A325-4A5A-A710-746FFBD7B7D0}"/>
+                <a16:creationId xmlns:a16="http://schemas.microsoft.com/office/drawing/2014/main" xmlns="" id="{C4680F0C-A325-4A5A-A710-746FFBD7B7D0}"/>
               </a:ext>
             </a:extLst>
           </p:cNvPr>
@@ -4667,7 +4667,7 @@
           <p:cNvPr id="57" name="Elipse 56">
             <a:extLst>
               <a:ext uri="{FF2B5EF4-FFF2-40B4-BE49-F238E27FC236}">
-                <a16:creationId xmlns:a16="http://schemas.microsoft.com/office/drawing/2014/main" id="{1B90BB71-7219-41F8-9A0C-7694C8774DB6}"/>
+                <a16:creationId xmlns:a16="http://schemas.microsoft.com/office/drawing/2014/main" xmlns="" id="{1B90BB71-7219-41F8-9A0C-7694C8774DB6}"/>
               </a:ext>
             </a:extLst>
           </p:cNvPr>
@@ -4719,7 +4719,7 @@
           <p:cNvPr id="60" name="Conector de Seta Reta 59">
             <a:extLst>
               <a:ext uri="{FF2B5EF4-FFF2-40B4-BE49-F238E27FC236}">
-                <a16:creationId xmlns:a16="http://schemas.microsoft.com/office/drawing/2014/main" id="{E33716DC-FE8F-4AFE-B34A-52F497A8272A}"/>
+                <a16:creationId xmlns:a16="http://schemas.microsoft.com/office/drawing/2014/main" xmlns="" id="{E33716DC-FE8F-4AFE-B34A-52F497A8272A}"/>
               </a:ext>
             </a:extLst>
           </p:cNvPr>
@@ -4762,7 +4762,7 @@
           <p:cNvPr id="63" name="Conector: Angulado 62">
             <a:extLst>
               <a:ext uri="{FF2B5EF4-FFF2-40B4-BE49-F238E27FC236}">
-                <a16:creationId xmlns:a16="http://schemas.microsoft.com/office/drawing/2014/main" id="{C652DE59-CA79-4E5A-91BE-13CDB8ADDF12}"/>
+                <a16:creationId xmlns:a16="http://schemas.microsoft.com/office/drawing/2014/main" xmlns="" id="{C652DE59-CA79-4E5A-91BE-13CDB8ADDF12}"/>
               </a:ext>
             </a:extLst>
           </p:cNvPr>
@@ -4805,7 +4805,7 @@
           <p:cNvPr id="65" name="Elipse 64">
             <a:extLst>
               <a:ext uri="{FF2B5EF4-FFF2-40B4-BE49-F238E27FC236}">
-                <a16:creationId xmlns:a16="http://schemas.microsoft.com/office/drawing/2014/main" id="{365AA1B7-656D-4444-81E3-AC6F1EF0FA9B}"/>
+                <a16:creationId xmlns:a16="http://schemas.microsoft.com/office/drawing/2014/main" xmlns="" id="{365AA1B7-656D-4444-81E3-AC6F1EF0FA9B}"/>
               </a:ext>
             </a:extLst>
           </p:cNvPr>
@@ -4857,7 +4857,7 @@
           <p:cNvPr id="66" name="Conector: Angulado 65">
             <a:extLst>
               <a:ext uri="{FF2B5EF4-FFF2-40B4-BE49-F238E27FC236}">
-                <a16:creationId xmlns:a16="http://schemas.microsoft.com/office/drawing/2014/main" id="{79815850-83BB-40B3-AE02-7519F8A84B8E}"/>
+                <a16:creationId xmlns:a16="http://schemas.microsoft.com/office/drawing/2014/main" xmlns="" id="{79815850-83BB-40B3-AE02-7519F8A84B8E}"/>
               </a:ext>
             </a:extLst>
           </p:cNvPr>
@@ -4900,7 +4900,7 @@
           <p:cNvPr id="45" name="Elipse 44">
             <a:extLst>
               <a:ext uri="{FF2B5EF4-FFF2-40B4-BE49-F238E27FC236}">
-                <a16:creationId xmlns:a16="http://schemas.microsoft.com/office/drawing/2014/main" id="{305E31E0-C2D4-41E4-A8A8-BD98577284CF}"/>
+                <a16:creationId xmlns:a16="http://schemas.microsoft.com/office/drawing/2014/main" xmlns="" id="{305E31E0-C2D4-41E4-A8A8-BD98577284CF}"/>
               </a:ext>
             </a:extLst>
           </p:cNvPr>
@@ -4952,7 +4952,7 @@
           <p:cNvPr id="24" name="Conector de Seta Reta 23">
             <a:extLst>
               <a:ext uri="{FF2B5EF4-FFF2-40B4-BE49-F238E27FC236}">
-                <a16:creationId xmlns:a16="http://schemas.microsoft.com/office/drawing/2014/main" id="{E09AE68E-8930-43E0-8C9E-02109A2D5419}"/>
+                <a16:creationId xmlns:a16="http://schemas.microsoft.com/office/drawing/2014/main" xmlns="" id="{E09AE68E-8930-43E0-8C9E-02109A2D5419}"/>
               </a:ext>
             </a:extLst>
           </p:cNvPr>
@@ -4995,7 +4995,7 @@
           <p:cNvPr id="47" name="Retângulo 46">
             <a:extLst>
               <a:ext uri="{FF2B5EF4-FFF2-40B4-BE49-F238E27FC236}">
-                <a16:creationId xmlns:a16="http://schemas.microsoft.com/office/drawing/2014/main" id="{4C50BC5B-5DEC-4B90-965A-B626311EB319}"/>
+                <a16:creationId xmlns:a16="http://schemas.microsoft.com/office/drawing/2014/main" xmlns="" id="{4C50BC5B-5DEC-4B90-965A-B626311EB319}"/>
               </a:ext>
             </a:extLst>
           </p:cNvPr>
@@ -5047,7 +5047,7 @@
           <p:cNvPr id="48" name="Conector: Angulado 47">
             <a:extLst>
               <a:ext uri="{FF2B5EF4-FFF2-40B4-BE49-F238E27FC236}">
-                <a16:creationId xmlns:a16="http://schemas.microsoft.com/office/drawing/2014/main" id="{ABD772D5-1DF0-4E50-9ACD-B4C5E8B2B0F6}"/>
+                <a16:creationId xmlns:a16="http://schemas.microsoft.com/office/drawing/2014/main" xmlns="" id="{ABD772D5-1DF0-4E50-9ACD-B4C5E8B2B0F6}"/>
               </a:ext>
             </a:extLst>
           </p:cNvPr>
@@ -5929,7 +5929,7 @@
           <p:cNvPr id="2" name="Elipse 1">
             <a:extLst>
               <a:ext uri="{FF2B5EF4-FFF2-40B4-BE49-F238E27FC236}">
-                <a16:creationId xmlns:a16="http://schemas.microsoft.com/office/drawing/2014/main" id="{71B6F9EF-9A70-41A5-83B7-D18BC1AE6D06}"/>
+                <a16:creationId xmlns:a16="http://schemas.microsoft.com/office/drawing/2014/main" xmlns="" id="{71B6F9EF-9A70-41A5-83B7-D18BC1AE6D06}"/>
               </a:ext>
             </a:extLst>
           </p:cNvPr>
@@ -5981,7 +5981,7 @@
           <p:cNvPr id="27" name="Elipse 26">
             <a:extLst>
               <a:ext uri="{FF2B5EF4-FFF2-40B4-BE49-F238E27FC236}">
-                <a16:creationId xmlns:a16="http://schemas.microsoft.com/office/drawing/2014/main" id="{BA8D2E14-7616-4A27-8EF4-049D69493936}"/>
+                <a16:creationId xmlns:a16="http://schemas.microsoft.com/office/drawing/2014/main" xmlns="" id="{BA8D2E14-7616-4A27-8EF4-049D69493936}"/>
               </a:ext>
             </a:extLst>
           </p:cNvPr>
@@ -6033,7 +6033,7 @@
           <p:cNvPr id="28" name="Elipse 27">
             <a:extLst>
               <a:ext uri="{FF2B5EF4-FFF2-40B4-BE49-F238E27FC236}">
-                <a16:creationId xmlns:a16="http://schemas.microsoft.com/office/drawing/2014/main" id="{8D7634C4-6B52-4729-964F-6938FFCD8DB5}"/>
+                <a16:creationId xmlns:a16="http://schemas.microsoft.com/office/drawing/2014/main" xmlns="" id="{8D7634C4-6B52-4729-964F-6938FFCD8DB5}"/>
               </a:ext>
             </a:extLst>
           </p:cNvPr>
@@ -6085,7 +6085,7 @@
           <p:cNvPr id="29" name="Elipse 28">
             <a:extLst>
               <a:ext uri="{FF2B5EF4-FFF2-40B4-BE49-F238E27FC236}">
-                <a16:creationId xmlns:a16="http://schemas.microsoft.com/office/drawing/2014/main" id="{743D010C-5F6D-4DC1-890A-E9695FA4A132}"/>
+                <a16:creationId xmlns:a16="http://schemas.microsoft.com/office/drawing/2014/main" xmlns="" id="{743D010C-5F6D-4DC1-890A-E9695FA4A132}"/>
               </a:ext>
             </a:extLst>
           </p:cNvPr>
@@ -6137,7 +6137,7 @@
           <p:cNvPr id="33" name="CaixaDeTexto 32">
             <a:extLst>
               <a:ext uri="{FF2B5EF4-FFF2-40B4-BE49-F238E27FC236}">
-                <a16:creationId xmlns:a16="http://schemas.microsoft.com/office/drawing/2014/main" id="{C16E10F4-1F46-4E5E-97B4-68C22B3B074A}"/>
+                <a16:creationId xmlns:a16="http://schemas.microsoft.com/office/drawing/2014/main" xmlns="" id="{C16E10F4-1F46-4E5E-97B4-68C22B3B074A}"/>
               </a:ext>
             </a:extLst>
           </p:cNvPr>
@@ -6173,7 +6173,7 @@
           <p:cNvPr id="50" name="Conector: Angulado 49">
             <a:extLst>
               <a:ext uri="{FF2B5EF4-FFF2-40B4-BE49-F238E27FC236}">
-                <a16:creationId xmlns:a16="http://schemas.microsoft.com/office/drawing/2014/main" id="{7BA99CC8-4A36-4F90-9666-0E2D9CDC06EC}"/>
+                <a16:creationId xmlns:a16="http://schemas.microsoft.com/office/drawing/2014/main" xmlns="" id="{7BA99CC8-4A36-4F90-9666-0E2D9CDC06EC}"/>
               </a:ext>
             </a:extLst>
           </p:cNvPr>
@@ -6217,7 +6217,7 @@
           <p:cNvPr id="53" name="Conector de Seta Reta 52">
             <a:extLst>
               <a:ext uri="{FF2B5EF4-FFF2-40B4-BE49-F238E27FC236}">
-                <a16:creationId xmlns:a16="http://schemas.microsoft.com/office/drawing/2014/main" id="{0D32E73A-7A15-4671-8D42-E923FDD97C95}"/>
+                <a16:creationId xmlns:a16="http://schemas.microsoft.com/office/drawing/2014/main" xmlns="" id="{0D32E73A-7A15-4671-8D42-E923FDD97C95}"/>
               </a:ext>
             </a:extLst>
           </p:cNvPr>
@@ -6260,7 +6260,7 @@
           <p:cNvPr id="55" name="Conector de Seta Reta 54">
             <a:extLst>
               <a:ext uri="{FF2B5EF4-FFF2-40B4-BE49-F238E27FC236}">
-                <a16:creationId xmlns:a16="http://schemas.microsoft.com/office/drawing/2014/main" id="{C4680F0C-A325-4A5A-A710-746FFBD7B7D0}"/>
+                <a16:creationId xmlns:a16="http://schemas.microsoft.com/office/drawing/2014/main" xmlns="" id="{C4680F0C-A325-4A5A-A710-746FFBD7B7D0}"/>
               </a:ext>
             </a:extLst>
           </p:cNvPr>
@@ -6303,7 +6303,7 @@
           <p:cNvPr id="57" name="Elipse 56">
             <a:extLst>
               <a:ext uri="{FF2B5EF4-FFF2-40B4-BE49-F238E27FC236}">
-                <a16:creationId xmlns:a16="http://schemas.microsoft.com/office/drawing/2014/main" id="{1B90BB71-7219-41F8-9A0C-7694C8774DB6}"/>
+                <a16:creationId xmlns:a16="http://schemas.microsoft.com/office/drawing/2014/main" xmlns="" id="{1B90BB71-7219-41F8-9A0C-7694C8774DB6}"/>
               </a:ext>
             </a:extLst>
           </p:cNvPr>
@@ -6355,7 +6355,7 @@
           <p:cNvPr id="60" name="Conector de Seta Reta 59">
             <a:extLst>
               <a:ext uri="{FF2B5EF4-FFF2-40B4-BE49-F238E27FC236}">
-                <a16:creationId xmlns:a16="http://schemas.microsoft.com/office/drawing/2014/main" id="{E33716DC-FE8F-4AFE-B34A-52F497A8272A}"/>
+                <a16:creationId xmlns:a16="http://schemas.microsoft.com/office/drawing/2014/main" xmlns="" id="{E33716DC-FE8F-4AFE-B34A-52F497A8272A}"/>
               </a:ext>
             </a:extLst>
           </p:cNvPr>
@@ -6398,7 +6398,7 @@
           <p:cNvPr id="63" name="Conector: Angulado 62">
             <a:extLst>
               <a:ext uri="{FF2B5EF4-FFF2-40B4-BE49-F238E27FC236}">
-                <a16:creationId xmlns:a16="http://schemas.microsoft.com/office/drawing/2014/main" id="{C652DE59-CA79-4E5A-91BE-13CDB8ADDF12}"/>
+                <a16:creationId xmlns:a16="http://schemas.microsoft.com/office/drawing/2014/main" xmlns="" id="{C652DE59-CA79-4E5A-91BE-13CDB8ADDF12}"/>
               </a:ext>
             </a:extLst>
           </p:cNvPr>
@@ -6441,7 +6441,7 @@
           <p:cNvPr id="65" name="Elipse 64">
             <a:extLst>
               <a:ext uri="{FF2B5EF4-FFF2-40B4-BE49-F238E27FC236}">
-                <a16:creationId xmlns:a16="http://schemas.microsoft.com/office/drawing/2014/main" id="{365AA1B7-656D-4444-81E3-AC6F1EF0FA9B}"/>
+                <a16:creationId xmlns:a16="http://schemas.microsoft.com/office/drawing/2014/main" xmlns="" id="{365AA1B7-656D-4444-81E3-AC6F1EF0FA9B}"/>
               </a:ext>
             </a:extLst>
           </p:cNvPr>
@@ -6500,7 +6500,7 @@
           <p:cNvPr id="66" name="Conector: Angulado 65">
             <a:extLst>
               <a:ext uri="{FF2B5EF4-FFF2-40B4-BE49-F238E27FC236}">
-                <a16:creationId xmlns:a16="http://schemas.microsoft.com/office/drawing/2014/main" id="{79815850-83BB-40B3-AE02-7519F8A84B8E}"/>
+                <a16:creationId xmlns:a16="http://schemas.microsoft.com/office/drawing/2014/main" xmlns="" id="{79815850-83BB-40B3-AE02-7519F8A84B8E}"/>
               </a:ext>
             </a:extLst>
           </p:cNvPr>
@@ -6543,7 +6543,7 @@
           <p:cNvPr id="45" name="Elipse 44">
             <a:extLst>
               <a:ext uri="{FF2B5EF4-FFF2-40B4-BE49-F238E27FC236}">
-                <a16:creationId xmlns:a16="http://schemas.microsoft.com/office/drawing/2014/main" id="{305E31E0-C2D4-41E4-A8A8-BD98577284CF}"/>
+                <a16:creationId xmlns:a16="http://schemas.microsoft.com/office/drawing/2014/main" xmlns="" id="{305E31E0-C2D4-41E4-A8A8-BD98577284CF}"/>
               </a:ext>
             </a:extLst>
           </p:cNvPr>
@@ -6595,7 +6595,7 @@
           <p:cNvPr id="24" name="Conector de Seta Reta 23">
             <a:extLst>
               <a:ext uri="{FF2B5EF4-FFF2-40B4-BE49-F238E27FC236}">
-                <a16:creationId xmlns:a16="http://schemas.microsoft.com/office/drawing/2014/main" id="{E09AE68E-8930-43E0-8C9E-02109A2D5419}"/>
+                <a16:creationId xmlns:a16="http://schemas.microsoft.com/office/drawing/2014/main" xmlns="" id="{E09AE68E-8930-43E0-8C9E-02109A2D5419}"/>
               </a:ext>
             </a:extLst>
           </p:cNvPr>
@@ -6638,7 +6638,7 @@
           <p:cNvPr id="46" name="Retângulo 45">
             <a:extLst>
               <a:ext uri="{FF2B5EF4-FFF2-40B4-BE49-F238E27FC236}">
-                <a16:creationId xmlns:a16="http://schemas.microsoft.com/office/drawing/2014/main" id="{CD06D3B3-600F-46B5-B003-ED2A1059BFAB}"/>
+                <a16:creationId xmlns:a16="http://schemas.microsoft.com/office/drawing/2014/main" xmlns="" id="{CD06D3B3-600F-46B5-B003-ED2A1059BFAB}"/>
               </a:ext>
             </a:extLst>
           </p:cNvPr>
@@ -6690,7 +6690,7 @@
           <p:cNvPr id="35" name="Conector de Seta Reta 34">
             <a:extLst>
               <a:ext uri="{FF2B5EF4-FFF2-40B4-BE49-F238E27FC236}">
-                <a16:creationId xmlns:a16="http://schemas.microsoft.com/office/drawing/2014/main" id="{51E79D0C-214C-4553-A449-FBB9E2C28317}"/>
+                <a16:creationId xmlns:a16="http://schemas.microsoft.com/office/drawing/2014/main" xmlns="" id="{51E79D0C-214C-4553-A449-FBB9E2C28317}"/>
               </a:ext>
             </a:extLst>
           </p:cNvPr>
@@ -6733,7 +6733,7 @@
           <p:cNvPr id="40" name="Conector: Angulado 39">
             <a:extLst>
               <a:ext uri="{FF2B5EF4-FFF2-40B4-BE49-F238E27FC236}">
-                <a16:creationId xmlns:a16="http://schemas.microsoft.com/office/drawing/2014/main" id="{4AD69AB7-DE0B-4011-8039-E19E10CF715D}"/>
+                <a16:creationId xmlns:a16="http://schemas.microsoft.com/office/drawing/2014/main" xmlns="" id="{4AD69AB7-DE0B-4011-8039-E19E10CF715D}"/>
               </a:ext>
             </a:extLst>
           </p:cNvPr>
@@ -6776,7 +6776,7 @@
           <p:cNvPr id="56" name="CaixaDeTexto 55">
             <a:extLst>
               <a:ext uri="{FF2B5EF4-FFF2-40B4-BE49-F238E27FC236}">
-                <a16:creationId xmlns:a16="http://schemas.microsoft.com/office/drawing/2014/main" id="{29B5574B-E766-4938-9931-D49975E36BA0}"/>
+                <a16:creationId xmlns:a16="http://schemas.microsoft.com/office/drawing/2014/main" xmlns="" id="{29B5574B-E766-4938-9931-D49975E36BA0}"/>
               </a:ext>
             </a:extLst>
           </p:cNvPr>
@@ -6811,7 +6811,7 @@
           <p:cNvPr id="52" name="Conector de Seta Reta 51">
             <a:extLst>
               <a:ext uri="{FF2B5EF4-FFF2-40B4-BE49-F238E27FC236}">
-                <a16:creationId xmlns:a16="http://schemas.microsoft.com/office/drawing/2014/main" id="{639CFD7C-65F9-43B0-813C-92CBFE11C270}"/>
+                <a16:creationId xmlns:a16="http://schemas.microsoft.com/office/drawing/2014/main" xmlns="" id="{639CFD7C-65F9-43B0-813C-92CBFE11C270}"/>
               </a:ext>
             </a:extLst>
           </p:cNvPr>
@@ -6855,7 +6855,7 @@
           <p:cNvPr id="64" name="Retângulo 63">
             <a:extLst>
               <a:ext uri="{FF2B5EF4-FFF2-40B4-BE49-F238E27FC236}">
-                <a16:creationId xmlns:a16="http://schemas.microsoft.com/office/drawing/2014/main" id="{42F8BBA1-1A92-451C-8BE4-2FE5EE3D7CB0}"/>
+                <a16:creationId xmlns:a16="http://schemas.microsoft.com/office/drawing/2014/main" xmlns="" id="{42F8BBA1-1A92-451C-8BE4-2FE5EE3D7CB0}"/>
               </a:ext>
             </a:extLst>
           </p:cNvPr>
@@ -6907,7 +6907,7 @@
           <p:cNvPr id="59" name="Conector: Angulado 58">
             <a:extLst>
               <a:ext uri="{FF2B5EF4-FFF2-40B4-BE49-F238E27FC236}">
-                <a16:creationId xmlns:a16="http://schemas.microsoft.com/office/drawing/2014/main" id="{37DB8425-D0EA-419F-8310-C1DDCDE7D4BB}"/>
+                <a16:creationId xmlns:a16="http://schemas.microsoft.com/office/drawing/2014/main" xmlns="" id="{37DB8425-D0EA-419F-8310-C1DDCDE7D4BB}"/>
               </a:ext>
             </a:extLst>
           </p:cNvPr>
@@ -6983,7 +6983,7 @@
           <p:cNvPr id="4" name="Retângulo 3">
             <a:extLst>
               <a:ext uri="{FF2B5EF4-FFF2-40B4-BE49-F238E27FC236}">
-                <a16:creationId xmlns:a16="http://schemas.microsoft.com/office/drawing/2014/main" id="{D5842690-60E9-48ED-8F2D-BFAD47CB6A7B}"/>
+                <a16:creationId xmlns:a16="http://schemas.microsoft.com/office/drawing/2014/main" xmlns="" id="{D5842690-60E9-48ED-8F2D-BFAD47CB6A7B}"/>
               </a:ext>
             </a:extLst>
           </p:cNvPr>
@@ -7037,7 +7037,7 @@
           <p:cNvPr id="5" name="Retângulo 4">
             <a:extLst>
               <a:ext uri="{FF2B5EF4-FFF2-40B4-BE49-F238E27FC236}">
-                <a16:creationId xmlns:a16="http://schemas.microsoft.com/office/drawing/2014/main" id="{26071264-175D-4C06-B256-C7CC16A780F8}"/>
+                <a16:creationId xmlns:a16="http://schemas.microsoft.com/office/drawing/2014/main" xmlns="" id="{26071264-175D-4C06-B256-C7CC16A780F8}"/>
               </a:ext>
             </a:extLst>
           </p:cNvPr>
@@ -7089,7 +7089,7 @@
           <p:cNvPr id="6" name="Retângulo 5">
             <a:extLst>
               <a:ext uri="{FF2B5EF4-FFF2-40B4-BE49-F238E27FC236}">
-                <a16:creationId xmlns:a16="http://schemas.microsoft.com/office/drawing/2014/main" id="{2BD0C31B-C188-4F12-B6C1-2697E7A915E6}"/>
+                <a16:creationId xmlns:a16="http://schemas.microsoft.com/office/drawing/2014/main" xmlns="" id="{2BD0C31B-C188-4F12-B6C1-2697E7A915E6}"/>
               </a:ext>
             </a:extLst>
           </p:cNvPr>
@@ -7141,7 +7141,7 @@
           <p:cNvPr id="7" name="Retângulo 6">
             <a:extLst>
               <a:ext uri="{FF2B5EF4-FFF2-40B4-BE49-F238E27FC236}">
-                <a16:creationId xmlns:a16="http://schemas.microsoft.com/office/drawing/2014/main" id="{70A52BC8-A6D2-472B-BA9B-C130D1ECF160}"/>
+                <a16:creationId xmlns:a16="http://schemas.microsoft.com/office/drawing/2014/main" xmlns="" id="{70A52BC8-A6D2-472B-BA9B-C130D1ECF160}"/>
               </a:ext>
             </a:extLst>
           </p:cNvPr>
@@ -7193,7 +7193,7 @@
           <p:cNvPr id="8" name="Retângulo 7">
             <a:extLst>
               <a:ext uri="{FF2B5EF4-FFF2-40B4-BE49-F238E27FC236}">
-                <a16:creationId xmlns:a16="http://schemas.microsoft.com/office/drawing/2014/main" id="{763D329B-ACFE-4654-A49E-32875DCC9521}"/>
+                <a16:creationId xmlns:a16="http://schemas.microsoft.com/office/drawing/2014/main" xmlns="" id="{763D329B-ACFE-4654-A49E-32875DCC9521}"/>
               </a:ext>
             </a:extLst>
           </p:cNvPr>
@@ -7245,7 +7245,7 @@
           <p:cNvPr id="9" name="Retângulo 8">
             <a:extLst>
               <a:ext uri="{FF2B5EF4-FFF2-40B4-BE49-F238E27FC236}">
-                <a16:creationId xmlns:a16="http://schemas.microsoft.com/office/drawing/2014/main" id="{1943F22D-EAC6-42CB-84BB-8895EAA8536F}"/>
+                <a16:creationId xmlns:a16="http://schemas.microsoft.com/office/drawing/2014/main" xmlns="" id="{1943F22D-EAC6-42CB-84BB-8895EAA8536F}"/>
               </a:ext>
             </a:extLst>
           </p:cNvPr>
@@ -7297,7 +7297,7 @@
           <p:cNvPr id="11" name="Retângulo 10">
             <a:extLst>
               <a:ext uri="{FF2B5EF4-FFF2-40B4-BE49-F238E27FC236}">
-                <a16:creationId xmlns:a16="http://schemas.microsoft.com/office/drawing/2014/main" id="{C295414E-0B35-4055-828A-BA9995173F2D}"/>
+                <a16:creationId xmlns:a16="http://schemas.microsoft.com/office/drawing/2014/main" xmlns="" id="{C295414E-0B35-4055-828A-BA9995173F2D}"/>
               </a:ext>
             </a:extLst>
           </p:cNvPr>
@@ -7349,7 +7349,7 @@
           <p:cNvPr id="12" name="Retângulo 11">
             <a:extLst>
               <a:ext uri="{FF2B5EF4-FFF2-40B4-BE49-F238E27FC236}">
-                <a16:creationId xmlns:a16="http://schemas.microsoft.com/office/drawing/2014/main" id="{1AC3AB78-3DFC-4CD7-8DF8-CCDAFA255C92}"/>
+                <a16:creationId xmlns:a16="http://schemas.microsoft.com/office/drawing/2014/main" xmlns="" id="{1AC3AB78-3DFC-4CD7-8DF8-CCDAFA255C92}"/>
               </a:ext>
             </a:extLst>
           </p:cNvPr>
@@ -7391,13 +7391,8 @@
             <a:pPr algn="ctr"/>
             <a:r>
               <a:rPr lang="pt-BR" sz="2000" dirty="0"/>
-              <a:t>Visualizador </a:t>
-            </a:r>
-            <a:r>
-              <a:rPr lang="pt-BR" sz="2000" dirty="0" err="1"/>
-              <a:t>RViz</a:t>
-            </a:r>
-            <a:endParaRPr lang="pt-BR" sz="2000" dirty="0"/>
+              <a:t>Visualizador RViz</a:t>
+            </a:r>
           </a:p>
         </p:txBody>
       </p:sp>
@@ -7406,7 +7401,7 @@
           <p:cNvPr id="13" name="Retângulo 12">
             <a:extLst>
               <a:ext uri="{FF2B5EF4-FFF2-40B4-BE49-F238E27FC236}">
-                <a16:creationId xmlns:a16="http://schemas.microsoft.com/office/drawing/2014/main" id="{367B15F2-BDA8-4A99-BEA5-EEC0D3630969}"/>
+                <a16:creationId xmlns:a16="http://schemas.microsoft.com/office/drawing/2014/main" xmlns="" id="{367B15F2-BDA8-4A99-BEA5-EEC0D3630969}"/>
               </a:ext>
             </a:extLst>
           </p:cNvPr>
@@ -7460,7 +7455,7 @@
           <p:cNvPr id="14" name="Retângulo 13">
             <a:extLst>
               <a:ext uri="{FF2B5EF4-FFF2-40B4-BE49-F238E27FC236}">
-                <a16:creationId xmlns:a16="http://schemas.microsoft.com/office/drawing/2014/main" id="{18CA4149-BC5C-4D85-AC6B-EE28AE290379}"/>
+                <a16:creationId xmlns:a16="http://schemas.microsoft.com/office/drawing/2014/main" xmlns="" id="{18CA4149-BC5C-4D85-AC6B-EE28AE290379}"/>
               </a:ext>
             </a:extLst>
           </p:cNvPr>
@@ -7514,7 +7509,7 @@
           <p:cNvPr id="15" name="Retângulo 14">
             <a:extLst>
               <a:ext uri="{FF2B5EF4-FFF2-40B4-BE49-F238E27FC236}">
-                <a16:creationId xmlns:a16="http://schemas.microsoft.com/office/drawing/2014/main" id="{CC4BE7C0-3171-48CF-A21B-F6A2C13FD71E}"/>
+                <a16:creationId xmlns:a16="http://schemas.microsoft.com/office/drawing/2014/main" xmlns="" id="{CC4BE7C0-3171-48CF-A21B-F6A2C13FD71E}"/>
               </a:ext>
             </a:extLst>
           </p:cNvPr>
@@ -7568,7 +7563,7 @@
           <p:cNvPr id="16" name="Retângulo 15">
             <a:extLst>
               <a:ext uri="{FF2B5EF4-FFF2-40B4-BE49-F238E27FC236}">
-                <a16:creationId xmlns:a16="http://schemas.microsoft.com/office/drawing/2014/main" id="{D81182C8-1D0F-4C02-A535-1240088FE2AB}"/>
+                <a16:creationId xmlns:a16="http://schemas.microsoft.com/office/drawing/2014/main" xmlns="" id="{D81182C8-1D0F-4C02-A535-1240088FE2AB}"/>
               </a:ext>
             </a:extLst>
           </p:cNvPr>
@@ -7622,7 +7617,7 @@
           <p:cNvPr id="17" name="Retângulo 16">
             <a:extLst>
               <a:ext uri="{FF2B5EF4-FFF2-40B4-BE49-F238E27FC236}">
-                <a16:creationId xmlns:a16="http://schemas.microsoft.com/office/drawing/2014/main" id="{35E0124D-B2FB-48EC-9486-026749EAA669}"/>
+                <a16:creationId xmlns:a16="http://schemas.microsoft.com/office/drawing/2014/main" xmlns="" id="{35E0124D-B2FB-48EC-9486-026749EAA669}"/>
               </a:ext>
             </a:extLst>
           </p:cNvPr>

</xml_diff>

<commit_message>
adicionado nova versão dos slides
</commit_message>
<xml_diff>
--- a/doc/diagramas/conceitual/Conceitual.pptx
+++ b/doc/diagramas/conceitual/Conceitual.pptx
@@ -4372,7 +4372,7 @@
           <p:cNvPr id="2" name="Elipse 1">
             <a:extLst>
               <a:ext uri="{FF2B5EF4-FFF2-40B4-BE49-F238E27FC236}">
-                <a16:creationId xmlns="" xmlns:a16="http://schemas.microsoft.com/office/drawing/2014/main" id="{71B6F9EF-9A70-41A5-83B7-D18BC1AE6D06}"/>
+                <a16:creationId xmlns:a16="http://schemas.microsoft.com/office/drawing/2014/main" xmlns="" id="{71B6F9EF-9A70-41A5-83B7-D18BC1AE6D06}"/>
               </a:ext>
             </a:extLst>
           </p:cNvPr>
@@ -4424,7 +4424,7 @@
           <p:cNvPr id="27" name="Elipse 26">
             <a:extLst>
               <a:ext uri="{FF2B5EF4-FFF2-40B4-BE49-F238E27FC236}">
-                <a16:creationId xmlns="" xmlns:a16="http://schemas.microsoft.com/office/drawing/2014/main" id="{BA8D2E14-7616-4A27-8EF4-049D69493936}"/>
+                <a16:creationId xmlns:a16="http://schemas.microsoft.com/office/drawing/2014/main" xmlns="" id="{BA8D2E14-7616-4A27-8EF4-049D69493936}"/>
               </a:ext>
             </a:extLst>
           </p:cNvPr>
@@ -4476,7 +4476,7 @@
           <p:cNvPr id="28" name="Elipse 27">
             <a:extLst>
               <a:ext uri="{FF2B5EF4-FFF2-40B4-BE49-F238E27FC236}">
-                <a16:creationId xmlns="" xmlns:a16="http://schemas.microsoft.com/office/drawing/2014/main" id="{8D7634C4-6B52-4729-964F-6938FFCD8DB5}"/>
+                <a16:creationId xmlns:a16="http://schemas.microsoft.com/office/drawing/2014/main" xmlns="" id="{8D7634C4-6B52-4729-964F-6938FFCD8DB5}"/>
               </a:ext>
             </a:extLst>
           </p:cNvPr>
@@ -4528,7 +4528,7 @@
           <p:cNvPr id="29" name="Elipse 28">
             <a:extLst>
               <a:ext uri="{FF2B5EF4-FFF2-40B4-BE49-F238E27FC236}">
-                <a16:creationId xmlns="" xmlns:a16="http://schemas.microsoft.com/office/drawing/2014/main" id="{743D010C-5F6D-4DC1-890A-E9695FA4A132}"/>
+                <a16:creationId xmlns:a16="http://schemas.microsoft.com/office/drawing/2014/main" xmlns="" id="{743D010C-5F6D-4DC1-890A-E9695FA4A132}"/>
               </a:ext>
             </a:extLst>
           </p:cNvPr>
@@ -4580,7 +4580,7 @@
           <p:cNvPr id="33" name="CaixaDeTexto 32">
             <a:extLst>
               <a:ext uri="{FF2B5EF4-FFF2-40B4-BE49-F238E27FC236}">
-                <a16:creationId xmlns="" xmlns:a16="http://schemas.microsoft.com/office/drawing/2014/main" id="{C16E10F4-1F46-4E5E-97B4-68C22B3B074A}"/>
+                <a16:creationId xmlns:a16="http://schemas.microsoft.com/office/drawing/2014/main" xmlns="" id="{C16E10F4-1F46-4E5E-97B4-68C22B3B074A}"/>
               </a:ext>
             </a:extLst>
           </p:cNvPr>
@@ -4623,7 +4623,7 @@
           <p:cNvPr id="50" name="Conector: Angulado 49">
             <a:extLst>
               <a:ext uri="{FF2B5EF4-FFF2-40B4-BE49-F238E27FC236}">
-                <a16:creationId xmlns="" xmlns:a16="http://schemas.microsoft.com/office/drawing/2014/main" id="{7BA99CC8-4A36-4F90-9666-0E2D9CDC06EC}"/>
+                <a16:creationId xmlns:a16="http://schemas.microsoft.com/office/drawing/2014/main" xmlns="" id="{7BA99CC8-4A36-4F90-9666-0E2D9CDC06EC}"/>
               </a:ext>
             </a:extLst>
           </p:cNvPr>
@@ -4667,7 +4667,7 @@
           <p:cNvPr id="53" name="Conector de Seta Reta 52">
             <a:extLst>
               <a:ext uri="{FF2B5EF4-FFF2-40B4-BE49-F238E27FC236}">
-                <a16:creationId xmlns="" xmlns:a16="http://schemas.microsoft.com/office/drawing/2014/main" id="{0D32E73A-7A15-4671-8D42-E923FDD97C95}"/>
+                <a16:creationId xmlns:a16="http://schemas.microsoft.com/office/drawing/2014/main" xmlns="" id="{0D32E73A-7A15-4671-8D42-E923FDD97C95}"/>
               </a:ext>
             </a:extLst>
           </p:cNvPr>
@@ -4710,7 +4710,7 @@
           <p:cNvPr id="55" name="Conector de Seta Reta 54">
             <a:extLst>
               <a:ext uri="{FF2B5EF4-FFF2-40B4-BE49-F238E27FC236}">
-                <a16:creationId xmlns="" xmlns:a16="http://schemas.microsoft.com/office/drawing/2014/main" id="{C4680F0C-A325-4A5A-A710-746FFBD7B7D0}"/>
+                <a16:creationId xmlns:a16="http://schemas.microsoft.com/office/drawing/2014/main" xmlns="" id="{C4680F0C-A325-4A5A-A710-746FFBD7B7D0}"/>
               </a:ext>
             </a:extLst>
           </p:cNvPr>
@@ -4753,7 +4753,7 @@
           <p:cNvPr id="57" name="Elipse 56">
             <a:extLst>
               <a:ext uri="{FF2B5EF4-FFF2-40B4-BE49-F238E27FC236}">
-                <a16:creationId xmlns="" xmlns:a16="http://schemas.microsoft.com/office/drawing/2014/main" id="{1B90BB71-7219-41F8-9A0C-7694C8774DB6}"/>
+                <a16:creationId xmlns:a16="http://schemas.microsoft.com/office/drawing/2014/main" xmlns="" id="{1B90BB71-7219-41F8-9A0C-7694C8774DB6}"/>
               </a:ext>
             </a:extLst>
           </p:cNvPr>
@@ -4805,7 +4805,7 @@
           <p:cNvPr id="60" name="Conector de Seta Reta 59">
             <a:extLst>
               <a:ext uri="{FF2B5EF4-FFF2-40B4-BE49-F238E27FC236}">
-                <a16:creationId xmlns="" xmlns:a16="http://schemas.microsoft.com/office/drawing/2014/main" id="{E33716DC-FE8F-4AFE-B34A-52F497A8272A}"/>
+                <a16:creationId xmlns:a16="http://schemas.microsoft.com/office/drawing/2014/main" xmlns="" id="{E33716DC-FE8F-4AFE-B34A-52F497A8272A}"/>
               </a:ext>
             </a:extLst>
           </p:cNvPr>
@@ -4848,7 +4848,7 @@
           <p:cNvPr id="63" name="Conector: Angulado 62">
             <a:extLst>
               <a:ext uri="{FF2B5EF4-FFF2-40B4-BE49-F238E27FC236}">
-                <a16:creationId xmlns="" xmlns:a16="http://schemas.microsoft.com/office/drawing/2014/main" id="{C652DE59-CA79-4E5A-91BE-13CDB8ADDF12}"/>
+                <a16:creationId xmlns:a16="http://schemas.microsoft.com/office/drawing/2014/main" xmlns="" id="{C652DE59-CA79-4E5A-91BE-13CDB8ADDF12}"/>
               </a:ext>
             </a:extLst>
           </p:cNvPr>
@@ -4891,7 +4891,7 @@
           <p:cNvPr id="65" name="Elipse 64">
             <a:extLst>
               <a:ext uri="{FF2B5EF4-FFF2-40B4-BE49-F238E27FC236}">
-                <a16:creationId xmlns="" xmlns:a16="http://schemas.microsoft.com/office/drawing/2014/main" id="{365AA1B7-656D-4444-81E3-AC6F1EF0FA9B}"/>
+                <a16:creationId xmlns:a16="http://schemas.microsoft.com/office/drawing/2014/main" xmlns="" id="{365AA1B7-656D-4444-81E3-AC6F1EF0FA9B}"/>
               </a:ext>
             </a:extLst>
           </p:cNvPr>
@@ -4943,7 +4943,7 @@
           <p:cNvPr id="66" name="Conector: Angulado 65">
             <a:extLst>
               <a:ext uri="{FF2B5EF4-FFF2-40B4-BE49-F238E27FC236}">
-                <a16:creationId xmlns="" xmlns:a16="http://schemas.microsoft.com/office/drawing/2014/main" id="{79815850-83BB-40B3-AE02-7519F8A84B8E}"/>
+                <a16:creationId xmlns:a16="http://schemas.microsoft.com/office/drawing/2014/main" xmlns="" id="{79815850-83BB-40B3-AE02-7519F8A84B8E}"/>
               </a:ext>
             </a:extLst>
           </p:cNvPr>
@@ -4986,7 +4986,7 @@
           <p:cNvPr id="45" name="Elipse 44">
             <a:extLst>
               <a:ext uri="{FF2B5EF4-FFF2-40B4-BE49-F238E27FC236}">
-                <a16:creationId xmlns="" xmlns:a16="http://schemas.microsoft.com/office/drawing/2014/main" id="{305E31E0-C2D4-41E4-A8A8-BD98577284CF}"/>
+                <a16:creationId xmlns:a16="http://schemas.microsoft.com/office/drawing/2014/main" xmlns="" id="{305E31E0-C2D4-41E4-A8A8-BD98577284CF}"/>
               </a:ext>
             </a:extLst>
           </p:cNvPr>
@@ -5038,7 +5038,7 @@
           <p:cNvPr id="24" name="Conector de Seta Reta 23">
             <a:extLst>
               <a:ext uri="{FF2B5EF4-FFF2-40B4-BE49-F238E27FC236}">
-                <a16:creationId xmlns="" xmlns:a16="http://schemas.microsoft.com/office/drawing/2014/main" id="{E09AE68E-8930-43E0-8C9E-02109A2D5419}"/>
+                <a16:creationId xmlns:a16="http://schemas.microsoft.com/office/drawing/2014/main" xmlns="" id="{E09AE68E-8930-43E0-8C9E-02109A2D5419}"/>
               </a:ext>
             </a:extLst>
           </p:cNvPr>
@@ -5081,7 +5081,7 @@
           <p:cNvPr id="47" name="Retângulo 46">
             <a:extLst>
               <a:ext uri="{FF2B5EF4-FFF2-40B4-BE49-F238E27FC236}">
-                <a16:creationId xmlns="" xmlns:a16="http://schemas.microsoft.com/office/drawing/2014/main" id="{4C50BC5B-5DEC-4B90-965A-B626311EB319}"/>
+                <a16:creationId xmlns:a16="http://schemas.microsoft.com/office/drawing/2014/main" xmlns="" id="{4C50BC5B-5DEC-4B90-965A-B626311EB319}"/>
               </a:ext>
             </a:extLst>
           </p:cNvPr>
@@ -5133,7 +5133,7 @@
           <p:cNvPr id="48" name="Conector: Angulado 47">
             <a:extLst>
               <a:ext uri="{FF2B5EF4-FFF2-40B4-BE49-F238E27FC236}">
-                <a16:creationId xmlns="" xmlns:a16="http://schemas.microsoft.com/office/drawing/2014/main" id="{ABD772D5-1DF0-4E50-9ACD-B4C5E8B2B0F6}"/>
+                <a16:creationId xmlns:a16="http://schemas.microsoft.com/office/drawing/2014/main" xmlns="" id="{ABD772D5-1DF0-4E50-9ACD-B4C5E8B2B0F6}"/>
               </a:ext>
             </a:extLst>
           </p:cNvPr>
@@ -6015,7 +6015,7 @@
           <p:cNvPr id="2" name="Elipse 1">
             <a:extLst>
               <a:ext uri="{FF2B5EF4-FFF2-40B4-BE49-F238E27FC236}">
-                <a16:creationId xmlns="" xmlns:a16="http://schemas.microsoft.com/office/drawing/2014/main" id="{71B6F9EF-9A70-41A5-83B7-D18BC1AE6D06}"/>
+                <a16:creationId xmlns:a16="http://schemas.microsoft.com/office/drawing/2014/main" xmlns="" id="{71B6F9EF-9A70-41A5-83B7-D18BC1AE6D06}"/>
               </a:ext>
             </a:extLst>
           </p:cNvPr>
@@ -6067,7 +6067,7 @@
           <p:cNvPr id="27" name="Elipse 26">
             <a:extLst>
               <a:ext uri="{FF2B5EF4-FFF2-40B4-BE49-F238E27FC236}">
-                <a16:creationId xmlns="" xmlns:a16="http://schemas.microsoft.com/office/drawing/2014/main" id="{BA8D2E14-7616-4A27-8EF4-049D69493936}"/>
+                <a16:creationId xmlns:a16="http://schemas.microsoft.com/office/drawing/2014/main" xmlns="" id="{BA8D2E14-7616-4A27-8EF4-049D69493936}"/>
               </a:ext>
             </a:extLst>
           </p:cNvPr>
@@ -6119,7 +6119,7 @@
           <p:cNvPr id="28" name="Elipse 27">
             <a:extLst>
               <a:ext uri="{FF2B5EF4-FFF2-40B4-BE49-F238E27FC236}">
-                <a16:creationId xmlns="" xmlns:a16="http://schemas.microsoft.com/office/drawing/2014/main" id="{8D7634C4-6B52-4729-964F-6938FFCD8DB5}"/>
+                <a16:creationId xmlns:a16="http://schemas.microsoft.com/office/drawing/2014/main" xmlns="" id="{8D7634C4-6B52-4729-964F-6938FFCD8DB5}"/>
               </a:ext>
             </a:extLst>
           </p:cNvPr>
@@ -6171,7 +6171,7 @@
           <p:cNvPr id="29" name="Elipse 28">
             <a:extLst>
               <a:ext uri="{FF2B5EF4-FFF2-40B4-BE49-F238E27FC236}">
-                <a16:creationId xmlns="" xmlns:a16="http://schemas.microsoft.com/office/drawing/2014/main" id="{743D010C-5F6D-4DC1-890A-E9695FA4A132}"/>
+                <a16:creationId xmlns:a16="http://schemas.microsoft.com/office/drawing/2014/main" xmlns="" id="{743D010C-5F6D-4DC1-890A-E9695FA4A132}"/>
               </a:ext>
             </a:extLst>
           </p:cNvPr>
@@ -6223,7 +6223,7 @@
           <p:cNvPr id="33" name="CaixaDeTexto 32">
             <a:extLst>
               <a:ext uri="{FF2B5EF4-FFF2-40B4-BE49-F238E27FC236}">
-                <a16:creationId xmlns="" xmlns:a16="http://schemas.microsoft.com/office/drawing/2014/main" id="{C16E10F4-1F46-4E5E-97B4-68C22B3B074A}"/>
+                <a16:creationId xmlns:a16="http://schemas.microsoft.com/office/drawing/2014/main" xmlns="" id="{C16E10F4-1F46-4E5E-97B4-68C22B3B074A}"/>
               </a:ext>
             </a:extLst>
           </p:cNvPr>
@@ -6259,7 +6259,7 @@
           <p:cNvPr id="50" name="Conector: Angulado 49">
             <a:extLst>
               <a:ext uri="{FF2B5EF4-FFF2-40B4-BE49-F238E27FC236}">
-                <a16:creationId xmlns="" xmlns:a16="http://schemas.microsoft.com/office/drawing/2014/main" id="{7BA99CC8-4A36-4F90-9666-0E2D9CDC06EC}"/>
+                <a16:creationId xmlns:a16="http://schemas.microsoft.com/office/drawing/2014/main" xmlns="" id="{7BA99CC8-4A36-4F90-9666-0E2D9CDC06EC}"/>
               </a:ext>
             </a:extLst>
           </p:cNvPr>
@@ -6303,7 +6303,7 @@
           <p:cNvPr id="53" name="Conector de Seta Reta 52">
             <a:extLst>
               <a:ext uri="{FF2B5EF4-FFF2-40B4-BE49-F238E27FC236}">
-                <a16:creationId xmlns="" xmlns:a16="http://schemas.microsoft.com/office/drawing/2014/main" id="{0D32E73A-7A15-4671-8D42-E923FDD97C95}"/>
+                <a16:creationId xmlns:a16="http://schemas.microsoft.com/office/drawing/2014/main" xmlns="" id="{0D32E73A-7A15-4671-8D42-E923FDD97C95}"/>
               </a:ext>
             </a:extLst>
           </p:cNvPr>
@@ -6346,7 +6346,7 @@
           <p:cNvPr id="55" name="Conector de Seta Reta 54">
             <a:extLst>
               <a:ext uri="{FF2B5EF4-FFF2-40B4-BE49-F238E27FC236}">
-                <a16:creationId xmlns="" xmlns:a16="http://schemas.microsoft.com/office/drawing/2014/main" id="{C4680F0C-A325-4A5A-A710-746FFBD7B7D0}"/>
+                <a16:creationId xmlns:a16="http://schemas.microsoft.com/office/drawing/2014/main" xmlns="" id="{C4680F0C-A325-4A5A-A710-746FFBD7B7D0}"/>
               </a:ext>
             </a:extLst>
           </p:cNvPr>
@@ -6389,7 +6389,7 @@
           <p:cNvPr id="57" name="Elipse 56">
             <a:extLst>
               <a:ext uri="{FF2B5EF4-FFF2-40B4-BE49-F238E27FC236}">
-                <a16:creationId xmlns="" xmlns:a16="http://schemas.microsoft.com/office/drawing/2014/main" id="{1B90BB71-7219-41F8-9A0C-7694C8774DB6}"/>
+                <a16:creationId xmlns:a16="http://schemas.microsoft.com/office/drawing/2014/main" xmlns="" id="{1B90BB71-7219-41F8-9A0C-7694C8774DB6}"/>
               </a:ext>
             </a:extLst>
           </p:cNvPr>
@@ -6441,7 +6441,7 @@
           <p:cNvPr id="60" name="Conector de Seta Reta 59">
             <a:extLst>
               <a:ext uri="{FF2B5EF4-FFF2-40B4-BE49-F238E27FC236}">
-                <a16:creationId xmlns="" xmlns:a16="http://schemas.microsoft.com/office/drawing/2014/main" id="{E33716DC-FE8F-4AFE-B34A-52F497A8272A}"/>
+                <a16:creationId xmlns:a16="http://schemas.microsoft.com/office/drawing/2014/main" xmlns="" id="{E33716DC-FE8F-4AFE-B34A-52F497A8272A}"/>
               </a:ext>
             </a:extLst>
           </p:cNvPr>
@@ -6484,7 +6484,7 @@
           <p:cNvPr id="63" name="Conector: Angulado 62">
             <a:extLst>
               <a:ext uri="{FF2B5EF4-FFF2-40B4-BE49-F238E27FC236}">
-                <a16:creationId xmlns="" xmlns:a16="http://schemas.microsoft.com/office/drawing/2014/main" id="{C652DE59-CA79-4E5A-91BE-13CDB8ADDF12}"/>
+                <a16:creationId xmlns:a16="http://schemas.microsoft.com/office/drawing/2014/main" xmlns="" id="{C652DE59-CA79-4E5A-91BE-13CDB8ADDF12}"/>
               </a:ext>
             </a:extLst>
           </p:cNvPr>
@@ -6527,7 +6527,7 @@
           <p:cNvPr id="65" name="Elipse 64">
             <a:extLst>
               <a:ext uri="{FF2B5EF4-FFF2-40B4-BE49-F238E27FC236}">
-                <a16:creationId xmlns="" xmlns:a16="http://schemas.microsoft.com/office/drawing/2014/main" id="{365AA1B7-656D-4444-81E3-AC6F1EF0FA9B}"/>
+                <a16:creationId xmlns:a16="http://schemas.microsoft.com/office/drawing/2014/main" xmlns="" id="{365AA1B7-656D-4444-81E3-AC6F1EF0FA9B}"/>
               </a:ext>
             </a:extLst>
           </p:cNvPr>
@@ -6586,7 +6586,7 @@
           <p:cNvPr id="66" name="Conector: Angulado 65">
             <a:extLst>
               <a:ext uri="{FF2B5EF4-FFF2-40B4-BE49-F238E27FC236}">
-                <a16:creationId xmlns="" xmlns:a16="http://schemas.microsoft.com/office/drawing/2014/main" id="{79815850-83BB-40B3-AE02-7519F8A84B8E}"/>
+                <a16:creationId xmlns:a16="http://schemas.microsoft.com/office/drawing/2014/main" xmlns="" id="{79815850-83BB-40B3-AE02-7519F8A84B8E}"/>
               </a:ext>
             </a:extLst>
           </p:cNvPr>
@@ -6629,7 +6629,7 @@
           <p:cNvPr id="45" name="Elipse 44">
             <a:extLst>
               <a:ext uri="{FF2B5EF4-FFF2-40B4-BE49-F238E27FC236}">
-                <a16:creationId xmlns="" xmlns:a16="http://schemas.microsoft.com/office/drawing/2014/main" id="{305E31E0-C2D4-41E4-A8A8-BD98577284CF}"/>
+                <a16:creationId xmlns:a16="http://schemas.microsoft.com/office/drawing/2014/main" xmlns="" id="{305E31E0-C2D4-41E4-A8A8-BD98577284CF}"/>
               </a:ext>
             </a:extLst>
           </p:cNvPr>
@@ -6681,7 +6681,7 @@
           <p:cNvPr id="24" name="Conector de Seta Reta 23">
             <a:extLst>
               <a:ext uri="{FF2B5EF4-FFF2-40B4-BE49-F238E27FC236}">
-                <a16:creationId xmlns="" xmlns:a16="http://schemas.microsoft.com/office/drawing/2014/main" id="{E09AE68E-8930-43E0-8C9E-02109A2D5419}"/>
+                <a16:creationId xmlns:a16="http://schemas.microsoft.com/office/drawing/2014/main" xmlns="" id="{E09AE68E-8930-43E0-8C9E-02109A2D5419}"/>
               </a:ext>
             </a:extLst>
           </p:cNvPr>
@@ -6724,7 +6724,7 @@
           <p:cNvPr id="46" name="Retângulo 45">
             <a:extLst>
               <a:ext uri="{FF2B5EF4-FFF2-40B4-BE49-F238E27FC236}">
-                <a16:creationId xmlns="" xmlns:a16="http://schemas.microsoft.com/office/drawing/2014/main" id="{CD06D3B3-600F-46B5-B003-ED2A1059BFAB}"/>
+                <a16:creationId xmlns:a16="http://schemas.microsoft.com/office/drawing/2014/main" xmlns="" id="{CD06D3B3-600F-46B5-B003-ED2A1059BFAB}"/>
               </a:ext>
             </a:extLst>
           </p:cNvPr>
@@ -6776,7 +6776,7 @@
           <p:cNvPr id="35" name="Conector de Seta Reta 34">
             <a:extLst>
               <a:ext uri="{FF2B5EF4-FFF2-40B4-BE49-F238E27FC236}">
-                <a16:creationId xmlns="" xmlns:a16="http://schemas.microsoft.com/office/drawing/2014/main" id="{51E79D0C-214C-4553-A449-FBB9E2C28317}"/>
+                <a16:creationId xmlns:a16="http://schemas.microsoft.com/office/drawing/2014/main" xmlns="" id="{51E79D0C-214C-4553-A449-FBB9E2C28317}"/>
               </a:ext>
             </a:extLst>
           </p:cNvPr>
@@ -6819,7 +6819,7 @@
           <p:cNvPr id="40" name="Conector: Angulado 39">
             <a:extLst>
               <a:ext uri="{FF2B5EF4-FFF2-40B4-BE49-F238E27FC236}">
-                <a16:creationId xmlns="" xmlns:a16="http://schemas.microsoft.com/office/drawing/2014/main" id="{4AD69AB7-DE0B-4011-8039-E19E10CF715D}"/>
+                <a16:creationId xmlns:a16="http://schemas.microsoft.com/office/drawing/2014/main" xmlns="" id="{4AD69AB7-DE0B-4011-8039-E19E10CF715D}"/>
               </a:ext>
             </a:extLst>
           </p:cNvPr>
@@ -6862,7 +6862,7 @@
           <p:cNvPr id="56" name="CaixaDeTexto 55">
             <a:extLst>
               <a:ext uri="{FF2B5EF4-FFF2-40B4-BE49-F238E27FC236}">
-                <a16:creationId xmlns="" xmlns:a16="http://schemas.microsoft.com/office/drawing/2014/main" id="{29B5574B-E766-4938-9931-D49975E36BA0}"/>
+                <a16:creationId xmlns:a16="http://schemas.microsoft.com/office/drawing/2014/main" xmlns="" id="{29B5574B-E766-4938-9931-D49975E36BA0}"/>
               </a:ext>
             </a:extLst>
           </p:cNvPr>
@@ -6897,7 +6897,7 @@
           <p:cNvPr id="52" name="Conector de Seta Reta 51">
             <a:extLst>
               <a:ext uri="{FF2B5EF4-FFF2-40B4-BE49-F238E27FC236}">
-                <a16:creationId xmlns="" xmlns:a16="http://schemas.microsoft.com/office/drawing/2014/main" id="{639CFD7C-65F9-43B0-813C-92CBFE11C270}"/>
+                <a16:creationId xmlns:a16="http://schemas.microsoft.com/office/drawing/2014/main" xmlns="" id="{639CFD7C-65F9-43B0-813C-92CBFE11C270}"/>
               </a:ext>
             </a:extLst>
           </p:cNvPr>
@@ -6941,7 +6941,7 @@
           <p:cNvPr id="64" name="Retângulo 63">
             <a:extLst>
               <a:ext uri="{FF2B5EF4-FFF2-40B4-BE49-F238E27FC236}">
-                <a16:creationId xmlns="" xmlns:a16="http://schemas.microsoft.com/office/drawing/2014/main" id="{42F8BBA1-1A92-451C-8BE4-2FE5EE3D7CB0}"/>
+                <a16:creationId xmlns:a16="http://schemas.microsoft.com/office/drawing/2014/main" xmlns="" id="{42F8BBA1-1A92-451C-8BE4-2FE5EE3D7CB0}"/>
               </a:ext>
             </a:extLst>
           </p:cNvPr>
@@ -6993,7 +6993,7 @@
           <p:cNvPr id="59" name="Conector: Angulado 58">
             <a:extLst>
               <a:ext uri="{FF2B5EF4-FFF2-40B4-BE49-F238E27FC236}">
-                <a16:creationId xmlns="" xmlns:a16="http://schemas.microsoft.com/office/drawing/2014/main" id="{37DB8425-D0EA-419F-8310-C1DDCDE7D4BB}"/>
+                <a16:creationId xmlns:a16="http://schemas.microsoft.com/office/drawing/2014/main" xmlns="" id="{37DB8425-D0EA-419F-8310-C1DDCDE7D4BB}"/>
               </a:ext>
             </a:extLst>
           </p:cNvPr>
@@ -7069,7 +7069,7 @@
           <p:cNvPr id="4" name="Retângulo 3">
             <a:extLst>
               <a:ext uri="{FF2B5EF4-FFF2-40B4-BE49-F238E27FC236}">
-                <a16:creationId xmlns="" xmlns:a16="http://schemas.microsoft.com/office/drawing/2014/main" id="{D5842690-60E9-48ED-8F2D-BFAD47CB6A7B}"/>
+                <a16:creationId xmlns:a16="http://schemas.microsoft.com/office/drawing/2014/main" xmlns="" id="{D5842690-60E9-48ED-8F2D-BFAD47CB6A7B}"/>
               </a:ext>
             </a:extLst>
           </p:cNvPr>
@@ -7123,7 +7123,7 @@
           <p:cNvPr id="5" name="Retângulo 4">
             <a:extLst>
               <a:ext uri="{FF2B5EF4-FFF2-40B4-BE49-F238E27FC236}">
-                <a16:creationId xmlns="" xmlns:a16="http://schemas.microsoft.com/office/drawing/2014/main" id="{26071264-175D-4C06-B256-C7CC16A780F8}"/>
+                <a16:creationId xmlns:a16="http://schemas.microsoft.com/office/drawing/2014/main" xmlns="" id="{26071264-175D-4C06-B256-C7CC16A780F8}"/>
               </a:ext>
             </a:extLst>
           </p:cNvPr>
@@ -7175,7 +7175,7 @@
           <p:cNvPr id="6" name="Retângulo 5">
             <a:extLst>
               <a:ext uri="{FF2B5EF4-FFF2-40B4-BE49-F238E27FC236}">
-                <a16:creationId xmlns="" xmlns:a16="http://schemas.microsoft.com/office/drawing/2014/main" id="{2BD0C31B-C188-4F12-B6C1-2697E7A915E6}"/>
+                <a16:creationId xmlns:a16="http://schemas.microsoft.com/office/drawing/2014/main" xmlns="" id="{2BD0C31B-C188-4F12-B6C1-2697E7A915E6}"/>
               </a:ext>
             </a:extLst>
           </p:cNvPr>
@@ -7227,7 +7227,7 @@
           <p:cNvPr id="7" name="Retângulo 6">
             <a:extLst>
               <a:ext uri="{FF2B5EF4-FFF2-40B4-BE49-F238E27FC236}">
-                <a16:creationId xmlns="" xmlns:a16="http://schemas.microsoft.com/office/drawing/2014/main" id="{70A52BC8-A6D2-472B-BA9B-C130D1ECF160}"/>
+                <a16:creationId xmlns:a16="http://schemas.microsoft.com/office/drawing/2014/main" xmlns="" id="{70A52BC8-A6D2-472B-BA9B-C130D1ECF160}"/>
               </a:ext>
             </a:extLst>
           </p:cNvPr>
@@ -7279,7 +7279,7 @@
           <p:cNvPr id="8" name="Retângulo 7">
             <a:extLst>
               <a:ext uri="{FF2B5EF4-FFF2-40B4-BE49-F238E27FC236}">
-                <a16:creationId xmlns="" xmlns:a16="http://schemas.microsoft.com/office/drawing/2014/main" id="{763D329B-ACFE-4654-A49E-32875DCC9521}"/>
+                <a16:creationId xmlns:a16="http://schemas.microsoft.com/office/drawing/2014/main" xmlns="" id="{763D329B-ACFE-4654-A49E-32875DCC9521}"/>
               </a:ext>
             </a:extLst>
           </p:cNvPr>
@@ -7331,7 +7331,7 @@
           <p:cNvPr id="9" name="Retângulo 8">
             <a:extLst>
               <a:ext uri="{FF2B5EF4-FFF2-40B4-BE49-F238E27FC236}">
-                <a16:creationId xmlns="" xmlns:a16="http://schemas.microsoft.com/office/drawing/2014/main" id="{1943F22D-EAC6-42CB-84BB-8895EAA8536F}"/>
+                <a16:creationId xmlns:a16="http://schemas.microsoft.com/office/drawing/2014/main" xmlns="" id="{1943F22D-EAC6-42CB-84BB-8895EAA8536F}"/>
               </a:ext>
             </a:extLst>
           </p:cNvPr>
@@ -7383,7 +7383,7 @@
           <p:cNvPr id="11" name="Retângulo 10">
             <a:extLst>
               <a:ext uri="{FF2B5EF4-FFF2-40B4-BE49-F238E27FC236}">
-                <a16:creationId xmlns="" xmlns:a16="http://schemas.microsoft.com/office/drawing/2014/main" id="{C295414E-0B35-4055-828A-BA9995173F2D}"/>
+                <a16:creationId xmlns:a16="http://schemas.microsoft.com/office/drawing/2014/main" xmlns="" id="{C295414E-0B35-4055-828A-BA9995173F2D}"/>
               </a:ext>
             </a:extLst>
           </p:cNvPr>
@@ -7435,7 +7435,7 @@
           <p:cNvPr id="12" name="Retângulo 11">
             <a:extLst>
               <a:ext uri="{FF2B5EF4-FFF2-40B4-BE49-F238E27FC236}">
-                <a16:creationId xmlns="" xmlns:a16="http://schemas.microsoft.com/office/drawing/2014/main" id="{1AC3AB78-3DFC-4CD7-8DF8-CCDAFA255C92}"/>
+                <a16:creationId xmlns:a16="http://schemas.microsoft.com/office/drawing/2014/main" xmlns="" id="{1AC3AB78-3DFC-4CD7-8DF8-CCDAFA255C92}"/>
               </a:ext>
             </a:extLst>
           </p:cNvPr>
@@ -7487,7 +7487,7 @@
           <p:cNvPr id="13" name="Retângulo 12">
             <a:extLst>
               <a:ext uri="{FF2B5EF4-FFF2-40B4-BE49-F238E27FC236}">
-                <a16:creationId xmlns="" xmlns:a16="http://schemas.microsoft.com/office/drawing/2014/main" id="{367B15F2-BDA8-4A99-BEA5-EEC0D3630969}"/>
+                <a16:creationId xmlns:a16="http://schemas.microsoft.com/office/drawing/2014/main" xmlns="" id="{367B15F2-BDA8-4A99-BEA5-EEC0D3630969}"/>
               </a:ext>
             </a:extLst>
           </p:cNvPr>
@@ -7541,7 +7541,7 @@
           <p:cNvPr id="14" name="Retângulo 13">
             <a:extLst>
               <a:ext uri="{FF2B5EF4-FFF2-40B4-BE49-F238E27FC236}">
-                <a16:creationId xmlns="" xmlns:a16="http://schemas.microsoft.com/office/drawing/2014/main" id="{18CA4149-BC5C-4D85-AC6B-EE28AE290379}"/>
+                <a16:creationId xmlns:a16="http://schemas.microsoft.com/office/drawing/2014/main" xmlns="" id="{18CA4149-BC5C-4D85-AC6B-EE28AE290379}"/>
               </a:ext>
             </a:extLst>
           </p:cNvPr>
@@ -7595,7 +7595,7 @@
           <p:cNvPr id="15" name="Retângulo 14">
             <a:extLst>
               <a:ext uri="{FF2B5EF4-FFF2-40B4-BE49-F238E27FC236}">
-                <a16:creationId xmlns="" xmlns:a16="http://schemas.microsoft.com/office/drawing/2014/main" id="{CC4BE7C0-3171-48CF-A21B-F6A2C13FD71E}"/>
+                <a16:creationId xmlns:a16="http://schemas.microsoft.com/office/drawing/2014/main" xmlns="" id="{CC4BE7C0-3171-48CF-A21B-F6A2C13FD71E}"/>
               </a:ext>
             </a:extLst>
           </p:cNvPr>
@@ -7649,7 +7649,7 @@
           <p:cNvPr id="16" name="Retângulo 15">
             <a:extLst>
               <a:ext uri="{FF2B5EF4-FFF2-40B4-BE49-F238E27FC236}">
-                <a16:creationId xmlns="" xmlns:a16="http://schemas.microsoft.com/office/drawing/2014/main" id="{D81182C8-1D0F-4C02-A535-1240088FE2AB}"/>
+                <a16:creationId xmlns:a16="http://schemas.microsoft.com/office/drawing/2014/main" xmlns="" id="{D81182C8-1D0F-4C02-A535-1240088FE2AB}"/>
               </a:ext>
             </a:extLst>
           </p:cNvPr>
@@ -7703,7 +7703,7 @@
           <p:cNvPr id="17" name="Retângulo 16">
             <a:extLst>
               <a:ext uri="{FF2B5EF4-FFF2-40B4-BE49-F238E27FC236}">
-                <a16:creationId xmlns="" xmlns:a16="http://schemas.microsoft.com/office/drawing/2014/main" id="{35E0124D-B2FB-48EC-9486-026749EAA669}"/>
+                <a16:creationId xmlns:a16="http://schemas.microsoft.com/office/drawing/2014/main" xmlns="" id="{35E0124D-B2FB-48EC-9486-026749EAA669}"/>
               </a:ext>
             </a:extLst>
           </p:cNvPr>
@@ -8639,7 +8639,7 @@
             <p:cNvPr id="2" name="Elipse 1">
               <a:extLst>
                 <a:ext uri="{FF2B5EF4-FFF2-40B4-BE49-F238E27FC236}">
-                  <a16:creationId xmlns="" xmlns:a16="http://schemas.microsoft.com/office/drawing/2014/main" id="{71B6F9EF-9A70-41A5-83B7-D18BC1AE6D06}"/>
+                  <a16:creationId xmlns:a16="http://schemas.microsoft.com/office/drawing/2014/main" xmlns="" id="{71B6F9EF-9A70-41A5-83B7-D18BC1AE6D06}"/>
                 </a:ext>
               </a:extLst>
             </p:cNvPr>
@@ -8695,7 +8695,7 @@
             <p:cNvPr id="27" name="Elipse 26">
               <a:extLst>
                 <a:ext uri="{FF2B5EF4-FFF2-40B4-BE49-F238E27FC236}">
-                  <a16:creationId xmlns="" xmlns:a16="http://schemas.microsoft.com/office/drawing/2014/main" id="{BA8D2E14-7616-4A27-8EF4-049D69493936}"/>
+                  <a16:creationId xmlns:a16="http://schemas.microsoft.com/office/drawing/2014/main" xmlns="" id="{BA8D2E14-7616-4A27-8EF4-049D69493936}"/>
                 </a:ext>
               </a:extLst>
             </p:cNvPr>
@@ -8751,7 +8751,7 @@
             <p:cNvPr id="28" name="Elipse 27">
               <a:extLst>
                 <a:ext uri="{FF2B5EF4-FFF2-40B4-BE49-F238E27FC236}">
-                  <a16:creationId xmlns="" xmlns:a16="http://schemas.microsoft.com/office/drawing/2014/main" id="{8D7634C4-6B52-4729-964F-6938FFCD8DB5}"/>
+                  <a16:creationId xmlns:a16="http://schemas.microsoft.com/office/drawing/2014/main" xmlns="" id="{8D7634C4-6B52-4729-964F-6938FFCD8DB5}"/>
                 </a:ext>
               </a:extLst>
             </p:cNvPr>
@@ -8807,7 +8807,7 @@
             <p:cNvPr id="29" name="Elipse 28">
               <a:extLst>
                 <a:ext uri="{FF2B5EF4-FFF2-40B4-BE49-F238E27FC236}">
-                  <a16:creationId xmlns="" xmlns:a16="http://schemas.microsoft.com/office/drawing/2014/main" id="{743D010C-5F6D-4DC1-890A-E9695FA4A132}"/>
+                  <a16:creationId xmlns:a16="http://schemas.microsoft.com/office/drawing/2014/main" xmlns="" id="{743D010C-5F6D-4DC1-890A-E9695FA4A132}"/>
                 </a:ext>
               </a:extLst>
             </p:cNvPr>
@@ -8863,7 +8863,7 @@
             <p:cNvPr id="33" name="CaixaDeTexto 32">
               <a:extLst>
                 <a:ext uri="{FF2B5EF4-FFF2-40B4-BE49-F238E27FC236}">
-                  <a16:creationId xmlns="" xmlns:a16="http://schemas.microsoft.com/office/drawing/2014/main" id="{C16E10F4-1F46-4E5E-97B4-68C22B3B074A}"/>
+                  <a16:creationId xmlns:a16="http://schemas.microsoft.com/office/drawing/2014/main" xmlns="" id="{C16E10F4-1F46-4E5E-97B4-68C22B3B074A}"/>
                 </a:ext>
               </a:extLst>
             </p:cNvPr>
@@ -8899,7 +8899,7 @@
             <p:cNvPr id="50" name="Conector: Angulado 49">
               <a:extLst>
                 <a:ext uri="{FF2B5EF4-FFF2-40B4-BE49-F238E27FC236}">
-                  <a16:creationId xmlns="" xmlns:a16="http://schemas.microsoft.com/office/drawing/2014/main" id="{7BA99CC8-4A36-4F90-9666-0E2D9CDC06EC}"/>
+                  <a16:creationId xmlns:a16="http://schemas.microsoft.com/office/drawing/2014/main" xmlns="" id="{7BA99CC8-4A36-4F90-9666-0E2D9CDC06EC}"/>
                 </a:ext>
               </a:extLst>
             </p:cNvPr>
@@ -8943,7 +8943,7 @@
             <p:cNvPr id="53" name="Conector de Seta Reta 52">
               <a:extLst>
                 <a:ext uri="{FF2B5EF4-FFF2-40B4-BE49-F238E27FC236}">
-                  <a16:creationId xmlns="" xmlns:a16="http://schemas.microsoft.com/office/drawing/2014/main" id="{0D32E73A-7A15-4671-8D42-E923FDD97C95}"/>
+                  <a16:creationId xmlns:a16="http://schemas.microsoft.com/office/drawing/2014/main" xmlns="" id="{0D32E73A-7A15-4671-8D42-E923FDD97C95}"/>
                 </a:ext>
               </a:extLst>
             </p:cNvPr>
@@ -8986,7 +8986,7 @@
             <p:cNvPr id="55" name="Conector de Seta Reta 54">
               <a:extLst>
                 <a:ext uri="{FF2B5EF4-FFF2-40B4-BE49-F238E27FC236}">
-                  <a16:creationId xmlns="" xmlns:a16="http://schemas.microsoft.com/office/drawing/2014/main" id="{C4680F0C-A325-4A5A-A710-746FFBD7B7D0}"/>
+                  <a16:creationId xmlns:a16="http://schemas.microsoft.com/office/drawing/2014/main" xmlns="" id="{C4680F0C-A325-4A5A-A710-746FFBD7B7D0}"/>
                 </a:ext>
               </a:extLst>
             </p:cNvPr>
@@ -9029,7 +9029,7 @@
             <p:cNvPr id="57" name="Elipse 56">
               <a:extLst>
                 <a:ext uri="{FF2B5EF4-FFF2-40B4-BE49-F238E27FC236}">
-                  <a16:creationId xmlns="" xmlns:a16="http://schemas.microsoft.com/office/drawing/2014/main" id="{1B90BB71-7219-41F8-9A0C-7694C8774DB6}"/>
+                  <a16:creationId xmlns:a16="http://schemas.microsoft.com/office/drawing/2014/main" xmlns="" id="{1B90BB71-7219-41F8-9A0C-7694C8774DB6}"/>
                 </a:ext>
               </a:extLst>
             </p:cNvPr>
@@ -9085,7 +9085,7 @@
             <p:cNvPr id="60" name="Conector de Seta Reta 59">
               <a:extLst>
                 <a:ext uri="{FF2B5EF4-FFF2-40B4-BE49-F238E27FC236}">
-                  <a16:creationId xmlns="" xmlns:a16="http://schemas.microsoft.com/office/drawing/2014/main" id="{E33716DC-FE8F-4AFE-B34A-52F497A8272A}"/>
+                  <a16:creationId xmlns:a16="http://schemas.microsoft.com/office/drawing/2014/main" xmlns="" id="{E33716DC-FE8F-4AFE-B34A-52F497A8272A}"/>
                 </a:ext>
               </a:extLst>
             </p:cNvPr>
@@ -9128,7 +9128,7 @@
             <p:cNvPr id="63" name="Conector: Angulado 62">
               <a:extLst>
                 <a:ext uri="{FF2B5EF4-FFF2-40B4-BE49-F238E27FC236}">
-                  <a16:creationId xmlns="" xmlns:a16="http://schemas.microsoft.com/office/drawing/2014/main" id="{C652DE59-CA79-4E5A-91BE-13CDB8ADDF12}"/>
+                  <a16:creationId xmlns:a16="http://schemas.microsoft.com/office/drawing/2014/main" xmlns="" id="{C652DE59-CA79-4E5A-91BE-13CDB8ADDF12}"/>
                 </a:ext>
               </a:extLst>
             </p:cNvPr>
@@ -9171,7 +9171,7 @@
             <p:cNvPr id="65" name="Elipse 64">
               <a:extLst>
                 <a:ext uri="{FF2B5EF4-FFF2-40B4-BE49-F238E27FC236}">
-                  <a16:creationId xmlns="" xmlns:a16="http://schemas.microsoft.com/office/drawing/2014/main" id="{365AA1B7-656D-4444-81E3-AC6F1EF0FA9B}"/>
+                  <a16:creationId xmlns:a16="http://schemas.microsoft.com/office/drawing/2014/main" xmlns="" id="{365AA1B7-656D-4444-81E3-AC6F1EF0FA9B}"/>
                 </a:ext>
               </a:extLst>
             </p:cNvPr>
@@ -9238,7 +9238,7 @@
             <p:cNvPr id="66" name="Conector: Angulado 65">
               <a:extLst>
                 <a:ext uri="{FF2B5EF4-FFF2-40B4-BE49-F238E27FC236}">
-                  <a16:creationId xmlns="" xmlns:a16="http://schemas.microsoft.com/office/drawing/2014/main" id="{79815850-83BB-40B3-AE02-7519F8A84B8E}"/>
+                  <a16:creationId xmlns:a16="http://schemas.microsoft.com/office/drawing/2014/main" xmlns="" id="{79815850-83BB-40B3-AE02-7519F8A84B8E}"/>
                 </a:ext>
               </a:extLst>
             </p:cNvPr>
@@ -9281,7 +9281,7 @@
             <p:cNvPr id="45" name="Elipse 44">
               <a:extLst>
                 <a:ext uri="{FF2B5EF4-FFF2-40B4-BE49-F238E27FC236}">
-                  <a16:creationId xmlns="" xmlns:a16="http://schemas.microsoft.com/office/drawing/2014/main" id="{305E31E0-C2D4-41E4-A8A8-BD98577284CF}"/>
+                  <a16:creationId xmlns:a16="http://schemas.microsoft.com/office/drawing/2014/main" xmlns="" id="{305E31E0-C2D4-41E4-A8A8-BD98577284CF}"/>
                 </a:ext>
               </a:extLst>
             </p:cNvPr>
@@ -9337,7 +9337,7 @@
             <p:cNvPr id="24" name="Conector de Seta Reta 23">
               <a:extLst>
                 <a:ext uri="{FF2B5EF4-FFF2-40B4-BE49-F238E27FC236}">
-                  <a16:creationId xmlns="" xmlns:a16="http://schemas.microsoft.com/office/drawing/2014/main" id="{E09AE68E-8930-43E0-8C9E-02109A2D5419}"/>
+                  <a16:creationId xmlns:a16="http://schemas.microsoft.com/office/drawing/2014/main" xmlns="" id="{E09AE68E-8930-43E0-8C9E-02109A2D5419}"/>
                 </a:ext>
               </a:extLst>
             </p:cNvPr>
@@ -9380,7 +9380,7 @@
             <p:cNvPr id="46" name="Retângulo 45">
               <a:extLst>
                 <a:ext uri="{FF2B5EF4-FFF2-40B4-BE49-F238E27FC236}">
-                  <a16:creationId xmlns="" xmlns:a16="http://schemas.microsoft.com/office/drawing/2014/main" id="{CD06D3B3-600F-46B5-B003-ED2A1059BFAB}"/>
+                  <a16:creationId xmlns:a16="http://schemas.microsoft.com/office/drawing/2014/main" xmlns="" id="{CD06D3B3-600F-46B5-B003-ED2A1059BFAB}"/>
                 </a:ext>
               </a:extLst>
             </p:cNvPr>
@@ -9436,7 +9436,7 @@
             <p:cNvPr id="35" name="Conector de Seta Reta 34">
               <a:extLst>
                 <a:ext uri="{FF2B5EF4-FFF2-40B4-BE49-F238E27FC236}">
-                  <a16:creationId xmlns="" xmlns:a16="http://schemas.microsoft.com/office/drawing/2014/main" id="{51E79D0C-214C-4553-A449-FBB9E2C28317}"/>
+                  <a16:creationId xmlns:a16="http://schemas.microsoft.com/office/drawing/2014/main" xmlns="" id="{51E79D0C-214C-4553-A449-FBB9E2C28317}"/>
                 </a:ext>
               </a:extLst>
             </p:cNvPr>
@@ -9479,7 +9479,7 @@
             <p:cNvPr id="40" name="Conector: Angulado 39">
               <a:extLst>
                 <a:ext uri="{FF2B5EF4-FFF2-40B4-BE49-F238E27FC236}">
-                  <a16:creationId xmlns="" xmlns:a16="http://schemas.microsoft.com/office/drawing/2014/main" id="{4AD69AB7-DE0B-4011-8039-E19E10CF715D}"/>
+                  <a16:creationId xmlns:a16="http://schemas.microsoft.com/office/drawing/2014/main" xmlns="" id="{4AD69AB7-DE0B-4011-8039-E19E10CF715D}"/>
                 </a:ext>
               </a:extLst>
             </p:cNvPr>
@@ -9522,7 +9522,7 @@
             <p:cNvPr id="56" name="CaixaDeTexto 55">
               <a:extLst>
                 <a:ext uri="{FF2B5EF4-FFF2-40B4-BE49-F238E27FC236}">
-                  <a16:creationId xmlns="" xmlns:a16="http://schemas.microsoft.com/office/drawing/2014/main" id="{29B5574B-E766-4938-9931-D49975E36BA0}"/>
+                  <a16:creationId xmlns:a16="http://schemas.microsoft.com/office/drawing/2014/main" xmlns="" id="{29B5574B-E766-4938-9931-D49975E36BA0}"/>
                 </a:ext>
               </a:extLst>
             </p:cNvPr>
@@ -9557,7 +9557,7 @@
             <p:cNvPr id="52" name="Conector de Seta Reta 51">
               <a:extLst>
                 <a:ext uri="{FF2B5EF4-FFF2-40B4-BE49-F238E27FC236}">
-                  <a16:creationId xmlns="" xmlns:a16="http://schemas.microsoft.com/office/drawing/2014/main" id="{639CFD7C-65F9-43B0-813C-92CBFE11C270}"/>
+                  <a16:creationId xmlns:a16="http://schemas.microsoft.com/office/drawing/2014/main" xmlns="" id="{639CFD7C-65F9-43B0-813C-92CBFE11C270}"/>
                 </a:ext>
               </a:extLst>
             </p:cNvPr>
@@ -9601,7 +9601,7 @@
             <p:cNvPr id="64" name="Retângulo 63">
               <a:extLst>
                 <a:ext uri="{FF2B5EF4-FFF2-40B4-BE49-F238E27FC236}">
-                  <a16:creationId xmlns="" xmlns:a16="http://schemas.microsoft.com/office/drawing/2014/main" id="{42F8BBA1-1A92-451C-8BE4-2FE5EE3D7CB0}"/>
+                  <a16:creationId xmlns:a16="http://schemas.microsoft.com/office/drawing/2014/main" xmlns="" id="{42F8BBA1-1A92-451C-8BE4-2FE5EE3D7CB0}"/>
                 </a:ext>
               </a:extLst>
             </p:cNvPr>
@@ -9657,7 +9657,7 @@
             <p:cNvPr id="59" name="Conector: Angulado 58">
               <a:extLst>
                 <a:ext uri="{FF2B5EF4-FFF2-40B4-BE49-F238E27FC236}">
-                  <a16:creationId xmlns="" xmlns:a16="http://schemas.microsoft.com/office/drawing/2014/main" id="{37DB8425-D0EA-419F-8310-C1DDCDE7D4BB}"/>
+                  <a16:creationId xmlns:a16="http://schemas.microsoft.com/office/drawing/2014/main" xmlns="" id="{37DB8425-D0EA-419F-8310-C1DDCDE7D4BB}"/>
                 </a:ext>
               </a:extLst>
             </p:cNvPr>

</xml_diff>